<commit_message>
add block name in 'Tetris plan.ppts'
</commit_message>
<xml_diff>
--- a/Document/Tetris plan.pptx
+++ b/Document/Tetris plan.pptx
@@ -2,7 +2,7 @@
 <file path=ppt/presentation.xml><?xml version="1.0" encoding="utf-8"?>
 <p:presentation xmlns:r="http://schemas.openxmlformats.org/officeDocument/2006/relationships" xmlns:c="http://schemas.openxmlformats.org/drawingml/2006/chart" xmlns:a="http://schemas.openxmlformats.org/drawingml/2006/main" xmlns:dgm="http://schemas.openxmlformats.org/drawingml/2006/diagram" xmlns:dsp="http://schemas.microsoft.com/office/drawing/2008/diagram" xmlns:p="http://schemas.openxmlformats.org/presentationml/2006/main" saveSubsetFonts="1">
   <p:sldMasterIdLst>
-    <p:sldMasterId id="2147483753" r:id="rId1"/>
+    <p:sldMasterId id="2147483745" r:id="rId1"/>
   </p:sldMasterIdLst>
   <p:sldIdLst>
     <p:sldId id="256" r:id="rId2"/>
@@ -3841,7 +3841,7 @@
         </p:nvGraphicFramePr>
         <p:xfrm>
           <a:off x="839342" y="1628774"/>
-          <a:ext cx="10513315" cy="4248531"/>
+          <a:ext cx="10513313" cy="4248531"/>
         </p:xfrm>
         <a:graphic>
           <a:graphicData uri="http://schemas.openxmlformats.org/drawingml/2006/table">
@@ -4035,6 +4035,10 @@
                       <a:pPr algn="ctr">
                         <a:defRPr lang="ko-KR" altLang="en-US"/>
                       </a:pPr>
+                      <a:r>
+                        <a:rPr lang="ko-KR" altLang="en-US"/>
+                        <a:t>2018.07.23</a:t>
+                      </a:r>
                       <a:endParaRPr lang="ko-KR" altLang="en-US"/>
                     </a:p>
                   </a:txBody>
@@ -4049,6 +4053,10 @@
                       <a:pPr algn="ctr">
                         <a:defRPr lang="ko-KR" altLang="en-US"/>
                       </a:pPr>
+                      <a:r>
+                        <a:rPr lang="ko-KR" altLang="en-US"/>
+                        <a:t>블럭 종류 이름 추가</a:t>
+                      </a:r>
                       <a:endParaRPr lang="ko-KR" altLang="en-US"/>
                     </a:p>
                   </a:txBody>
@@ -4063,6 +4071,10 @@
                       <a:pPr algn="ctr">
                         <a:defRPr lang="ko-KR" altLang="en-US"/>
                       </a:pPr>
+                      <a:r>
+                        <a:rPr lang="ko-KR" altLang="en-US"/>
+                        <a:t>햄과함께</a:t>
+                      </a:r>
                       <a:endParaRPr lang="ko-KR" altLang="en-US"/>
                     </a:p>
                   </a:txBody>
@@ -5983,8 +5995,8 @@
           <p:nvPr/>
         </p:nvGraphicFramePr>
         <p:xfrm>
-          <a:off x="2765640" y="1754846"/>
-          <a:ext cx="450000" cy="1799999"/>
+          <a:off x="2765640" y="1484757"/>
+          <a:ext cx="450000" cy="1799996"/>
         </p:xfrm>
         <a:graphic>
           <a:graphicData uri="http://schemas.openxmlformats.org/drawingml/2006/table">
@@ -6086,8 +6098,8 @@
           <p:nvPr/>
         </p:nvGraphicFramePr>
         <p:xfrm>
-          <a:off x="4223767" y="2204847"/>
-          <a:ext cx="1350000" cy="899999"/>
+          <a:off x="4223766" y="2384755"/>
+          <a:ext cx="1350000" cy="899998"/>
         </p:xfrm>
         <a:graphic>
           <a:graphicData uri="http://schemas.openxmlformats.org/drawingml/2006/table">
@@ -6297,8 +6309,8 @@
           <p:nvPr/>
         </p:nvGraphicFramePr>
         <p:xfrm>
-          <a:off x="6402208" y="2204847"/>
-          <a:ext cx="1350000" cy="899999"/>
+          <a:off x="6402207" y="2384755"/>
+          <a:ext cx="1350000" cy="899998"/>
         </p:xfrm>
         <a:graphic>
           <a:graphicData uri="http://schemas.openxmlformats.org/drawingml/2006/table">
@@ -6508,7 +6520,7 @@
         </p:nvGraphicFramePr>
         <p:xfrm>
           <a:off x="3602604" y="4509135"/>
-          <a:ext cx="900000" cy="908963"/>
+          <a:ext cx="900000" cy="908962"/>
         </p:xfrm>
         <a:graphic>
           <a:graphicData uri="http://schemas.openxmlformats.org/drawingml/2006/table">
@@ -6620,7 +6632,7 @@
         </p:nvGraphicFramePr>
         <p:xfrm>
           <a:off x="5285730" y="4518099"/>
-          <a:ext cx="1350000" cy="899999"/>
+          <a:ext cx="1350000" cy="899998"/>
         </p:xfrm>
         <a:graphic>
           <a:graphicData uri="http://schemas.openxmlformats.org/drawingml/2006/table">
@@ -6920,7 +6932,7 @@
         </p:nvGraphicFramePr>
         <p:xfrm>
           <a:off x="7464171" y="4518099"/>
-          <a:ext cx="1350000" cy="899999"/>
+          <a:ext cx="1350000" cy="899998"/>
         </p:xfrm>
         <a:graphic>
           <a:graphicData uri="http://schemas.openxmlformats.org/drawingml/2006/table">
@@ -7219,8 +7231,8 @@
           <p:nvPr/>
         </p:nvGraphicFramePr>
         <p:xfrm>
-          <a:off x="8634487" y="2204847"/>
-          <a:ext cx="1350000" cy="899999"/>
+          <a:off x="8634486" y="2384755"/>
+          <a:ext cx="1350000" cy="899998"/>
         </p:xfrm>
         <a:graphic>
           <a:graphicData uri="http://schemas.openxmlformats.org/drawingml/2006/table">
@@ -7503,6 +7515,286 @@
           </a:graphicData>
         </a:graphic>
       </p:graphicFrame>
+      <p:sp>
+        <p:nvSpPr>
+          <p:cNvPr id="38" name=""/>
+          <p:cNvSpPr txBox="1"/>
+          <p:nvPr/>
+        </p:nvSpPr>
+        <p:spPr>
+          <a:xfrm>
+            <a:off x="2670790" y="3284753"/>
+            <a:ext cx="639700" cy="624728"/>
+          </a:xfrm>
+          <a:prstGeom prst="rect">
+            <a:avLst/>
+          </a:prstGeom>
+        </p:spPr>
+        <p:txBody>
+          <a:bodyPr wrap="square">
+            <a:spAutoFit/>
+          </a:bodyPr>
+          <a:lstStyle/>
+          <a:p>
+            <a:pPr algn="ctr">
+              <a:defRPr lang="ko-KR" altLang="en-US"/>
+            </a:pPr>
+            <a:r>
+              <a:rPr lang="en-US" altLang="ko-KR" sz="3500">
+                <a:solidFill>
+                  <a:schemeClr val="tx1"/>
+                </a:solidFill>
+              </a:rPr>
+              <a:t>I</a:t>
+            </a:r>
+            <a:endParaRPr lang="en-US" altLang="ko-KR" sz="3500">
+              <a:solidFill>
+                <a:schemeClr val="tx1"/>
+              </a:solidFill>
+            </a:endParaRPr>
+          </a:p>
+        </p:txBody>
+      </p:sp>
+      <p:sp>
+        <p:nvSpPr>
+          <p:cNvPr id="39" name=""/>
+          <p:cNvSpPr txBox="1"/>
+          <p:nvPr/>
+        </p:nvSpPr>
+        <p:spPr>
+          <a:xfrm>
+            <a:off x="4578917" y="3284753"/>
+            <a:ext cx="639700" cy="624728"/>
+          </a:xfrm>
+          <a:prstGeom prst="rect">
+            <a:avLst/>
+          </a:prstGeom>
+        </p:spPr>
+        <p:txBody>
+          <a:bodyPr wrap="square">
+            <a:spAutoFit/>
+          </a:bodyPr>
+          <a:lstStyle/>
+          <a:p>
+            <a:pPr algn="ctr">
+              <a:defRPr lang="ko-KR" altLang="en-US"/>
+            </a:pPr>
+            <a:r>
+              <a:rPr lang="en-US" altLang="ko-KR" sz="3500">
+                <a:solidFill>
+                  <a:schemeClr val="tx1"/>
+                </a:solidFill>
+              </a:rPr>
+              <a:t>L</a:t>
+            </a:r>
+            <a:endParaRPr lang="en-US" altLang="ko-KR" sz="3500">
+              <a:solidFill>
+                <a:schemeClr val="tx1"/>
+              </a:solidFill>
+            </a:endParaRPr>
+          </a:p>
+        </p:txBody>
+      </p:sp>
+      <p:sp>
+        <p:nvSpPr>
+          <p:cNvPr id="40" name=""/>
+          <p:cNvSpPr txBox="1"/>
+          <p:nvPr/>
+        </p:nvSpPr>
+        <p:spPr>
+          <a:xfrm>
+            <a:off x="6757358" y="3284753"/>
+            <a:ext cx="639700" cy="624728"/>
+          </a:xfrm>
+          <a:prstGeom prst="rect">
+            <a:avLst/>
+          </a:prstGeom>
+        </p:spPr>
+        <p:txBody>
+          <a:bodyPr wrap="square">
+            <a:spAutoFit/>
+          </a:bodyPr>
+          <a:lstStyle/>
+          <a:p>
+            <a:pPr algn="ctr">
+              <a:defRPr lang="ko-KR" altLang="en-US"/>
+            </a:pPr>
+            <a:r>
+              <a:rPr lang="en-US" altLang="ko-KR" sz="3500">
+                <a:solidFill>
+                  <a:schemeClr val="tx1"/>
+                </a:solidFill>
+              </a:rPr>
+              <a:t>J</a:t>
+            </a:r>
+            <a:endParaRPr lang="en-US" altLang="ko-KR" sz="3500">
+              <a:solidFill>
+                <a:schemeClr val="tx1"/>
+              </a:solidFill>
+            </a:endParaRPr>
+          </a:p>
+        </p:txBody>
+      </p:sp>
+      <p:sp>
+        <p:nvSpPr>
+          <p:cNvPr id="41" name=""/>
+          <p:cNvSpPr txBox="1"/>
+          <p:nvPr/>
+        </p:nvSpPr>
+        <p:spPr>
+          <a:xfrm>
+            <a:off x="8989636" y="3284753"/>
+            <a:ext cx="639700" cy="624728"/>
+          </a:xfrm>
+          <a:prstGeom prst="rect">
+            <a:avLst/>
+          </a:prstGeom>
+        </p:spPr>
+        <p:txBody>
+          <a:bodyPr wrap="square">
+            <a:spAutoFit/>
+          </a:bodyPr>
+          <a:lstStyle/>
+          <a:p>
+            <a:pPr algn="ctr">
+              <a:defRPr lang="ko-KR" altLang="en-US"/>
+            </a:pPr>
+            <a:r>
+              <a:rPr lang="en-US" altLang="ko-KR" sz="3500">
+                <a:solidFill>
+                  <a:schemeClr val="tx1"/>
+                </a:solidFill>
+              </a:rPr>
+              <a:t>T</a:t>
+            </a:r>
+            <a:endParaRPr lang="en-US" altLang="ko-KR" sz="3500">
+              <a:solidFill>
+                <a:schemeClr val="tx1"/>
+              </a:solidFill>
+            </a:endParaRPr>
+          </a:p>
+        </p:txBody>
+      </p:sp>
+      <p:sp>
+        <p:nvSpPr>
+          <p:cNvPr id="42" name=""/>
+          <p:cNvSpPr txBox="1"/>
+          <p:nvPr/>
+        </p:nvSpPr>
+        <p:spPr>
+          <a:xfrm>
+            <a:off x="3732754" y="5661279"/>
+            <a:ext cx="639700" cy="624728"/>
+          </a:xfrm>
+          <a:prstGeom prst="rect">
+            <a:avLst/>
+          </a:prstGeom>
+        </p:spPr>
+        <p:txBody>
+          <a:bodyPr wrap="square">
+            <a:spAutoFit/>
+          </a:bodyPr>
+          <a:lstStyle/>
+          <a:p>
+            <a:pPr algn="ctr">
+              <a:defRPr lang="ko-KR" altLang="en-US"/>
+            </a:pPr>
+            <a:r>
+              <a:rPr lang="en-US" altLang="ko-KR" sz="3500">
+                <a:solidFill>
+                  <a:schemeClr val="tx1"/>
+                </a:solidFill>
+              </a:rPr>
+              <a:t>O</a:t>
+            </a:r>
+            <a:endParaRPr lang="en-US" altLang="ko-KR" sz="3500">
+              <a:solidFill>
+                <a:schemeClr val="tx1"/>
+              </a:solidFill>
+            </a:endParaRPr>
+          </a:p>
+        </p:txBody>
+      </p:sp>
+      <p:sp>
+        <p:nvSpPr>
+          <p:cNvPr id="43" name=""/>
+          <p:cNvSpPr txBox="1"/>
+          <p:nvPr/>
+        </p:nvSpPr>
+        <p:spPr>
+          <a:xfrm>
+            <a:off x="5776150" y="5661279"/>
+            <a:ext cx="639700" cy="624728"/>
+          </a:xfrm>
+          <a:prstGeom prst="rect">
+            <a:avLst/>
+          </a:prstGeom>
+        </p:spPr>
+        <p:txBody>
+          <a:bodyPr wrap="square">
+            <a:spAutoFit/>
+          </a:bodyPr>
+          <a:lstStyle/>
+          <a:p>
+            <a:pPr algn="ctr">
+              <a:defRPr lang="ko-KR" altLang="en-US"/>
+            </a:pPr>
+            <a:r>
+              <a:rPr lang="en-US" altLang="ko-KR" sz="3500">
+                <a:solidFill>
+                  <a:schemeClr val="tx1"/>
+                </a:solidFill>
+              </a:rPr>
+              <a:t>S</a:t>
+            </a:r>
+            <a:endParaRPr lang="en-US" altLang="ko-KR" sz="3500">
+              <a:solidFill>
+                <a:schemeClr val="tx1"/>
+              </a:solidFill>
+            </a:endParaRPr>
+          </a:p>
+        </p:txBody>
+      </p:sp>
+      <p:sp>
+        <p:nvSpPr>
+          <p:cNvPr id="44" name=""/>
+          <p:cNvSpPr txBox="1"/>
+          <p:nvPr/>
+        </p:nvSpPr>
+        <p:spPr>
+          <a:xfrm>
+            <a:off x="7819321" y="5661279"/>
+            <a:ext cx="639700" cy="624728"/>
+          </a:xfrm>
+          <a:prstGeom prst="rect">
+            <a:avLst/>
+          </a:prstGeom>
+        </p:spPr>
+        <p:txBody>
+          <a:bodyPr wrap="square">
+            <a:spAutoFit/>
+          </a:bodyPr>
+          <a:lstStyle/>
+          <a:p>
+            <a:pPr algn="ctr">
+              <a:defRPr lang="ko-KR" altLang="en-US"/>
+            </a:pPr>
+            <a:r>
+              <a:rPr lang="en-US" altLang="ko-KR" sz="3500">
+                <a:solidFill>
+                  <a:schemeClr val="tx1"/>
+                </a:solidFill>
+              </a:rPr>
+              <a:t>Z</a:t>
+            </a:r>
+            <a:endParaRPr lang="en-US" altLang="ko-KR" sz="3500">
+              <a:solidFill>
+                <a:schemeClr val="tx1"/>
+              </a:solidFill>
+            </a:endParaRPr>
+          </a:p>
+        </p:txBody>
+      </p:sp>
     </p:spTree>
   </p:cSld>
   <p:clrMapOvr>

</xml_diff>

<commit_message>
add Game screen size in 'Tetris plan.ppts'
</commit_message>
<xml_diff>
--- a/Document/Tetris plan.pptx
+++ b/Document/Tetris plan.pptx
@@ -2,7 +2,7 @@
 <file path=ppt/presentation.xml><?xml version="1.0" encoding="utf-8"?>
 <p:presentation xmlns:r="http://schemas.openxmlformats.org/officeDocument/2006/relationships" xmlns:c="http://schemas.openxmlformats.org/drawingml/2006/chart" xmlns:a="http://schemas.openxmlformats.org/drawingml/2006/main" xmlns:dgm="http://schemas.openxmlformats.org/drawingml/2006/diagram" xmlns:dsp="http://schemas.microsoft.com/office/drawing/2008/diagram" xmlns:p="http://schemas.openxmlformats.org/presentationml/2006/main" saveSubsetFonts="1">
   <p:sldMasterIdLst>
-    <p:sldMasterId id="2147483746" r:id="rId1"/>
+    <p:sldMasterId id="2147483745" r:id="rId1"/>
   </p:sldMasterIdLst>
   <p:sldIdLst>
     <p:sldId id="256" r:id="rId2"/>
@@ -19,6 +19,7 @@
     <p:sldId id="267" r:id="rId13"/>
     <p:sldId id="268" r:id="rId14"/>
     <p:sldId id="269" r:id="rId15"/>
+    <p:sldId id="270" r:id="rId16"/>
   </p:sldIdLst>
   <p:sldSz cx="12192000" cy="6858000"/>
   <p:notesSz cx="6858000" cy="9144000"/>
@@ -460,7 +461,7 @@
               <a:pPr lvl="0">
                 <a:defRPr lang="ko-KR" altLang="en-US"/>
               </a:pPr>
-              <a:t>2018-07-25</a:t>
+              <a:t>2018-07-27</a:t>
             </a:fld>
             <a:endParaRPr lang="ko-KR" altLang="en-US"/>
           </a:p>
@@ -685,7 +686,7 @@
               <a:pPr lvl="0">
                 <a:defRPr lang="ko-KR" altLang="en-US"/>
               </a:pPr>
-              <a:t>2018-07-25</a:t>
+              <a:t>2018-07-27</a:t>
             </a:fld>
             <a:endParaRPr lang="ko-KR" altLang="en-US"/>
           </a:p>
@@ -897,7 +898,7 @@
               <a:pPr lvl="0">
                 <a:defRPr lang="ko-KR" altLang="en-US"/>
               </a:pPr>
-              <a:t>2018-07-25</a:t>
+              <a:t>2018-07-27</a:t>
             </a:fld>
             <a:endParaRPr lang="ko-KR" altLang="en-US"/>
           </a:p>
@@ -1209,7 +1210,7 @@
               <a:pPr lvl="0">
                 <a:defRPr lang="ko-KR" altLang="en-US"/>
               </a:pPr>
-              <a:t>2018-07-25</a:t>
+              <a:t>2018-07-27</a:t>
             </a:fld>
             <a:endParaRPr lang="ko-KR" altLang="en-US"/>
           </a:p>
@@ -1476,7 +1477,7 @@
               <a:pPr lvl="0">
                 <a:defRPr lang="ko-KR" altLang="en-US"/>
               </a:pPr>
-              <a:t>2018-07-25</a:t>
+              <a:t>2018-07-27</a:t>
             </a:fld>
             <a:endParaRPr lang="ko-KR" altLang="en-US"/>
           </a:p>
@@ -1810,7 +1811,7 @@
               <a:pPr lvl="0">
                 <a:defRPr lang="ko-KR" altLang="en-US"/>
               </a:pPr>
-              <a:t>2018-07-25</a:t>
+              <a:t>2018-07-27</a:t>
             </a:fld>
             <a:endParaRPr lang="ko-KR" altLang="en-US"/>
           </a:p>
@@ -1946,7 +1947,7 @@
               <a:pPr lvl="0">
                 <a:defRPr lang="ko-KR" altLang="en-US"/>
               </a:pPr>
-              <a:t>2018-07-25</a:t>
+              <a:t>2018-07-27</a:t>
             </a:fld>
             <a:endParaRPr lang="ko-KR" altLang="en-US"/>
           </a:p>
@@ -2119,7 +2120,7 @@
               <a:pPr lvl="0">
                 <a:defRPr lang="ko-KR" altLang="en-US"/>
               </a:pPr>
-              <a:t>2018-07-25</a:t>
+              <a:t>2018-07-27</a:t>
             </a:fld>
             <a:endParaRPr lang="ko-KR" altLang="en-US"/>
           </a:p>
@@ -2651,7 +2652,7 @@
               <a:pPr lvl="0">
                 <a:defRPr lang="ko-KR" altLang="en-US"/>
               </a:pPr>
-              <a:t>2018-07-25</a:t>
+              <a:t>2018-07-27</a:t>
             </a:fld>
             <a:endParaRPr lang="ko-KR" altLang="en-US"/>
           </a:p>
@@ -2932,7 +2933,7 @@
               <a:pPr lvl="0">
                 <a:defRPr lang="ko-KR" altLang="en-US"/>
               </a:pPr>
-              <a:t>2018-07-25</a:t>
+              <a:t>2018-07-27</a:t>
             </a:fld>
             <a:endParaRPr lang="ko-KR" altLang="en-US"/>
           </a:p>
@@ -8583,6 +8584,3043 @@
 </file>
 
 <file path=ppt/slides/slide14.xml><?xml version="1.0" encoding="utf-8"?>
+<p:sld xmlns:r="http://schemas.openxmlformats.org/officeDocument/2006/relationships" xmlns:c="http://schemas.openxmlformats.org/drawingml/2006/chart" xmlns:a="http://schemas.openxmlformats.org/drawingml/2006/main" xmlns:dgm="http://schemas.openxmlformats.org/drawingml/2006/diagram" xmlns:dsp="http://schemas.microsoft.com/office/drawing/2008/diagram" xmlns:p="http://schemas.openxmlformats.org/presentationml/2006/main">
+  <p:cSld>
+    <p:spTree>
+      <p:nvGrpSpPr>
+        <p:cNvPr id="1" name=""/>
+        <p:cNvGrpSpPr/>
+        <p:nvPr/>
+      </p:nvGrpSpPr>
+      <p:grpSpPr>
+        <a:xfrm>
+          <a:off x="0" y="0"/>
+          <a:ext cx="0" cy="0"/>
+          <a:chOff x="0" y="0"/>
+          <a:chExt cx="0" cy="0"/>
+        </a:xfrm>
+      </p:grpSpPr>
+      <p:sp>
+        <p:nvSpPr>
+          <p:cNvPr id="38" name=""/>
+          <p:cNvSpPr txBox="1"/>
+          <p:nvPr/>
+        </p:nvSpPr>
+        <p:spPr>
+          <a:xfrm>
+            <a:off x="551307" y="549000"/>
+            <a:ext cx="2016394" cy="1154070"/>
+          </a:xfrm>
+          <a:prstGeom prst="rect">
+            <a:avLst/>
+          </a:prstGeom>
+        </p:spPr>
+        <p:txBody>
+          <a:bodyPr wrap="square">
+            <a:spAutoFit/>
+          </a:bodyPr>
+          <a:lstStyle/>
+          <a:p>
+            <a:pPr algn="ctr">
+              <a:defRPr lang="ko-KR" altLang="en-US"/>
+            </a:pPr>
+            <a:r>
+              <a:rPr lang="ko-KR" altLang="en-US" sz="3500">
+                <a:solidFill>
+                  <a:schemeClr val="tx1"/>
+                </a:solidFill>
+              </a:rPr>
+              <a:t>게임판 크기</a:t>
+            </a:r>
+            <a:endParaRPr lang="ko-KR" altLang="en-US" sz="3500">
+              <a:solidFill>
+                <a:schemeClr val="tx1"/>
+              </a:solidFill>
+            </a:endParaRPr>
+          </a:p>
+        </p:txBody>
+      </p:sp>
+      <p:graphicFrame>
+        <p:nvGraphicFramePr>
+          <p:cNvPr id="50" name=""/>
+          <p:cNvGraphicFramePr>
+            <a:graphicFrameLocks noGrp="1"/>
+          </p:cNvGraphicFramePr>
+          <p:nvPr/>
+        </p:nvGraphicFramePr>
+        <p:xfrm>
+          <a:off x="4656000" y="549000"/>
+          <a:ext cx="2880000" cy="5759999"/>
+        </p:xfrm>
+        <a:graphic>
+          <a:graphicData uri="http://schemas.openxmlformats.org/drawingml/2006/table">
+            <a:tbl>
+              <a:tblPr firstRow="1" bandRow="1"/>
+              <a:tblGrid>
+                <a:gridCol w="288000"/>
+                <a:gridCol w="288000"/>
+                <a:gridCol w="288000"/>
+                <a:gridCol w="288000"/>
+                <a:gridCol w="288000"/>
+                <a:gridCol w="288000"/>
+                <a:gridCol w="288000"/>
+                <a:gridCol w="288000"/>
+                <a:gridCol w="288000"/>
+                <a:gridCol w="288000"/>
+              </a:tblGrid>
+              <a:tr h="287999">
+                <a:tc>
+                  <a:txBody>
+                    <a:bodyPr vert="horz" wrap="square" lIns="91440" tIns="45720" rIns="91440" bIns="45720" anchor="t" anchorCtr="0">
+                      <a:spAutoFit/>
+                    </a:bodyPr>
+                    <a:p>
+                      <a:pPr>
+                        <a:defRPr lang="ko-KR" altLang="en-US"/>
+                      </a:pPr>
+                      <a:endParaRPr lang="ko-KR" altLang="en-US" sz="100"/>
+                    </a:p>
+                  </a:txBody>
+                  <a:tcPr marL="91440" marR="91440"/>
+                </a:tc>
+                <a:tc>
+                  <a:txBody>
+                    <a:bodyPr vert="horz" wrap="square" lIns="91440" tIns="45720" rIns="91440" bIns="45720" anchor="t" anchorCtr="0">
+                      <a:spAutoFit/>
+                    </a:bodyPr>
+                    <a:p>
+                      <a:pPr>
+                        <a:defRPr lang="ko-KR" altLang="en-US"/>
+                      </a:pPr>
+                      <a:endParaRPr lang="ko-KR" altLang="en-US" sz="100"/>
+                    </a:p>
+                  </a:txBody>
+                  <a:tcPr marL="91440" marR="91440"/>
+                </a:tc>
+                <a:tc>
+                  <a:txBody>
+                    <a:bodyPr vert="horz" wrap="square" lIns="91440" tIns="45720" rIns="91440" bIns="45720" anchor="t" anchorCtr="0">
+                      <a:spAutoFit/>
+                    </a:bodyPr>
+                    <a:p>
+                      <a:pPr>
+                        <a:defRPr lang="ko-KR" altLang="en-US"/>
+                      </a:pPr>
+                      <a:endParaRPr lang="ko-KR" altLang="en-US" sz="100"/>
+                    </a:p>
+                  </a:txBody>
+                  <a:tcPr marL="91440" marR="91440"/>
+                </a:tc>
+                <a:tc>
+                  <a:txBody>
+                    <a:bodyPr vert="horz" wrap="square" lIns="91440" tIns="45720" rIns="91440" bIns="45720" anchor="t" anchorCtr="0">
+                      <a:spAutoFit/>
+                    </a:bodyPr>
+                    <a:p>
+                      <a:pPr>
+                        <a:defRPr lang="ko-KR" altLang="en-US"/>
+                      </a:pPr>
+                      <a:endParaRPr lang="ko-KR" altLang="en-US" sz="100"/>
+                    </a:p>
+                  </a:txBody>
+                  <a:tcPr marL="91440" marR="91440"/>
+                </a:tc>
+                <a:tc>
+                  <a:txBody>
+                    <a:bodyPr vert="horz" wrap="square" lIns="91440" tIns="45720" rIns="91440" bIns="45720" anchor="t" anchorCtr="0">
+                      <a:spAutoFit/>
+                    </a:bodyPr>
+                    <a:p>
+                      <a:pPr>
+                        <a:defRPr lang="ko-KR" altLang="en-US"/>
+                      </a:pPr>
+                      <a:endParaRPr lang="ko-KR" altLang="en-US" sz="100"/>
+                    </a:p>
+                  </a:txBody>
+                  <a:tcPr marL="91440" marR="91440"/>
+                </a:tc>
+                <a:tc>
+                  <a:txBody>
+                    <a:bodyPr vert="horz" wrap="square" lIns="91440" tIns="45720" rIns="91440" bIns="45720" anchor="t" anchorCtr="0">
+                      <a:spAutoFit/>
+                    </a:bodyPr>
+                    <a:p>
+                      <a:pPr>
+                        <a:defRPr lang="ko-KR" altLang="en-US"/>
+                      </a:pPr>
+                      <a:endParaRPr lang="ko-KR" altLang="en-US" sz="100"/>
+                    </a:p>
+                  </a:txBody>
+                  <a:tcPr marL="91440" marR="91440"/>
+                </a:tc>
+                <a:tc>
+                  <a:txBody>
+                    <a:bodyPr vert="horz" wrap="square" lIns="91440" tIns="45720" rIns="91440" bIns="45720" anchor="t" anchorCtr="0">
+                      <a:spAutoFit/>
+                    </a:bodyPr>
+                    <a:p>
+                      <a:pPr>
+                        <a:defRPr lang="ko-KR" altLang="en-US"/>
+                      </a:pPr>
+                      <a:endParaRPr lang="ko-KR" altLang="en-US" sz="100"/>
+                    </a:p>
+                  </a:txBody>
+                  <a:tcPr marL="91440" marR="91440"/>
+                </a:tc>
+                <a:tc>
+                  <a:txBody>
+                    <a:bodyPr vert="horz" wrap="square" lIns="91440" tIns="45720" rIns="91440" bIns="45720" anchor="t" anchorCtr="0">
+                      <a:spAutoFit/>
+                    </a:bodyPr>
+                    <a:p>
+                      <a:pPr>
+                        <a:defRPr lang="ko-KR" altLang="en-US"/>
+                      </a:pPr>
+                      <a:endParaRPr lang="ko-KR" altLang="en-US" sz="100"/>
+                    </a:p>
+                  </a:txBody>
+                  <a:tcPr marL="91440" marR="91440"/>
+                </a:tc>
+                <a:tc>
+                  <a:txBody>
+                    <a:bodyPr vert="horz" wrap="square" lIns="91440" tIns="45720" rIns="91440" bIns="45720" anchor="t" anchorCtr="0">
+                      <a:spAutoFit/>
+                    </a:bodyPr>
+                    <a:p>
+                      <a:pPr>
+                        <a:defRPr lang="ko-KR" altLang="en-US"/>
+                      </a:pPr>
+                      <a:endParaRPr lang="ko-KR" altLang="en-US" sz="100"/>
+                    </a:p>
+                  </a:txBody>
+                  <a:tcPr marL="91440" marR="91440"/>
+                </a:tc>
+                <a:tc>
+                  <a:txBody>
+                    <a:bodyPr vert="horz" wrap="square" lIns="91440" tIns="45720" rIns="91440" bIns="45720" anchor="t" anchorCtr="0">
+                      <a:spAutoFit/>
+                    </a:bodyPr>
+                    <a:p>
+                      <a:pPr>
+                        <a:defRPr lang="ko-KR" altLang="en-US"/>
+                      </a:pPr>
+                      <a:endParaRPr lang="ko-KR" altLang="en-US" sz="100"/>
+                    </a:p>
+                  </a:txBody>
+                  <a:tcPr marL="91440" marR="91440"/>
+                </a:tc>
+              </a:tr>
+              <a:tr h="287999">
+                <a:tc>
+                  <a:txBody>
+                    <a:bodyPr vert="horz" wrap="square" lIns="91440" tIns="45720" rIns="91440" bIns="45720" anchor="t" anchorCtr="0">
+                      <a:spAutoFit/>
+                    </a:bodyPr>
+                    <a:p>
+                      <a:pPr>
+                        <a:defRPr lang="ko-KR" altLang="en-US"/>
+                      </a:pPr>
+                      <a:endParaRPr lang="ko-KR" altLang="en-US" sz="100"/>
+                    </a:p>
+                  </a:txBody>
+                  <a:tcPr marL="91440" marR="91440"/>
+                </a:tc>
+                <a:tc>
+                  <a:txBody>
+                    <a:bodyPr vert="horz" wrap="square" lIns="91440" tIns="45720" rIns="91440" bIns="45720" anchor="t" anchorCtr="0">
+                      <a:spAutoFit/>
+                    </a:bodyPr>
+                    <a:p>
+                      <a:pPr>
+                        <a:defRPr lang="ko-KR" altLang="en-US"/>
+                      </a:pPr>
+                      <a:endParaRPr lang="ko-KR" altLang="en-US" sz="100"/>
+                    </a:p>
+                  </a:txBody>
+                  <a:tcPr marL="91440" marR="91440"/>
+                </a:tc>
+                <a:tc>
+                  <a:txBody>
+                    <a:bodyPr vert="horz" wrap="square" lIns="91440" tIns="45720" rIns="91440" bIns="45720" anchor="t" anchorCtr="0">
+                      <a:spAutoFit/>
+                    </a:bodyPr>
+                    <a:p>
+                      <a:pPr>
+                        <a:defRPr lang="ko-KR" altLang="en-US"/>
+                      </a:pPr>
+                      <a:endParaRPr lang="ko-KR" altLang="en-US" sz="100"/>
+                    </a:p>
+                  </a:txBody>
+                  <a:tcPr marL="91440" marR="91440"/>
+                </a:tc>
+                <a:tc>
+                  <a:txBody>
+                    <a:bodyPr vert="horz" wrap="square" lIns="91440" tIns="45720" rIns="91440" bIns="45720" anchor="t" anchorCtr="0">
+                      <a:spAutoFit/>
+                    </a:bodyPr>
+                    <a:p>
+                      <a:pPr>
+                        <a:defRPr lang="ko-KR" altLang="en-US"/>
+                      </a:pPr>
+                      <a:endParaRPr lang="ko-KR" altLang="en-US" sz="100"/>
+                    </a:p>
+                  </a:txBody>
+                  <a:tcPr marL="91440" marR="91440"/>
+                </a:tc>
+                <a:tc>
+                  <a:txBody>
+                    <a:bodyPr vert="horz" wrap="square" lIns="91440" tIns="45720" rIns="91440" bIns="45720" anchor="t" anchorCtr="0">
+                      <a:spAutoFit/>
+                    </a:bodyPr>
+                    <a:p>
+                      <a:pPr>
+                        <a:defRPr lang="ko-KR" altLang="en-US"/>
+                      </a:pPr>
+                      <a:endParaRPr lang="ko-KR" altLang="en-US" sz="100"/>
+                    </a:p>
+                  </a:txBody>
+                  <a:tcPr marL="91440" marR="91440"/>
+                </a:tc>
+                <a:tc>
+                  <a:txBody>
+                    <a:bodyPr vert="horz" wrap="square" lIns="91440" tIns="45720" rIns="91440" bIns="45720" anchor="t" anchorCtr="0">
+                      <a:spAutoFit/>
+                    </a:bodyPr>
+                    <a:p>
+                      <a:pPr>
+                        <a:defRPr lang="ko-KR" altLang="en-US"/>
+                      </a:pPr>
+                      <a:endParaRPr lang="ko-KR" altLang="en-US" sz="100"/>
+                    </a:p>
+                  </a:txBody>
+                  <a:tcPr marL="91440" marR="91440"/>
+                </a:tc>
+                <a:tc>
+                  <a:txBody>
+                    <a:bodyPr vert="horz" wrap="square" lIns="91440" tIns="45720" rIns="91440" bIns="45720" anchor="t" anchorCtr="0">
+                      <a:spAutoFit/>
+                    </a:bodyPr>
+                    <a:p>
+                      <a:pPr>
+                        <a:defRPr lang="ko-KR" altLang="en-US"/>
+                      </a:pPr>
+                      <a:endParaRPr lang="ko-KR" altLang="en-US" sz="100"/>
+                    </a:p>
+                  </a:txBody>
+                  <a:tcPr marL="91440" marR="91440"/>
+                </a:tc>
+                <a:tc>
+                  <a:txBody>
+                    <a:bodyPr vert="horz" wrap="square" lIns="91440" tIns="45720" rIns="91440" bIns="45720" anchor="t" anchorCtr="0">
+                      <a:spAutoFit/>
+                    </a:bodyPr>
+                    <a:p>
+                      <a:pPr>
+                        <a:defRPr lang="ko-KR" altLang="en-US"/>
+                      </a:pPr>
+                      <a:endParaRPr lang="ko-KR" altLang="en-US" sz="100"/>
+                    </a:p>
+                  </a:txBody>
+                  <a:tcPr marL="91440" marR="91440"/>
+                </a:tc>
+                <a:tc>
+                  <a:txBody>
+                    <a:bodyPr vert="horz" wrap="square" lIns="91440" tIns="45720" rIns="91440" bIns="45720" anchor="t" anchorCtr="0">
+                      <a:spAutoFit/>
+                    </a:bodyPr>
+                    <a:p>
+                      <a:pPr>
+                        <a:defRPr lang="ko-KR" altLang="en-US"/>
+                      </a:pPr>
+                      <a:endParaRPr lang="ko-KR" altLang="en-US" sz="100"/>
+                    </a:p>
+                  </a:txBody>
+                  <a:tcPr marL="91440" marR="91440"/>
+                </a:tc>
+                <a:tc>
+                  <a:txBody>
+                    <a:bodyPr vert="horz" wrap="square" lIns="91440" tIns="45720" rIns="91440" bIns="45720" anchor="t" anchorCtr="0">
+                      <a:spAutoFit/>
+                    </a:bodyPr>
+                    <a:p>
+                      <a:pPr>
+                        <a:defRPr lang="ko-KR" altLang="en-US"/>
+                      </a:pPr>
+                      <a:endParaRPr lang="ko-KR" altLang="en-US" sz="100"/>
+                    </a:p>
+                  </a:txBody>
+                  <a:tcPr marL="91440" marR="91440"/>
+                </a:tc>
+              </a:tr>
+              <a:tr h="287999">
+                <a:tc>
+                  <a:txBody>
+                    <a:bodyPr vert="horz" wrap="square" lIns="91440" tIns="45720" rIns="91440" bIns="45720" anchor="t" anchorCtr="0">
+                      <a:spAutoFit/>
+                    </a:bodyPr>
+                    <a:p>
+                      <a:pPr>
+                        <a:defRPr lang="ko-KR" altLang="en-US"/>
+                      </a:pPr>
+                      <a:endParaRPr lang="ko-KR" altLang="en-US" sz="100"/>
+                    </a:p>
+                  </a:txBody>
+                  <a:tcPr marL="91440" marR="91440"/>
+                </a:tc>
+                <a:tc>
+                  <a:txBody>
+                    <a:bodyPr vert="horz" wrap="square" lIns="91440" tIns="45720" rIns="91440" bIns="45720" anchor="t" anchorCtr="0">
+                      <a:spAutoFit/>
+                    </a:bodyPr>
+                    <a:p>
+                      <a:pPr>
+                        <a:defRPr lang="ko-KR" altLang="en-US"/>
+                      </a:pPr>
+                      <a:endParaRPr lang="ko-KR" altLang="en-US" sz="100"/>
+                    </a:p>
+                  </a:txBody>
+                  <a:tcPr marL="91440" marR="91440"/>
+                </a:tc>
+                <a:tc>
+                  <a:txBody>
+                    <a:bodyPr vert="horz" wrap="square" lIns="91440" tIns="45720" rIns="91440" bIns="45720" anchor="t" anchorCtr="0">
+                      <a:spAutoFit/>
+                    </a:bodyPr>
+                    <a:p>
+                      <a:pPr>
+                        <a:defRPr lang="ko-KR" altLang="en-US"/>
+                      </a:pPr>
+                      <a:endParaRPr lang="ko-KR" altLang="en-US" sz="100"/>
+                    </a:p>
+                  </a:txBody>
+                  <a:tcPr marL="91440" marR="91440"/>
+                </a:tc>
+                <a:tc>
+                  <a:txBody>
+                    <a:bodyPr vert="horz" wrap="square" lIns="91440" tIns="45720" rIns="91440" bIns="45720" anchor="t" anchorCtr="0">
+                      <a:spAutoFit/>
+                    </a:bodyPr>
+                    <a:p>
+                      <a:pPr>
+                        <a:defRPr lang="ko-KR" altLang="en-US"/>
+                      </a:pPr>
+                      <a:endParaRPr lang="ko-KR" altLang="en-US" sz="100"/>
+                    </a:p>
+                  </a:txBody>
+                  <a:tcPr marL="91440" marR="91440"/>
+                </a:tc>
+                <a:tc>
+                  <a:txBody>
+                    <a:bodyPr vert="horz" wrap="square" lIns="91440" tIns="45720" rIns="91440" bIns="45720" anchor="t" anchorCtr="0">
+                      <a:spAutoFit/>
+                    </a:bodyPr>
+                    <a:p>
+                      <a:pPr>
+                        <a:defRPr lang="ko-KR" altLang="en-US"/>
+                      </a:pPr>
+                      <a:endParaRPr lang="ko-KR" altLang="en-US" sz="100"/>
+                    </a:p>
+                  </a:txBody>
+                  <a:tcPr marL="91440" marR="91440"/>
+                </a:tc>
+                <a:tc>
+                  <a:txBody>
+                    <a:bodyPr vert="horz" wrap="square" lIns="91440" tIns="45720" rIns="91440" bIns="45720" anchor="t" anchorCtr="0">
+                      <a:spAutoFit/>
+                    </a:bodyPr>
+                    <a:p>
+                      <a:pPr>
+                        <a:defRPr lang="ko-KR" altLang="en-US"/>
+                      </a:pPr>
+                      <a:endParaRPr lang="ko-KR" altLang="en-US" sz="100"/>
+                    </a:p>
+                  </a:txBody>
+                  <a:tcPr marL="91440" marR="91440"/>
+                </a:tc>
+                <a:tc>
+                  <a:txBody>
+                    <a:bodyPr vert="horz" wrap="square" lIns="91440" tIns="45720" rIns="91440" bIns="45720" anchor="t" anchorCtr="0">
+                      <a:spAutoFit/>
+                    </a:bodyPr>
+                    <a:p>
+                      <a:pPr>
+                        <a:defRPr lang="ko-KR" altLang="en-US"/>
+                      </a:pPr>
+                      <a:endParaRPr lang="ko-KR" altLang="en-US" sz="100"/>
+                    </a:p>
+                  </a:txBody>
+                  <a:tcPr marL="91440" marR="91440"/>
+                </a:tc>
+                <a:tc>
+                  <a:txBody>
+                    <a:bodyPr vert="horz" wrap="square" lIns="91440" tIns="45720" rIns="91440" bIns="45720" anchor="t" anchorCtr="0">
+                      <a:spAutoFit/>
+                    </a:bodyPr>
+                    <a:p>
+                      <a:pPr>
+                        <a:defRPr lang="ko-KR" altLang="en-US"/>
+                      </a:pPr>
+                      <a:endParaRPr lang="ko-KR" altLang="en-US" sz="100"/>
+                    </a:p>
+                  </a:txBody>
+                  <a:tcPr marL="91440" marR="91440"/>
+                </a:tc>
+                <a:tc>
+                  <a:txBody>
+                    <a:bodyPr vert="horz" wrap="square" lIns="91440" tIns="45720" rIns="91440" bIns="45720" anchor="t" anchorCtr="0">
+                      <a:spAutoFit/>
+                    </a:bodyPr>
+                    <a:p>
+                      <a:pPr>
+                        <a:defRPr lang="ko-KR" altLang="en-US"/>
+                      </a:pPr>
+                      <a:endParaRPr lang="ko-KR" altLang="en-US" sz="100"/>
+                    </a:p>
+                  </a:txBody>
+                  <a:tcPr marL="91440" marR="91440"/>
+                </a:tc>
+                <a:tc>
+                  <a:txBody>
+                    <a:bodyPr vert="horz" wrap="square" lIns="91440" tIns="45720" rIns="91440" bIns="45720" anchor="t" anchorCtr="0">
+                      <a:spAutoFit/>
+                    </a:bodyPr>
+                    <a:p>
+                      <a:pPr>
+                        <a:defRPr lang="ko-KR" altLang="en-US"/>
+                      </a:pPr>
+                      <a:endParaRPr lang="ko-KR" altLang="en-US" sz="100"/>
+                    </a:p>
+                  </a:txBody>
+                  <a:tcPr marL="91440" marR="91440"/>
+                </a:tc>
+              </a:tr>
+              <a:tr h="287999">
+                <a:tc>
+                  <a:txBody>
+                    <a:bodyPr vert="horz" wrap="square" lIns="91440" tIns="45720" rIns="91440" bIns="45720" anchor="t" anchorCtr="0">
+                      <a:spAutoFit/>
+                    </a:bodyPr>
+                    <a:p>
+                      <a:pPr>
+                        <a:defRPr lang="ko-KR" altLang="en-US"/>
+                      </a:pPr>
+                      <a:endParaRPr lang="ko-KR" altLang="en-US" sz="100"/>
+                    </a:p>
+                  </a:txBody>
+                  <a:tcPr marL="91440" marR="91440"/>
+                </a:tc>
+                <a:tc>
+                  <a:txBody>
+                    <a:bodyPr vert="horz" wrap="square" lIns="91440" tIns="45720" rIns="91440" bIns="45720" anchor="t" anchorCtr="0">
+                      <a:spAutoFit/>
+                    </a:bodyPr>
+                    <a:p>
+                      <a:pPr>
+                        <a:defRPr lang="ko-KR" altLang="en-US"/>
+                      </a:pPr>
+                      <a:endParaRPr lang="ko-KR" altLang="en-US" sz="100"/>
+                    </a:p>
+                  </a:txBody>
+                  <a:tcPr marL="91440" marR="91440"/>
+                </a:tc>
+                <a:tc>
+                  <a:txBody>
+                    <a:bodyPr vert="horz" wrap="square" lIns="91440" tIns="45720" rIns="91440" bIns="45720" anchor="t" anchorCtr="0">
+                      <a:spAutoFit/>
+                    </a:bodyPr>
+                    <a:p>
+                      <a:pPr>
+                        <a:defRPr lang="ko-KR" altLang="en-US"/>
+                      </a:pPr>
+                      <a:endParaRPr lang="ko-KR" altLang="en-US" sz="100"/>
+                    </a:p>
+                  </a:txBody>
+                  <a:tcPr marL="91440" marR="91440"/>
+                </a:tc>
+                <a:tc>
+                  <a:txBody>
+                    <a:bodyPr vert="horz" wrap="square" lIns="91440" tIns="45720" rIns="91440" bIns="45720" anchor="t" anchorCtr="0">
+                      <a:spAutoFit/>
+                    </a:bodyPr>
+                    <a:p>
+                      <a:pPr>
+                        <a:defRPr lang="ko-KR" altLang="en-US"/>
+                      </a:pPr>
+                      <a:endParaRPr lang="ko-KR" altLang="en-US" sz="100"/>
+                    </a:p>
+                  </a:txBody>
+                  <a:tcPr marL="91440" marR="91440"/>
+                </a:tc>
+                <a:tc>
+                  <a:txBody>
+                    <a:bodyPr vert="horz" wrap="square" lIns="91440" tIns="45720" rIns="91440" bIns="45720" anchor="t" anchorCtr="0">
+                      <a:spAutoFit/>
+                    </a:bodyPr>
+                    <a:p>
+                      <a:pPr>
+                        <a:defRPr lang="ko-KR" altLang="en-US"/>
+                      </a:pPr>
+                      <a:endParaRPr lang="ko-KR" altLang="en-US" sz="100"/>
+                    </a:p>
+                  </a:txBody>
+                  <a:tcPr marL="91440" marR="91440"/>
+                </a:tc>
+                <a:tc>
+                  <a:txBody>
+                    <a:bodyPr vert="horz" wrap="square" lIns="91440" tIns="45720" rIns="91440" bIns="45720" anchor="t" anchorCtr="0">
+                      <a:spAutoFit/>
+                    </a:bodyPr>
+                    <a:p>
+                      <a:pPr>
+                        <a:defRPr lang="ko-KR" altLang="en-US"/>
+                      </a:pPr>
+                      <a:endParaRPr lang="ko-KR" altLang="en-US" sz="100"/>
+                    </a:p>
+                  </a:txBody>
+                  <a:tcPr marL="91440" marR="91440"/>
+                </a:tc>
+                <a:tc>
+                  <a:txBody>
+                    <a:bodyPr vert="horz" wrap="square" lIns="91440" tIns="45720" rIns="91440" bIns="45720" anchor="t" anchorCtr="0">
+                      <a:spAutoFit/>
+                    </a:bodyPr>
+                    <a:p>
+                      <a:pPr>
+                        <a:defRPr lang="ko-KR" altLang="en-US"/>
+                      </a:pPr>
+                      <a:endParaRPr lang="ko-KR" altLang="en-US" sz="100"/>
+                    </a:p>
+                  </a:txBody>
+                  <a:tcPr marL="91440" marR="91440"/>
+                </a:tc>
+                <a:tc>
+                  <a:txBody>
+                    <a:bodyPr vert="horz" wrap="square" lIns="91440" tIns="45720" rIns="91440" bIns="45720" anchor="t" anchorCtr="0">
+                      <a:spAutoFit/>
+                    </a:bodyPr>
+                    <a:p>
+                      <a:pPr>
+                        <a:defRPr lang="ko-KR" altLang="en-US"/>
+                      </a:pPr>
+                      <a:endParaRPr lang="ko-KR" altLang="en-US" sz="100"/>
+                    </a:p>
+                  </a:txBody>
+                  <a:tcPr marL="91440" marR="91440"/>
+                </a:tc>
+                <a:tc>
+                  <a:txBody>
+                    <a:bodyPr vert="horz" wrap="square" lIns="91440" tIns="45720" rIns="91440" bIns="45720" anchor="t" anchorCtr="0">
+                      <a:spAutoFit/>
+                    </a:bodyPr>
+                    <a:p>
+                      <a:pPr>
+                        <a:defRPr lang="ko-KR" altLang="en-US"/>
+                      </a:pPr>
+                      <a:endParaRPr lang="ko-KR" altLang="en-US" sz="100"/>
+                    </a:p>
+                  </a:txBody>
+                  <a:tcPr marL="91440" marR="91440"/>
+                </a:tc>
+                <a:tc>
+                  <a:txBody>
+                    <a:bodyPr vert="horz" wrap="square" lIns="91440" tIns="45720" rIns="91440" bIns="45720" anchor="t" anchorCtr="0">
+                      <a:spAutoFit/>
+                    </a:bodyPr>
+                    <a:p>
+                      <a:pPr>
+                        <a:defRPr lang="ko-KR" altLang="en-US"/>
+                      </a:pPr>
+                      <a:endParaRPr lang="ko-KR" altLang="en-US" sz="100"/>
+                    </a:p>
+                  </a:txBody>
+                  <a:tcPr marL="91440" marR="91440"/>
+                </a:tc>
+              </a:tr>
+              <a:tr h="287999">
+                <a:tc>
+                  <a:txBody>
+                    <a:bodyPr vert="horz" wrap="square" lIns="91440" tIns="45720" rIns="91440" bIns="45720" anchor="t" anchorCtr="0">
+                      <a:spAutoFit/>
+                    </a:bodyPr>
+                    <a:p>
+                      <a:pPr>
+                        <a:defRPr lang="ko-KR" altLang="en-US"/>
+                      </a:pPr>
+                      <a:endParaRPr lang="ko-KR" altLang="en-US" sz="100"/>
+                    </a:p>
+                  </a:txBody>
+                  <a:tcPr marL="91440" marR="91440"/>
+                </a:tc>
+                <a:tc>
+                  <a:txBody>
+                    <a:bodyPr vert="horz" wrap="square" lIns="91440" tIns="45720" rIns="91440" bIns="45720" anchor="t" anchorCtr="0">
+                      <a:spAutoFit/>
+                    </a:bodyPr>
+                    <a:p>
+                      <a:pPr>
+                        <a:defRPr lang="ko-KR" altLang="en-US"/>
+                      </a:pPr>
+                      <a:endParaRPr lang="ko-KR" altLang="en-US" sz="100"/>
+                    </a:p>
+                  </a:txBody>
+                  <a:tcPr marL="91440" marR="91440"/>
+                </a:tc>
+                <a:tc>
+                  <a:txBody>
+                    <a:bodyPr vert="horz" wrap="square" lIns="91440" tIns="45720" rIns="91440" bIns="45720" anchor="t" anchorCtr="0">
+                      <a:spAutoFit/>
+                    </a:bodyPr>
+                    <a:p>
+                      <a:pPr>
+                        <a:defRPr lang="ko-KR" altLang="en-US"/>
+                      </a:pPr>
+                      <a:endParaRPr lang="ko-KR" altLang="en-US" sz="100"/>
+                    </a:p>
+                  </a:txBody>
+                  <a:tcPr marL="91440" marR="91440"/>
+                </a:tc>
+                <a:tc>
+                  <a:txBody>
+                    <a:bodyPr vert="horz" wrap="square" lIns="91440" tIns="45720" rIns="91440" bIns="45720" anchor="t" anchorCtr="0">
+                      <a:spAutoFit/>
+                    </a:bodyPr>
+                    <a:p>
+                      <a:pPr>
+                        <a:defRPr lang="ko-KR" altLang="en-US"/>
+                      </a:pPr>
+                      <a:endParaRPr lang="ko-KR" altLang="en-US" sz="100"/>
+                    </a:p>
+                  </a:txBody>
+                  <a:tcPr marL="91440" marR="91440"/>
+                </a:tc>
+                <a:tc>
+                  <a:txBody>
+                    <a:bodyPr vert="horz" wrap="square" lIns="91440" tIns="45720" rIns="91440" bIns="45720" anchor="t" anchorCtr="0">
+                      <a:spAutoFit/>
+                    </a:bodyPr>
+                    <a:p>
+                      <a:pPr>
+                        <a:defRPr lang="ko-KR" altLang="en-US"/>
+                      </a:pPr>
+                      <a:endParaRPr lang="ko-KR" altLang="en-US" sz="100"/>
+                    </a:p>
+                  </a:txBody>
+                  <a:tcPr marL="91440" marR="91440"/>
+                </a:tc>
+                <a:tc>
+                  <a:txBody>
+                    <a:bodyPr vert="horz" wrap="square" lIns="91440" tIns="45720" rIns="91440" bIns="45720" anchor="t" anchorCtr="0">
+                      <a:spAutoFit/>
+                    </a:bodyPr>
+                    <a:p>
+                      <a:pPr>
+                        <a:defRPr lang="ko-KR" altLang="en-US"/>
+                      </a:pPr>
+                      <a:endParaRPr lang="ko-KR" altLang="en-US" sz="100"/>
+                    </a:p>
+                  </a:txBody>
+                  <a:tcPr marL="91440" marR="91440"/>
+                </a:tc>
+                <a:tc>
+                  <a:txBody>
+                    <a:bodyPr vert="horz" wrap="square" lIns="91440" tIns="45720" rIns="91440" bIns="45720" anchor="t" anchorCtr="0">
+                      <a:spAutoFit/>
+                    </a:bodyPr>
+                    <a:p>
+                      <a:pPr>
+                        <a:defRPr lang="ko-KR" altLang="en-US"/>
+                      </a:pPr>
+                      <a:endParaRPr lang="ko-KR" altLang="en-US" sz="100"/>
+                    </a:p>
+                  </a:txBody>
+                  <a:tcPr marL="91440" marR="91440"/>
+                </a:tc>
+                <a:tc>
+                  <a:txBody>
+                    <a:bodyPr vert="horz" wrap="square" lIns="91440" tIns="45720" rIns="91440" bIns="45720" anchor="t" anchorCtr="0">
+                      <a:spAutoFit/>
+                    </a:bodyPr>
+                    <a:p>
+                      <a:pPr>
+                        <a:defRPr lang="ko-KR" altLang="en-US"/>
+                      </a:pPr>
+                      <a:endParaRPr lang="ko-KR" altLang="en-US" sz="100"/>
+                    </a:p>
+                  </a:txBody>
+                  <a:tcPr marL="91440" marR="91440"/>
+                </a:tc>
+                <a:tc>
+                  <a:txBody>
+                    <a:bodyPr vert="horz" wrap="square" lIns="91440" tIns="45720" rIns="91440" bIns="45720" anchor="t" anchorCtr="0">
+                      <a:spAutoFit/>
+                    </a:bodyPr>
+                    <a:p>
+                      <a:pPr>
+                        <a:defRPr lang="ko-KR" altLang="en-US"/>
+                      </a:pPr>
+                      <a:endParaRPr lang="ko-KR" altLang="en-US" sz="100"/>
+                    </a:p>
+                  </a:txBody>
+                  <a:tcPr marL="91440" marR="91440"/>
+                </a:tc>
+                <a:tc>
+                  <a:txBody>
+                    <a:bodyPr vert="horz" wrap="square" lIns="91440" tIns="45720" rIns="91440" bIns="45720" anchor="t" anchorCtr="0">
+                      <a:spAutoFit/>
+                    </a:bodyPr>
+                    <a:p>
+                      <a:pPr>
+                        <a:defRPr lang="ko-KR" altLang="en-US"/>
+                      </a:pPr>
+                      <a:endParaRPr lang="ko-KR" altLang="en-US" sz="100"/>
+                    </a:p>
+                  </a:txBody>
+                  <a:tcPr marL="91440" marR="91440"/>
+                </a:tc>
+              </a:tr>
+              <a:tr h="287999">
+                <a:tc>
+                  <a:txBody>
+                    <a:bodyPr vert="horz" wrap="square" lIns="91440" tIns="45720" rIns="91440" bIns="45720" anchor="t" anchorCtr="0">
+                      <a:spAutoFit/>
+                    </a:bodyPr>
+                    <a:p>
+                      <a:pPr>
+                        <a:defRPr lang="ko-KR" altLang="en-US"/>
+                      </a:pPr>
+                      <a:endParaRPr lang="ko-KR" altLang="en-US" sz="100"/>
+                    </a:p>
+                  </a:txBody>
+                  <a:tcPr marL="91440" marR="91440"/>
+                </a:tc>
+                <a:tc>
+                  <a:txBody>
+                    <a:bodyPr vert="horz" wrap="square" lIns="91440" tIns="45720" rIns="91440" bIns="45720" anchor="t" anchorCtr="0">
+                      <a:spAutoFit/>
+                    </a:bodyPr>
+                    <a:p>
+                      <a:pPr>
+                        <a:defRPr lang="ko-KR" altLang="en-US"/>
+                      </a:pPr>
+                      <a:endParaRPr lang="ko-KR" altLang="en-US" sz="100"/>
+                    </a:p>
+                  </a:txBody>
+                  <a:tcPr marL="91440" marR="91440"/>
+                </a:tc>
+                <a:tc>
+                  <a:txBody>
+                    <a:bodyPr vert="horz" wrap="square" lIns="91440" tIns="45720" rIns="91440" bIns="45720" anchor="t" anchorCtr="0">
+                      <a:spAutoFit/>
+                    </a:bodyPr>
+                    <a:p>
+                      <a:pPr>
+                        <a:defRPr lang="ko-KR" altLang="en-US"/>
+                      </a:pPr>
+                      <a:endParaRPr lang="ko-KR" altLang="en-US" sz="100"/>
+                    </a:p>
+                  </a:txBody>
+                  <a:tcPr marL="91440" marR="91440"/>
+                </a:tc>
+                <a:tc>
+                  <a:txBody>
+                    <a:bodyPr vert="horz" wrap="square" lIns="91440" tIns="45720" rIns="91440" bIns="45720" anchor="t" anchorCtr="0">
+                      <a:spAutoFit/>
+                    </a:bodyPr>
+                    <a:p>
+                      <a:pPr>
+                        <a:defRPr lang="ko-KR" altLang="en-US"/>
+                      </a:pPr>
+                      <a:endParaRPr lang="ko-KR" altLang="en-US" sz="100"/>
+                    </a:p>
+                  </a:txBody>
+                  <a:tcPr marL="91440" marR="91440"/>
+                </a:tc>
+                <a:tc>
+                  <a:txBody>
+                    <a:bodyPr vert="horz" wrap="square" lIns="91440" tIns="45720" rIns="91440" bIns="45720" anchor="t" anchorCtr="0">
+                      <a:spAutoFit/>
+                    </a:bodyPr>
+                    <a:p>
+                      <a:pPr>
+                        <a:defRPr lang="ko-KR" altLang="en-US"/>
+                      </a:pPr>
+                      <a:endParaRPr lang="ko-KR" altLang="en-US" sz="100"/>
+                    </a:p>
+                  </a:txBody>
+                  <a:tcPr marL="91440" marR="91440"/>
+                </a:tc>
+                <a:tc>
+                  <a:txBody>
+                    <a:bodyPr vert="horz" wrap="square" lIns="91440" tIns="45720" rIns="91440" bIns="45720" anchor="t" anchorCtr="0">
+                      <a:spAutoFit/>
+                    </a:bodyPr>
+                    <a:p>
+                      <a:pPr>
+                        <a:defRPr lang="ko-KR" altLang="en-US"/>
+                      </a:pPr>
+                      <a:endParaRPr lang="ko-KR" altLang="en-US" sz="100"/>
+                    </a:p>
+                  </a:txBody>
+                  <a:tcPr marL="91440" marR="91440"/>
+                </a:tc>
+                <a:tc>
+                  <a:txBody>
+                    <a:bodyPr vert="horz" wrap="square" lIns="91440" tIns="45720" rIns="91440" bIns="45720" anchor="t" anchorCtr="0">
+                      <a:spAutoFit/>
+                    </a:bodyPr>
+                    <a:p>
+                      <a:pPr>
+                        <a:defRPr lang="ko-KR" altLang="en-US"/>
+                      </a:pPr>
+                      <a:endParaRPr lang="ko-KR" altLang="en-US" sz="100"/>
+                    </a:p>
+                  </a:txBody>
+                  <a:tcPr marL="91440" marR="91440"/>
+                </a:tc>
+                <a:tc>
+                  <a:txBody>
+                    <a:bodyPr vert="horz" wrap="square" lIns="91440" tIns="45720" rIns="91440" bIns="45720" anchor="t" anchorCtr="0">
+                      <a:spAutoFit/>
+                    </a:bodyPr>
+                    <a:p>
+                      <a:pPr>
+                        <a:defRPr lang="ko-KR" altLang="en-US"/>
+                      </a:pPr>
+                      <a:endParaRPr lang="ko-KR" altLang="en-US" sz="100"/>
+                    </a:p>
+                  </a:txBody>
+                  <a:tcPr marL="91440" marR="91440"/>
+                </a:tc>
+                <a:tc>
+                  <a:txBody>
+                    <a:bodyPr vert="horz" wrap="square" lIns="91440" tIns="45720" rIns="91440" bIns="45720" anchor="t" anchorCtr="0">
+                      <a:spAutoFit/>
+                    </a:bodyPr>
+                    <a:p>
+                      <a:pPr>
+                        <a:defRPr lang="ko-KR" altLang="en-US"/>
+                      </a:pPr>
+                      <a:endParaRPr lang="ko-KR" altLang="en-US" sz="100"/>
+                    </a:p>
+                  </a:txBody>
+                  <a:tcPr marL="91440" marR="91440"/>
+                </a:tc>
+                <a:tc>
+                  <a:txBody>
+                    <a:bodyPr vert="horz" wrap="square" lIns="91440" tIns="45720" rIns="91440" bIns="45720" anchor="t" anchorCtr="0">
+                      <a:spAutoFit/>
+                    </a:bodyPr>
+                    <a:p>
+                      <a:pPr>
+                        <a:defRPr lang="ko-KR" altLang="en-US"/>
+                      </a:pPr>
+                      <a:endParaRPr lang="ko-KR" altLang="en-US" sz="100"/>
+                    </a:p>
+                  </a:txBody>
+                  <a:tcPr marL="91440" marR="91440"/>
+                </a:tc>
+              </a:tr>
+              <a:tr h="287999">
+                <a:tc>
+                  <a:txBody>
+                    <a:bodyPr vert="horz" wrap="square" lIns="91440" tIns="45720" rIns="91440" bIns="45720" anchor="t" anchorCtr="0">
+                      <a:spAutoFit/>
+                    </a:bodyPr>
+                    <a:p>
+                      <a:pPr>
+                        <a:defRPr lang="ko-KR" altLang="en-US"/>
+                      </a:pPr>
+                      <a:endParaRPr lang="ko-KR" altLang="en-US" sz="100"/>
+                    </a:p>
+                  </a:txBody>
+                  <a:tcPr marL="91440" marR="91440"/>
+                </a:tc>
+                <a:tc>
+                  <a:txBody>
+                    <a:bodyPr vert="horz" wrap="square" lIns="91440" tIns="45720" rIns="91440" bIns="45720" anchor="t" anchorCtr="0">
+                      <a:spAutoFit/>
+                    </a:bodyPr>
+                    <a:p>
+                      <a:pPr>
+                        <a:defRPr lang="ko-KR" altLang="en-US"/>
+                      </a:pPr>
+                      <a:endParaRPr lang="ko-KR" altLang="en-US" sz="100"/>
+                    </a:p>
+                  </a:txBody>
+                  <a:tcPr marL="91440" marR="91440"/>
+                </a:tc>
+                <a:tc>
+                  <a:txBody>
+                    <a:bodyPr vert="horz" wrap="square" lIns="91440" tIns="45720" rIns="91440" bIns="45720" anchor="t" anchorCtr="0">
+                      <a:spAutoFit/>
+                    </a:bodyPr>
+                    <a:p>
+                      <a:pPr>
+                        <a:defRPr lang="ko-KR" altLang="en-US"/>
+                      </a:pPr>
+                      <a:endParaRPr lang="ko-KR" altLang="en-US" sz="100"/>
+                    </a:p>
+                  </a:txBody>
+                  <a:tcPr marL="91440" marR="91440"/>
+                </a:tc>
+                <a:tc>
+                  <a:txBody>
+                    <a:bodyPr vert="horz" wrap="square" lIns="91440" tIns="45720" rIns="91440" bIns="45720" anchor="t" anchorCtr="0">
+                      <a:spAutoFit/>
+                    </a:bodyPr>
+                    <a:p>
+                      <a:pPr>
+                        <a:defRPr lang="ko-KR" altLang="en-US"/>
+                      </a:pPr>
+                      <a:endParaRPr lang="ko-KR" altLang="en-US" sz="100"/>
+                    </a:p>
+                  </a:txBody>
+                  <a:tcPr marL="91440" marR="91440"/>
+                </a:tc>
+                <a:tc>
+                  <a:txBody>
+                    <a:bodyPr vert="horz" wrap="square" lIns="91440" tIns="45720" rIns="91440" bIns="45720" anchor="t" anchorCtr="0">
+                      <a:spAutoFit/>
+                    </a:bodyPr>
+                    <a:p>
+                      <a:pPr>
+                        <a:defRPr lang="ko-KR" altLang="en-US"/>
+                      </a:pPr>
+                      <a:endParaRPr lang="ko-KR" altLang="en-US" sz="100"/>
+                    </a:p>
+                  </a:txBody>
+                  <a:tcPr marL="91440" marR="91440"/>
+                </a:tc>
+                <a:tc>
+                  <a:txBody>
+                    <a:bodyPr vert="horz" wrap="square" lIns="91440" tIns="45720" rIns="91440" bIns="45720" anchor="t" anchorCtr="0">
+                      <a:spAutoFit/>
+                    </a:bodyPr>
+                    <a:p>
+                      <a:pPr>
+                        <a:defRPr lang="ko-KR" altLang="en-US"/>
+                      </a:pPr>
+                      <a:endParaRPr lang="ko-KR" altLang="en-US" sz="100"/>
+                    </a:p>
+                  </a:txBody>
+                  <a:tcPr marL="91440" marR="91440"/>
+                </a:tc>
+                <a:tc>
+                  <a:txBody>
+                    <a:bodyPr vert="horz" wrap="square" lIns="91440" tIns="45720" rIns="91440" bIns="45720" anchor="t" anchorCtr="0">
+                      <a:spAutoFit/>
+                    </a:bodyPr>
+                    <a:p>
+                      <a:pPr>
+                        <a:defRPr lang="ko-KR" altLang="en-US"/>
+                      </a:pPr>
+                      <a:endParaRPr lang="ko-KR" altLang="en-US" sz="100"/>
+                    </a:p>
+                  </a:txBody>
+                  <a:tcPr marL="91440" marR="91440"/>
+                </a:tc>
+                <a:tc>
+                  <a:txBody>
+                    <a:bodyPr vert="horz" wrap="square" lIns="91440" tIns="45720" rIns="91440" bIns="45720" anchor="t" anchorCtr="0">
+                      <a:spAutoFit/>
+                    </a:bodyPr>
+                    <a:p>
+                      <a:pPr>
+                        <a:defRPr lang="ko-KR" altLang="en-US"/>
+                      </a:pPr>
+                      <a:endParaRPr lang="ko-KR" altLang="en-US" sz="100"/>
+                    </a:p>
+                  </a:txBody>
+                  <a:tcPr marL="91440" marR="91440"/>
+                </a:tc>
+                <a:tc>
+                  <a:txBody>
+                    <a:bodyPr vert="horz" wrap="square" lIns="91440" tIns="45720" rIns="91440" bIns="45720" anchor="t" anchorCtr="0">
+                      <a:spAutoFit/>
+                    </a:bodyPr>
+                    <a:p>
+                      <a:pPr>
+                        <a:defRPr lang="ko-KR" altLang="en-US"/>
+                      </a:pPr>
+                      <a:endParaRPr lang="ko-KR" altLang="en-US" sz="100"/>
+                    </a:p>
+                  </a:txBody>
+                  <a:tcPr marL="91440" marR="91440"/>
+                </a:tc>
+                <a:tc>
+                  <a:txBody>
+                    <a:bodyPr vert="horz" wrap="square" lIns="91440" tIns="45720" rIns="91440" bIns="45720" anchor="t" anchorCtr="0">
+                      <a:spAutoFit/>
+                    </a:bodyPr>
+                    <a:p>
+                      <a:pPr>
+                        <a:defRPr lang="ko-KR" altLang="en-US"/>
+                      </a:pPr>
+                      <a:endParaRPr lang="ko-KR" altLang="en-US" sz="100"/>
+                    </a:p>
+                  </a:txBody>
+                  <a:tcPr marL="91440" marR="91440"/>
+                </a:tc>
+              </a:tr>
+              <a:tr h="287999">
+                <a:tc>
+                  <a:txBody>
+                    <a:bodyPr vert="horz" wrap="square" lIns="91440" tIns="45720" rIns="91440" bIns="45720" anchor="t" anchorCtr="0">
+                      <a:spAutoFit/>
+                    </a:bodyPr>
+                    <a:p>
+                      <a:pPr>
+                        <a:defRPr lang="ko-KR" altLang="en-US"/>
+                      </a:pPr>
+                      <a:endParaRPr lang="ko-KR" altLang="en-US" sz="100"/>
+                    </a:p>
+                  </a:txBody>
+                  <a:tcPr marL="91440" marR="91440"/>
+                </a:tc>
+                <a:tc>
+                  <a:txBody>
+                    <a:bodyPr vert="horz" wrap="square" lIns="91440" tIns="45720" rIns="91440" bIns="45720" anchor="t" anchorCtr="0">
+                      <a:spAutoFit/>
+                    </a:bodyPr>
+                    <a:p>
+                      <a:pPr>
+                        <a:defRPr lang="ko-KR" altLang="en-US"/>
+                      </a:pPr>
+                      <a:endParaRPr lang="ko-KR" altLang="en-US" sz="100"/>
+                    </a:p>
+                  </a:txBody>
+                  <a:tcPr marL="91440" marR="91440"/>
+                </a:tc>
+                <a:tc>
+                  <a:txBody>
+                    <a:bodyPr vert="horz" wrap="square" lIns="91440" tIns="45720" rIns="91440" bIns="45720" anchor="t" anchorCtr="0">
+                      <a:spAutoFit/>
+                    </a:bodyPr>
+                    <a:p>
+                      <a:pPr>
+                        <a:defRPr lang="ko-KR" altLang="en-US"/>
+                      </a:pPr>
+                      <a:endParaRPr lang="ko-KR" altLang="en-US" sz="100"/>
+                    </a:p>
+                  </a:txBody>
+                  <a:tcPr marL="91440" marR="91440"/>
+                </a:tc>
+                <a:tc>
+                  <a:txBody>
+                    <a:bodyPr vert="horz" wrap="square" lIns="91440" tIns="45720" rIns="91440" bIns="45720" anchor="t" anchorCtr="0">
+                      <a:spAutoFit/>
+                    </a:bodyPr>
+                    <a:p>
+                      <a:pPr>
+                        <a:defRPr lang="ko-KR" altLang="en-US"/>
+                      </a:pPr>
+                      <a:endParaRPr lang="ko-KR" altLang="en-US" sz="100"/>
+                    </a:p>
+                  </a:txBody>
+                  <a:tcPr marL="91440" marR="91440"/>
+                </a:tc>
+                <a:tc>
+                  <a:txBody>
+                    <a:bodyPr vert="horz" wrap="square" lIns="91440" tIns="45720" rIns="91440" bIns="45720" anchor="t" anchorCtr="0">
+                      <a:spAutoFit/>
+                    </a:bodyPr>
+                    <a:p>
+                      <a:pPr>
+                        <a:defRPr lang="ko-KR" altLang="en-US"/>
+                      </a:pPr>
+                      <a:endParaRPr lang="ko-KR" altLang="en-US" sz="100"/>
+                    </a:p>
+                  </a:txBody>
+                  <a:tcPr marL="91440" marR="91440"/>
+                </a:tc>
+                <a:tc>
+                  <a:txBody>
+                    <a:bodyPr vert="horz" wrap="square" lIns="91440" tIns="45720" rIns="91440" bIns="45720" anchor="t" anchorCtr="0">
+                      <a:spAutoFit/>
+                    </a:bodyPr>
+                    <a:p>
+                      <a:pPr>
+                        <a:defRPr lang="ko-KR" altLang="en-US"/>
+                      </a:pPr>
+                      <a:endParaRPr lang="ko-KR" altLang="en-US" sz="100"/>
+                    </a:p>
+                  </a:txBody>
+                  <a:tcPr marL="91440" marR="91440"/>
+                </a:tc>
+                <a:tc>
+                  <a:txBody>
+                    <a:bodyPr vert="horz" wrap="square" lIns="91440" tIns="45720" rIns="91440" bIns="45720" anchor="t" anchorCtr="0">
+                      <a:spAutoFit/>
+                    </a:bodyPr>
+                    <a:p>
+                      <a:pPr>
+                        <a:defRPr lang="ko-KR" altLang="en-US"/>
+                      </a:pPr>
+                      <a:endParaRPr lang="ko-KR" altLang="en-US" sz="100"/>
+                    </a:p>
+                  </a:txBody>
+                  <a:tcPr marL="91440" marR="91440"/>
+                </a:tc>
+                <a:tc>
+                  <a:txBody>
+                    <a:bodyPr vert="horz" wrap="square" lIns="91440" tIns="45720" rIns="91440" bIns="45720" anchor="t" anchorCtr="0">
+                      <a:spAutoFit/>
+                    </a:bodyPr>
+                    <a:p>
+                      <a:pPr>
+                        <a:defRPr lang="ko-KR" altLang="en-US"/>
+                      </a:pPr>
+                      <a:endParaRPr lang="ko-KR" altLang="en-US" sz="100"/>
+                    </a:p>
+                  </a:txBody>
+                  <a:tcPr marL="91440" marR="91440"/>
+                </a:tc>
+                <a:tc>
+                  <a:txBody>
+                    <a:bodyPr vert="horz" wrap="square" lIns="91440" tIns="45720" rIns="91440" bIns="45720" anchor="t" anchorCtr="0">
+                      <a:spAutoFit/>
+                    </a:bodyPr>
+                    <a:p>
+                      <a:pPr>
+                        <a:defRPr lang="ko-KR" altLang="en-US"/>
+                      </a:pPr>
+                      <a:endParaRPr lang="ko-KR" altLang="en-US" sz="100"/>
+                    </a:p>
+                  </a:txBody>
+                  <a:tcPr marL="91440" marR="91440"/>
+                </a:tc>
+                <a:tc>
+                  <a:txBody>
+                    <a:bodyPr vert="horz" wrap="square" lIns="91440" tIns="45720" rIns="91440" bIns="45720" anchor="t" anchorCtr="0">
+                      <a:spAutoFit/>
+                    </a:bodyPr>
+                    <a:p>
+                      <a:pPr>
+                        <a:defRPr lang="ko-KR" altLang="en-US"/>
+                      </a:pPr>
+                      <a:endParaRPr lang="ko-KR" altLang="en-US" sz="100"/>
+                    </a:p>
+                  </a:txBody>
+                  <a:tcPr marL="91440" marR="91440"/>
+                </a:tc>
+              </a:tr>
+              <a:tr h="287999">
+                <a:tc>
+                  <a:txBody>
+                    <a:bodyPr vert="horz" wrap="square" lIns="91440" tIns="45720" rIns="91440" bIns="45720" anchor="t" anchorCtr="0">
+                      <a:spAutoFit/>
+                    </a:bodyPr>
+                    <a:p>
+                      <a:pPr>
+                        <a:defRPr lang="ko-KR" altLang="en-US"/>
+                      </a:pPr>
+                      <a:endParaRPr lang="ko-KR" altLang="en-US" sz="100"/>
+                    </a:p>
+                  </a:txBody>
+                  <a:tcPr marL="91440" marR="91440"/>
+                </a:tc>
+                <a:tc>
+                  <a:txBody>
+                    <a:bodyPr vert="horz" wrap="square" lIns="91440" tIns="45720" rIns="91440" bIns="45720" anchor="t" anchorCtr="0">
+                      <a:spAutoFit/>
+                    </a:bodyPr>
+                    <a:p>
+                      <a:pPr>
+                        <a:defRPr lang="ko-KR" altLang="en-US"/>
+                      </a:pPr>
+                      <a:endParaRPr lang="ko-KR" altLang="en-US" sz="100"/>
+                    </a:p>
+                  </a:txBody>
+                  <a:tcPr marL="91440" marR="91440"/>
+                </a:tc>
+                <a:tc>
+                  <a:txBody>
+                    <a:bodyPr vert="horz" wrap="square" lIns="91440" tIns="45720" rIns="91440" bIns="45720" anchor="t" anchorCtr="0">
+                      <a:spAutoFit/>
+                    </a:bodyPr>
+                    <a:p>
+                      <a:pPr>
+                        <a:defRPr lang="ko-KR" altLang="en-US"/>
+                      </a:pPr>
+                      <a:endParaRPr lang="ko-KR" altLang="en-US" sz="100"/>
+                    </a:p>
+                  </a:txBody>
+                  <a:tcPr marL="91440" marR="91440"/>
+                </a:tc>
+                <a:tc>
+                  <a:txBody>
+                    <a:bodyPr vert="horz" wrap="square" lIns="91440" tIns="45720" rIns="91440" bIns="45720" anchor="t" anchorCtr="0">
+                      <a:spAutoFit/>
+                    </a:bodyPr>
+                    <a:p>
+                      <a:pPr>
+                        <a:defRPr lang="ko-KR" altLang="en-US"/>
+                      </a:pPr>
+                      <a:endParaRPr lang="ko-KR" altLang="en-US" sz="100"/>
+                    </a:p>
+                  </a:txBody>
+                  <a:tcPr marL="91440" marR="91440"/>
+                </a:tc>
+                <a:tc>
+                  <a:txBody>
+                    <a:bodyPr vert="horz" wrap="square" lIns="91440" tIns="45720" rIns="91440" bIns="45720" anchor="t" anchorCtr="0">
+                      <a:spAutoFit/>
+                    </a:bodyPr>
+                    <a:p>
+                      <a:pPr>
+                        <a:defRPr lang="ko-KR" altLang="en-US"/>
+                      </a:pPr>
+                      <a:endParaRPr lang="ko-KR" altLang="en-US" sz="100"/>
+                    </a:p>
+                  </a:txBody>
+                  <a:tcPr marL="91440" marR="91440"/>
+                </a:tc>
+                <a:tc>
+                  <a:txBody>
+                    <a:bodyPr vert="horz" wrap="square" lIns="91440" tIns="45720" rIns="91440" bIns="45720" anchor="t" anchorCtr="0">
+                      <a:spAutoFit/>
+                    </a:bodyPr>
+                    <a:p>
+                      <a:pPr>
+                        <a:defRPr lang="ko-KR" altLang="en-US"/>
+                      </a:pPr>
+                      <a:endParaRPr lang="ko-KR" altLang="en-US" sz="100"/>
+                    </a:p>
+                  </a:txBody>
+                  <a:tcPr marL="91440" marR="91440"/>
+                </a:tc>
+                <a:tc>
+                  <a:txBody>
+                    <a:bodyPr vert="horz" wrap="square" lIns="91440" tIns="45720" rIns="91440" bIns="45720" anchor="t" anchorCtr="0">
+                      <a:spAutoFit/>
+                    </a:bodyPr>
+                    <a:p>
+                      <a:pPr>
+                        <a:defRPr lang="ko-KR" altLang="en-US"/>
+                      </a:pPr>
+                      <a:endParaRPr lang="ko-KR" altLang="en-US" sz="100"/>
+                    </a:p>
+                  </a:txBody>
+                  <a:tcPr marL="91440" marR="91440"/>
+                </a:tc>
+                <a:tc>
+                  <a:txBody>
+                    <a:bodyPr vert="horz" wrap="square" lIns="91440" tIns="45720" rIns="91440" bIns="45720" anchor="t" anchorCtr="0">
+                      <a:spAutoFit/>
+                    </a:bodyPr>
+                    <a:p>
+                      <a:pPr>
+                        <a:defRPr lang="ko-KR" altLang="en-US"/>
+                      </a:pPr>
+                      <a:endParaRPr lang="ko-KR" altLang="en-US" sz="100"/>
+                    </a:p>
+                  </a:txBody>
+                  <a:tcPr marL="91440" marR="91440"/>
+                </a:tc>
+                <a:tc>
+                  <a:txBody>
+                    <a:bodyPr vert="horz" wrap="square" lIns="91440" tIns="45720" rIns="91440" bIns="45720" anchor="t" anchorCtr="0">
+                      <a:spAutoFit/>
+                    </a:bodyPr>
+                    <a:p>
+                      <a:pPr>
+                        <a:defRPr lang="ko-KR" altLang="en-US"/>
+                      </a:pPr>
+                      <a:endParaRPr lang="ko-KR" altLang="en-US" sz="100"/>
+                    </a:p>
+                  </a:txBody>
+                  <a:tcPr marL="91440" marR="91440"/>
+                </a:tc>
+                <a:tc>
+                  <a:txBody>
+                    <a:bodyPr vert="horz" wrap="square" lIns="91440" tIns="45720" rIns="91440" bIns="45720" anchor="t" anchorCtr="0">
+                      <a:spAutoFit/>
+                    </a:bodyPr>
+                    <a:p>
+                      <a:pPr>
+                        <a:defRPr lang="ko-KR" altLang="en-US"/>
+                      </a:pPr>
+                      <a:endParaRPr lang="ko-KR" altLang="en-US" sz="100"/>
+                    </a:p>
+                  </a:txBody>
+                  <a:tcPr marL="91440" marR="91440"/>
+                </a:tc>
+              </a:tr>
+              <a:tr h="287999">
+                <a:tc>
+                  <a:txBody>
+                    <a:bodyPr vert="horz" wrap="square" lIns="91440" tIns="45720" rIns="91440" bIns="45720" anchor="t" anchorCtr="0">
+                      <a:spAutoFit/>
+                    </a:bodyPr>
+                    <a:p>
+                      <a:pPr>
+                        <a:defRPr lang="ko-KR" altLang="en-US"/>
+                      </a:pPr>
+                      <a:endParaRPr lang="ko-KR" altLang="en-US" sz="100"/>
+                    </a:p>
+                  </a:txBody>
+                  <a:tcPr marL="91440" marR="91440"/>
+                </a:tc>
+                <a:tc>
+                  <a:txBody>
+                    <a:bodyPr vert="horz" wrap="square" lIns="91440" tIns="45720" rIns="91440" bIns="45720" anchor="t" anchorCtr="0">
+                      <a:spAutoFit/>
+                    </a:bodyPr>
+                    <a:p>
+                      <a:pPr>
+                        <a:defRPr lang="ko-KR" altLang="en-US"/>
+                      </a:pPr>
+                      <a:endParaRPr lang="ko-KR" altLang="en-US" sz="100"/>
+                    </a:p>
+                  </a:txBody>
+                  <a:tcPr marL="91440" marR="91440"/>
+                </a:tc>
+                <a:tc>
+                  <a:txBody>
+                    <a:bodyPr vert="horz" wrap="square" lIns="91440" tIns="45720" rIns="91440" bIns="45720" anchor="t" anchorCtr="0">
+                      <a:spAutoFit/>
+                    </a:bodyPr>
+                    <a:p>
+                      <a:pPr>
+                        <a:defRPr lang="ko-KR" altLang="en-US"/>
+                      </a:pPr>
+                      <a:endParaRPr lang="ko-KR" altLang="en-US" sz="100"/>
+                    </a:p>
+                  </a:txBody>
+                  <a:tcPr marL="91440" marR="91440"/>
+                </a:tc>
+                <a:tc>
+                  <a:txBody>
+                    <a:bodyPr vert="horz" wrap="square" lIns="91440" tIns="45720" rIns="91440" bIns="45720" anchor="t" anchorCtr="0">
+                      <a:spAutoFit/>
+                    </a:bodyPr>
+                    <a:p>
+                      <a:pPr>
+                        <a:defRPr lang="ko-KR" altLang="en-US"/>
+                      </a:pPr>
+                      <a:endParaRPr lang="ko-KR" altLang="en-US" sz="100"/>
+                    </a:p>
+                  </a:txBody>
+                  <a:tcPr marL="91440" marR="91440"/>
+                </a:tc>
+                <a:tc>
+                  <a:txBody>
+                    <a:bodyPr vert="horz" wrap="square" lIns="91440" tIns="45720" rIns="91440" bIns="45720" anchor="t" anchorCtr="0">
+                      <a:spAutoFit/>
+                    </a:bodyPr>
+                    <a:p>
+                      <a:pPr>
+                        <a:defRPr lang="ko-KR" altLang="en-US"/>
+                      </a:pPr>
+                      <a:endParaRPr lang="ko-KR" altLang="en-US" sz="100"/>
+                    </a:p>
+                  </a:txBody>
+                  <a:tcPr marL="91440" marR="91440"/>
+                </a:tc>
+                <a:tc>
+                  <a:txBody>
+                    <a:bodyPr vert="horz" wrap="square" lIns="91440" tIns="45720" rIns="91440" bIns="45720" anchor="t" anchorCtr="0">
+                      <a:spAutoFit/>
+                    </a:bodyPr>
+                    <a:p>
+                      <a:pPr>
+                        <a:defRPr lang="ko-KR" altLang="en-US"/>
+                      </a:pPr>
+                      <a:endParaRPr lang="ko-KR" altLang="en-US" sz="100"/>
+                    </a:p>
+                  </a:txBody>
+                  <a:tcPr marL="91440" marR="91440"/>
+                </a:tc>
+                <a:tc>
+                  <a:txBody>
+                    <a:bodyPr vert="horz" wrap="square" lIns="91440" tIns="45720" rIns="91440" bIns="45720" anchor="t" anchorCtr="0">
+                      <a:spAutoFit/>
+                    </a:bodyPr>
+                    <a:p>
+                      <a:pPr>
+                        <a:defRPr lang="ko-KR" altLang="en-US"/>
+                      </a:pPr>
+                      <a:endParaRPr lang="ko-KR" altLang="en-US" sz="100"/>
+                    </a:p>
+                  </a:txBody>
+                  <a:tcPr marL="91440" marR="91440"/>
+                </a:tc>
+                <a:tc>
+                  <a:txBody>
+                    <a:bodyPr vert="horz" wrap="square" lIns="91440" tIns="45720" rIns="91440" bIns="45720" anchor="t" anchorCtr="0">
+                      <a:spAutoFit/>
+                    </a:bodyPr>
+                    <a:p>
+                      <a:pPr>
+                        <a:defRPr lang="ko-KR" altLang="en-US"/>
+                      </a:pPr>
+                      <a:endParaRPr lang="ko-KR" altLang="en-US" sz="100"/>
+                    </a:p>
+                  </a:txBody>
+                  <a:tcPr marL="91440" marR="91440"/>
+                </a:tc>
+                <a:tc>
+                  <a:txBody>
+                    <a:bodyPr vert="horz" wrap="square" lIns="91440" tIns="45720" rIns="91440" bIns="45720" anchor="t" anchorCtr="0">
+                      <a:spAutoFit/>
+                    </a:bodyPr>
+                    <a:p>
+                      <a:pPr>
+                        <a:defRPr lang="ko-KR" altLang="en-US"/>
+                      </a:pPr>
+                      <a:endParaRPr lang="ko-KR" altLang="en-US" sz="100"/>
+                    </a:p>
+                  </a:txBody>
+                  <a:tcPr marL="91440" marR="91440"/>
+                </a:tc>
+                <a:tc>
+                  <a:txBody>
+                    <a:bodyPr vert="horz" wrap="square" lIns="91440" tIns="45720" rIns="91440" bIns="45720" anchor="t" anchorCtr="0">
+                      <a:spAutoFit/>
+                    </a:bodyPr>
+                    <a:p>
+                      <a:pPr>
+                        <a:defRPr lang="ko-KR" altLang="en-US"/>
+                      </a:pPr>
+                      <a:endParaRPr lang="ko-KR" altLang="en-US" sz="100"/>
+                    </a:p>
+                  </a:txBody>
+                  <a:tcPr marL="91440" marR="91440"/>
+                </a:tc>
+              </a:tr>
+              <a:tr h="287999">
+                <a:tc>
+                  <a:txBody>
+                    <a:bodyPr vert="horz" wrap="square" lIns="91440" tIns="45720" rIns="91440" bIns="45720" anchor="t" anchorCtr="0">
+                      <a:spAutoFit/>
+                    </a:bodyPr>
+                    <a:p>
+                      <a:pPr>
+                        <a:defRPr lang="ko-KR" altLang="en-US"/>
+                      </a:pPr>
+                      <a:endParaRPr lang="ko-KR" altLang="en-US" sz="100"/>
+                    </a:p>
+                  </a:txBody>
+                  <a:tcPr marL="91440" marR="91440"/>
+                </a:tc>
+                <a:tc>
+                  <a:txBody>
+                    <a:bodyPr vert="horz" wrap="square" lIns="91440" tIns="45720" rIns="91440" bIns="45720" anchor="t" anchorCtr="0">
+                      <a:spAutoFit/>
+                    </a:bodyPr>
+                    <a:p>
+                      <a:pPr>
+                        <a:defRPr lang="ko-KR" altLang="en-US"/>
+                      </a:pPr>
+                      <a:endParaRPr lang="ko-KR" altLang="en-US" sz="100"/>
+                    </a:p>
+                  </a:txBody>
+                  <a:tcPr marL="91440" marR="91440"/>
+                </a:tc>
+                <a:tc>
+                  <a:txBody>
+                    <a:bodyPr vert="horz" wrap="square" lIns="91440" tIns="45720" rIns="91440" bIns="45720" anchor="t" anchorCtr="0">
+                      <a:spAutoFit/>
+                    </a:bodyPr>
+                    <a:p>
+                      <a:pPr>
+                        <a:defRPr lang="ko-KR" altLang="en-US"/>
+                      </a:pPr>
+                      <a:endParaRPr lang="ko-KR" altLang="en-US" sz="100"/>
+                    </a:p>
+                  </a:txBody>
+                  <a:tcPr marL="91440" marR="91440"/>
+                </a:tc>
+                <a:tc>
+                  <a:txBody>
+                    <a:bodyPr vert="horz" wrap="square" lIns="91440" tIns="45720" rIns="91440" bIns="45720" anchor="t" anchorCtr="0">
+                      <a:spAutoFit/>
+                    </a:bodyPr>
+                    <a:p>
+                      <a:pPr>
+                        <a:defRPr lang="ko-KR" altLang="en-US"/>
+                      </a:pPr>
+                      <a:endParaRPr lang="ko-KR" altLang="en-US" sz="100"/>
+                    </a:p>
+                  </a:txBody>
+                  <a:tcPr marL="91440" marR="91440"/>
+                </a:tc>
+                <a:tc>
+                  <a:txBody>
+                    <a:bodyPr vert="horz" wrap="square" lIns="91440" tIns="45720" rIns="91440" bIns="45720" anchor="t" anchorCtr="0">
+                      <a:spAutoFit/>
+                    </a:bodyPr>
+                    <a:p>
+                      <a:pPr>
+                        <a:defRPr lang="ko-KR" altLang="en-US"/>
+                      </a:pPr>
+                      <a:endParaRPr lang="ko-KR" altLang="en-US" sz="100"/>
+                    </a:p>
+                  </a:txBody>
+                  <a:tcPr marL="91440" marR="91440"/>
+                </a:tc>
+                <a:tc>
+                  <a:txBody>
+                    <a:bodyPr vert="horz" wrap="square" lIns="91440" tIns="45720" rIns="91440" bIns="45720" anchor="t" anchorCtr="0">
+                      <a:spAutoFit/>
+                    </a:bodyPr>
+                    <a:p>
+                      <a:pPr>
+                        <a:defRPr lang="ko-KR" altLang="en-US"/>
+                      </a:pPr>
+                      <a:endParaRPr lang="ko-KR" altLang="en-US" sz="100"/>
+                    </a:p>
+                  </a:txBody>
+                  <a:tcPr marL="91440" marR="91440"/>
+                </a:tc>
+                <a:tc>
+                  <a:txBody>
+                    <a:bodyPr vert="horz" wrap="square" lIns="91440" tIns="45720" rIns="91440" bIns="45720" anchor="t" anchorCtr="0">
+                      <a:spAutoFit/>
+                    </a:bodyPr>
+                    <a:p>
+                      <a:pPr>
+                        <a:defRPr lang="ko-KR" altLang="en-US"/>
+                      </a:pPr>
+                      <a:endParaRPr lang="ko-KR" altLang="en-US" sz="100"/>
+                    </a:p>
+                  </a:txBody>
+                  <a:tcPr marL="91440" marR="91440"/>
+                </a:tc>
+                <a:tc>
+                  <a:txBody>
+                    <a:bodyPr vert="horz" wrap="square" lIns="91440" tIns="45720" rIns="91440" bIns="45720" anchor="t" anchorCtr="0">
+                      <a:spAutoFit/>
+                    </a:bodyPr>
+                    <a:p>
+                      <a:pPr>
+                        <a:defRPr lang="ko-KR" altLang="en-US"/>
+                      </a:pPr>
+                      <a:endParaRPr lang="ko-KR" altLang="en-US" sz="100"/>
+                    </a:p>
+                  </a:txBody>
+                  <a:tcPr marL="91440" marR="91440"/>
+                </a:tc>
+                <a:tc>
+                  <a:txBody>
+                    <a:bodyPr vert="horz" wrap="square" lIns="91440" tIns="45720" rIns="91440" bIns="45720" anchor="t" anchorCtr="0">
+                      <a:spAutoFit/>
+                    </a:bodyPr>
+                    <a:p>
+                      <a:pPr>
+                        <a:defRPr lang="ko-KR" altLang="en-US"/>
+                      </a:pPr>
+                      <a:endParaRPr lang="ko-KR" altLang="en-US" sz="100"/>
+                    </a:p>
+                  </a:txBody>
+                  <a:tcPr marL="91440" marR="91440"/>
+                </a:tc>
+                <a:tc>
+                  <a:txBody>
+                    <a:bodyPr vert="horz" wrap="square" lIns="91440" tIns="45720" rIns="91440" bIns="45720" anchor="t" anchorCtr="0">
+                      <a:spAutoFit/>
+                    </a:bodyPr>
+                    <a:p>
+                      <a:pPr>
+                        <a:defRPr lang="ko-KR" altLang="en-US"/>
+                      </a:pPr>
+                      <a:endParaRPr lang="ko-KR" altLang="en-US" sz="100"/>
+                    </a:p>
+                  </a:txBody>
+                  <a:tcPr marL="91440" marR="91440"/>
+                </a:tc>
+              </a:tr>
+              <a:tr h="287999">
+                <a:tc>
+                  <a:txBody>
+                    <a:bodyPr vert="horz" wrap="square" lIns="91440" tIns="45720" rIns="91440" bIns="45720" anchor="t" anchorCtr="0">
+                      <a:spAutoFit/>
+                    </a:bodyPr>
+                    <a:p>
+                      <a:pPr>
+                        <a:defRPr lang="ko-KR" altLang="en-US"/>
+                      </a:pPr>
+                      <a:endParaRPr lang="ko-KR" altLang="en-US" sz="100"/>
+                    </a:p>
+                  </a:txBody>
+                  <a:tcPr marL="91440" marR="91440"/>
+                </a:tc>
+                <a:tc>
+                  <a:txBody>
+                    <a:bodyPr vert="horz" wrap="square" lIns="91440" tIns="45720" rIns="91440" bIns="45720" anchor="t" anchorCtr="0">
+                      <a:spAutoFit/>
+                    </a:bodyPr>
+                    <a:p>
+                      <a:pPr>
+                        <a:defRPr lang="ko-KR" altLang="en-US"/>
+                      </a:pPr>
+                      <a:endParaRPr lang="ko-KR" altLang="en-US" sz="100"/>
+                    </a:p>
+                  </a:txBody>
+                  <a:tcPr marL="91440" marR="91440"/>
+                </a:tc>
+                <a:tc>
+                  <a:txBody>
+                    <a:bodyPr vert="horz" wrap="square" lIns="91440" tIns="45720" rIns="91440" bIns="45720" anchor="t" anchorCtr="0">
+                      <a:spAutoFit/>
+                    </a:bodyPr>
+                    <a:p>
+                      <a:pPr>
+                        <a:defRPr lang="ko-KR" altLang="en-US"/>
+                      </a:pPr>
+                      <a:endParaRPr lang="ko-KR" altLang="en-US" sz="100"/>
+                    </a:p>
+                  </a:txBody>
+                  <a:tcPr marL="91440" marR="91440"/>
+                </a:tc>
+                <a:tc>
+                  <a:txBody>
+                    <a:bodyPr vert="horz" wrap="square" lIns="91440" tIns="45720" rIns="91440" bIns="45720" anchor="t" anchorCtr="0">
+                      <a:spAutoFit/>
+                    </a:bodyPr>
+                    <a:p>
+                      <a:pPr>
+                        <a:defRPr lang="ko-KR" altLang="en-US"/>
+                      </a:pPr>
+                      <a:endParaRPr lang="ko-KR" altLang="en-US" sz="100"/>
+                    </a:p>
+                  </a:txBody>
+                  <a:tcPr marL="91440" marR="91440"/>
+                </a:tc>
+                <a:tc>
+                  <a:txBody>
+                    <a:bodyPr vert="horz" wrap="square" lIns="91440" tIns="45720" rIns="91440" bIns="45720" anchor="t" anchorCtr="0">
+                      <a:spAutoFit/>
+                    </a:bodyPr>
+                    <a:p>
+                      <a:pPr>
+                        <a:defRPr lang="ko-KR" altLang="en-US"/>
+                      </a:pPr>
+                      <a:endParaRPr lang="ko-KR" altLang="en-US" sz="100"/>
+                    </a:p>
+                  </a:txBody>
+                  <a:tcPr marL="91440" marR="91440"/>
+                </a:tc>
+                <a:tc>
+                  <a:txBody>
+                    <a:bodyPr vert="horz" wrap="square" lIns="91440" tIns="45720" rIns="91440" bIns="45720" anchor="t" anchorCtr="0">
+                      <a:spAutoFit/>
+                    </a:bodyPr>
+                    <a:p>
+                      <a:pPr>
+                        <a:defRPr lang="ko-KR" altLang="en-US"/>
+                      </a:pPr>
+                      <a:endParaRPr lang="ko-KR" altLang="en-US" sz="100"/>
+                    </a:p>
+                  </a:txBody>
+                  <a:tcPr marL="91440" marR="91440"/>
+                </a:tc>
+                <a:tc>
+                  <a:txBody>
+                    <a:bodyPr vert="horz" wrap="square" lIns="91440" tIns="45720" rIns="91440" bIns="45720" anchor="t" anchorCtr="0">
+                      <a:spAutoFit/>
+                    </a:bodyPr>
+                    <a:p>
+                      <a:pPr>
+                        <a:defRPr lang="ko-KR" altLang="en-US"/>
+                      </a:pPr>
+                      <a:endParaRPr lang="ko-KR" altLang="en-US" sz="100"/>
+                    </a:p>
+                  </a:txBody>
+                  <a:tcPr marL="91440" marR="91440"/>
+                </a:tc>
+                <a:tc>
+                  <a:txBody>
+                    <a:bodyPr vert="horz" wrap="square" lIns="91440" tIns="45720" rIns="91440" bIns="45720" anchor="t" anchorCtr="0">
+                      <a:spAutoFit/>
+                    </a:bodyPr>
+                    <a:p>
+                      <a:pPr>
+                        <a:defRPr lang="ko-KR" altLang="en-US"/>
+                      </a:pPr>
+                      <a:endParaRPr lang="ko-KR" altLang="en-US" sz="100"/>
+                    </a:p>
+                  </a:txBody>
+                  <a:tcPr marL="91440" marR="91440"/>
+                </a:tc>
+                <a:tc>
+                  <a:txBody>
+                    <a:bodyPr vert="horz" wrap="square" lIns="91440" tIns="45720" rIns="91440" bIns="45720" anchor="t" anchorCtr="0">
+                      <a:spAutoFit/>
+                    </a:bodyPr>
+                    <a:p>
+                      <a:pPr>
+                        <a:defRPr lang="ko-KR" altLang="en-US"/>
+                      </a:pPr>
+                      <a:endParaRPr lang="ko-KR" altLang="en-US" sz="100"/>
+                    </a:p>
+                  </a:txBody>
+                  <a:tcPr marL="91440" marR="91440"/>
+                </a:tc>
+                <a:tc>
+                  <a:txBody>
+                    <a:bodyPr vert="horz" wrap="square" lIns="91440" tIns="45720" rIns="91440" bIns="45720" anchor="t" anchorCtr="0">
+                      <a:spAutoFit/>
+                    </a:bodyPr>
+                    <a:p>
+                      <a:pPr>
+                        <a:defRPr lang="ko-KR" altLang="en-US"/>
+                      </a:pPr>
+                      <a:endParaRPr lang="ko-KR" altLang="en-US" sz="100"/>
+                    </a:p>
+                  </a:txBody>
+                  <a:tcPr marL="91440" marR="91440"/>
+                </a:tc>
+              </a:tr>
+              <a:tr h="287999">
+                <a:tc>
+                  <a:txBody>
+                    <a:bodyPr vert="horz" wrap="square" lIns="91440" tIns="45720" rIns="91440" bIns="45720" anchor="t" anchorCtr="0">
+                      <a:spAutoFit/>
+                    </a:bodyPr>
+                    <a:p>
+                      <a:pPr>
+                        <a:defRPr lang="ko-KR" altLang="en-US"/>
+                      </a:pPr>
+                      <a:endParaRPr lang="ko-KR" altLang="en-US" sz="100"/>
+                    </a:p>
+                  </a:txBody>
+                  <a:tcPr marL="91440" marR="91440"/>
+                </a:tc>
+                <a:tc>
+                  <a:txBody>
+                    <a:bodyPr vert="horz" wrap="square" lIns="91440" tIns="45720" rIns="91440" bIns="45720" anchor="t" anchorCtr="0">
+                      <a:spAutoFit/>
+                    </a:bodyPr>
+                    <a:p>
+                      <a:pPr>
+                        <a:defRPr lang="ko-KR" altLang="en-US"/>
+                      </a:pPr>
+                      <a:endParaRPr lang="ko-KR" altLang="en-US" sz="100"/>
+                    </a:p>
+                  </a:txBody>
+                  <a:tcPr marL="91440" marR="91440"/>
+                </a:tc>
+                <a:tc>
+                  <a:txBody>
+                    <a:bodyPr vert="horz" wrap="square" lIns="91440" tIns="45720" rIns="91440" bIns="45720" anchor="t" anchorCtr="0">
+                      <a:spAutoFit/>
+                    </a:bodyPr>
+                    <a:p>
+                      <a:pPr>
+                        <a:defRPr lang="ko-KR" altLang="en-US"/>
+                      </a:pPr>
+                      <a:endParaRPr lang="ko-KR" altLang="en-US" sz="100"/>
+                    </a:p>
+                  </a:txBody>
+                  <a:tcPr marL="91440" marR="91440"/>
+                </a:tc>
+                <a:tc>
+                  <a:txBody>
+                    <a:bodyPr vert="horz" wrap="square" lIns="91440" tIns="45720" rIns="91440" bIns="45720" anchor="t" anchorCtr="0">
+                      <a:spAutoFit/>
+                    </a:bodyPr>
+                    <a:p>
+                      <a:pPr>
+                        <a:defRPr lang="ko-KR" altLang="en-US"/>
+                      </a:pPr>
+                      <a:endParaRPr lang="ko-KR" altLang="en-US" sz="100"/>
+                    </a:p>
+                  </a:txBody>
+                  <a:tcPr marL="91440" marR="91440"/>
+                </a:tc>
+                <a:tc>
+                  <a:txBody>
+                    <a:bodyPr vert="horz" wrap="square" lIns="91440" tIns="45720" rIns="91440" bIns="45720" anchor="t" anchorCtr="0">
+                      <a:spAutoFit/>
+                    </a:bodyPr>
+                    <a:p>
+                      <a:pPr>
+                        <a:defRPr lang="ko-KR" altLang="en-US"/>
+                      </a:pPr>
+                      <a:endParaRPr lang="ko-KR" altLang="en-US" sz="100"/>
+                    </a:p>
+                  </a:txBody>
+                  <a:tcPr marL="91440" marR="91440"/>
+                </a:tc>
+                <a:tc>
+                  <a:txBody>
+                    <a:bodyPr vert="horz" wrap="square" lIns="91440" tIns="45720" rIns="91440" bIns="45720" anchor="t" anchorCtr="0">
+                      <a:spAutoFit/>
+                    </a:bodyPr>
+                    <a:p>
+                      <a:pPr>
+                        <a:defRPr lang="ko-KR" altLang="en-US"/>
+                      </a:pPr>
+                      <a:endParaRPr lang="ko-KR" altLang="en-US" sz="100"/>
+                    </a:p>
+                  </a:txBody>
+                  <a:tcPr marL="91440" marR="91440"/>
+                </a:tc>
+                <a:tc>
+                  <a:txBody>
+                    <a:bodyPr vert="horz" wrap="square" lIns="91440" tIns="45720" rIns="91440" bIns="45720" anchor="t" anchorCtr="0">
+                      <a:spAutoFit/>
+                    </a:bodyPr>
+                    <a:p>
+                      <a:pPr>
+                        <a:defRPr lang="ko-KR" altLang="en-US"/>
+                      </a:pPr>
+                      <a:endParaRPr lang="ko-KR" altLang="en-US" sz="100"/>
+                    </a:p>
+                  </a:txBody>
+                  <a:tcPr marL="91440" marR="91440"/>
+                </a:tc>
+                <a:tc>
+                  <a:txBody>
+                    <a:bodyPr vert="horz" wrap="square" lIns="91440" tIns="45720" rIns="91440" bIns="45720" anchor="t" anchorCtr="0">
+                      <a:spAutoFit/>
+                    </a:bodyPr>
+                    <a:p>
+                      <a:pPr>
+                        <a:defRPr lang="ko-KR" altLang="en-US"/>
+                      </a:pPr>
+                      <a:endParaRPr lang="ko-KR" altLang="en-US" sz="100"/>
+                    </a:p>
+                  </a:txBody>
+                  <a:tcPr marL="91440" marR="91440"/>
+                </a:tc>
+                <a:tc>
+                  <a:txBody>
+                    <a:bodyPr vert="horz" wrap="square" lIns="91440" tIns="45720" rIns="91440" bIns="45720" anchor="t" anchorCtr="0">
+                      <a:spAutoFit/>
+                    </a:bodyPr>
+                    <a:p>
+                      <a:pPr>
+                        <a:defRPr lang="ko-KR" altLang="en-US"/>
+                      </a:pPr>
+                      <a:endParaRPr lang="ko-KR" altLang="en-US" sz="100"/>
+                    </a:p>
+                  </a:txBody>
+                  <a:tcPr marL="91440" marR="91440"/>
+                </a:tc>
+                <a:tc>
+                  <a:txBody>
+                    <a:bodyPr vert="horz" wrap="square" lIns="91440" tIns="45720" rIns="91440" bIns="45720" anchor="t" anchorCtr="0">
+                      <a:spAutoFit/>
+                    </a:bodyPr>
+                    <a:p>
+                      <a:pPr>
+                        <a:defRPr lang="ko-KR" altLang="en-US"/>
+                      </a:pPr>
+                      <a:endParaRPr lang="ko-KR" altLang="en-US" sz="100"/>
+                    </a:p>
+                  </a:txBody>
+                  <a:tcPr marL="91440" marR="91440"/>
+                </a:tc>
+              </a:tr>
+              <a:tr h="287999">
+                <a:tc>
+                  <a:txBody>
+                    <a:bodyPr vert="horz" wrap="square" lIns="91440" tIns="45720" rIns="91440" bIns="45720" anchor="t" anchorCtr="0">
+                      <a:spAutoFit/>
+                    </a:bodyPr>
+                    <a:p>
+                      <a:pPr>
+                        <a:defRPr lang="ko-KR" altLang="en-US"/>
+                      </a:pPr>
+                      <a:endParaRPr lang="ko-KR" altLang="en-US" sz="100"/>
+                    </a:p>
+                  </a:txBody>
+                  <a:tcPr marL="91440" marR="91440"/>
+                </a:tc>
+                <a:tc>
+                  <a:txBody>
+                    <a:bodyPr vert="horz" wrap="square" lIns="91440" tIns="45720" rIns="91440" bIns="45720" anchor="t" anchorCtr="0">
+                      <a:spAutoFit/>
+                    </a:bodyPr>
+                    <a:p>
+                      <a:pPr>
+                        <a:defRPr lang="ko-KR" altLang="en-US"/>
+                      </a:pPr>
+                      <a:endParaRPr lang="ko-KR" altLang="en-US" sz="100"/>
+                    </a:p>
+                  </a:txBody>
+                  <a:tcPr marL="91440" marR="91440"/>
+                </a:tc>
+                <a:tc>
+                  <a:txBody>
+                    <a:bodyPr vert="horz" wrap="square" lIns="91440" tIns="45720" rIns="91440" bIns="45720" anchor="t" anchorCtr="0">
+                      <a:spAutoFit/>
+                    </a:bodyPr>
+                    <a:p>
+                      <a:pPr>
+                        <a:defRPr lang="ko-KR" altLang="en-US"/>
+                      </a:pPr>
+                      <a:endParaRPr lang="ko-KR" altLang="en-US" sz="100"/>
+                    </a:p>
+                  </a:txBody>
+                  <a:tcPr marL="91440" marR="91440"/>
+                </a:tc>
+                <a:tc>
+                  <a:txBody>
+                    <a:bodyPr vert="horz" wrap="square" lIns="91440" tIns="45720" rIns="91440" bIns="45720" anchor="t" anchorCtr="0">
+                      <a:spAutoFit/>
+                    </a:bodyPr>
+                    <a:p>
+                      <a:pPr>
+                        <a:defRPr lang="ko-KR" altLang="en-US"/>
+                      </a:pPr>
+                      <a:endParaRPr lang="ko-KR" altLang="en-US" sz="100"/>
+                    </a:p>
+                  </a:txBody>
+                  <a:tcPr marL="91440" marR="91440"/>
+                </a:tc>
+                <a:tc>
+                  <a:txBody>
+                    <a:bodyPr vert="horz" wrap="square" lIns="91440" tIns="45720" rIns="91440" bIns="45720" anchor="t" anchorCtr="0">
+                      <a:spAutoFit/>
+                    </a:bodyPr>
+                    <a:p>
+                      <a:pPr>
+                        <a:defRPr lang="ko-KR" altLang="en-US"/>
+                      </a:pPr>
+                      <a:endParaRPr lang="ko-KR" altLang="en-US" sz="100"/>
+                    </a:p>
+                  </a:txBody>
+                  <a:tcPr marL="91440" marR="91440"/>
+                </a:tc>
+                <a:tc>
+                  <a:txBody>
+                    <a:bodyPr vert="horz" wrap="square" lIns="91440" tIns="45720" rIns="91440" bIns="45720" anchor="t" anchorCtr="0">
+                      <a:spAutoFit/>
+                    </a:bodyPr>
+                    <a:p>
+                      <a:pPr>
+                        <a:defRPr lang="ko-KR" altLang="en-US"/>
+                      </a:pPr>
+                      <a:endParaRPr lang="ko-KR" altLang="en-US" sz="100"/>
+                    </a:p>
+                  </a:txBody>
+                  <a:tcPr marL="91440" marR="91440"/>
+                </a:tc>
+                <a:tc>
+                  <a:txBody>
+                    <a:bodyPr vert="horz" wrap="square" lIns="91440" tIns="45720" rIns="91440" bIns="45720" anchor="t" anchorCtr="0">
+                      <a:spAutoFit/>
+                    </a:bodyPr>
+                    <a:p>
+                      <a:pPr>
+                        <a:defRPr lang="ko-KR" altLang="en-US"/>
+                      </a:pPr>
+                      <a:endParaRPr lang="ko-KR" altLang="en-US" sz="100"/>
+                    </a:p>
+                  </a:txBody>
+                  <a:tcPr marL="91440" marR="91440"/>
+                </a:tc>
+                <a:tc>
+                  <a:txBody>
+                    <a:bodyPr vert="horz" wrap="square" lIns="91440" tIns="45720" rIns="91440" bIns="45720" anchor="t" anchorCtr="0">
+                      <a:spAutoFit/>
+                    </a:bodyPr>
+                    <a:p>
+                      <a:pPr>
+                        <a:defRPr lang="ko-KR" altLang="en-US"/>
+                      </a:pPr>
+                      <a:endParaRPr lang="ko-KR" altLang="en-US" sz="100"/>
+                    </a:p>
+                  </a:txBody>
+                  <a:tcPr marL="91440" marR="91440"/>
+                </a:tc>
+                <a:tc>
+                  <a:txBody>
+                    <a:bodyPr vert="horz" wrap="square" lIns="91440" tIns="45720" rIns="91440" bIns="45720" anchor="t" anchorCtr="0">
+                      <a:spAutoFit/>
+                    </a:bodyPr>
+                    <a:p>
+                      <a:pPr>
+                        <a:defRPr lang="ko-KR" altLang="en-US"/>
+                      </a:pPr>
+                      <a:endParaRPr lang="ko-KR" altLang="en-US" sz="100"/>
+                    </a:p>
+                  </a:txBody>
+                  <a:tcPr marL="91440" marR="91440"/>
+                </a:tc>
+                <a:tc>
+                  <a:txBody>
+                    <a:bodyPr vert="horz" wrap="square" lIns="91440" tIns="45720" rIns="91440" bIns="45720" anchor="t" anchorCtr="0">
+                      <a:spAutoFit/>
+                    </a:bodyPr>
+                    <a:p>
+                      <a:pPr>
+                        <a:defRPr lang="ko-KR" altLang="en-US"/>
+                      </a:pPr>
+                      <a:endParaRPr lang="ko-KR" altLang="en-US" sz="100"/>
+                    </a:p>
+                  </a:txBody>
+                  <a:tcPr marL="91440" marR="91440"/>
+                </a:tc>
+              </a:tr>
+              <a:tr h="287999">
+                <a:tc>
+                  <a:txBody>
+                    <a:bodyPr vert="horz" wrap="square" lIns="91440" tIns="45720" rIns="91440" bIns="45720" anchor="t" anchorCtr="0">
+                      <a:spAutoFit/>
+                    </a:bodyPr>
+                    <a:p>
+                      <a:pPr>
+                        <a:defRPr lang="ko-KR" altLang="en-US"/>
+                      </a:pPr>
+                      <a:endParaRPr lang="ko-KR" altLang="en-US" sz="100"/>
+                    </a:p>
+                  </a:txBody>
+                  <a:tcPr marL="91440" marR="91440"/>
+                </a:tc>
+                <a:tc>
+                  <a:txBody>
+                    <a:bodyPr vert="horz" wrap="square" lIns="91440" tIns="45720" rIns="91440" bIns="45720" anchor="t" anchorCtr="0">
+                      <a:spAutoFit/>
+                    </a:bodyPr>
+                    <a:p>
+                      <a:pPr>
+                        <a:defRPr lang="ko-KR" altLang="en-US"/>
+                      </a:pPr>
+                      <a:endParaRPr lang="ko-KR" altLang="en-US" sz="100"/>
+                    </a:p>
+                  </a:txBody>
+                  <a:tcPr marL="91440" marR="91440"/>
+                </a:tc>
+                <a:tc>
+                  <a:txBody>
+                    <a:bodyPr vert="horz" wrap="square" lIns="91440" tIns="45720" rIns="91440" bIns="45720" anchor="t" anchorCtr="0">
+                      <a:spAutoFit/>
+                    </a:bodyPr>
+                    <a:p>
+                      <a:pPr>
+                        <a:defRPr lang="ko-KR" altLang="en-US"/>
+                      </a:pPr>
+                      <a:endParaRPr lang="ko-KR" altLang="en-US" sz="100"/>
+                    </a:p>
+                  </a:txBody>
+                  <a:tcPr marL="91440" marR="91440"/>
+                </a:tc>
+                <a:tc>
+                  <a:txBody>
+                    <a:bodyPr vert="horz" wrap="square" lIns="91440" tIns="45720" rIns="91440" bIns="45720" anchor="t" anchorCtr="0">
+                      <a:spAutoFit/>
+                    </a:bodyPr>
+                    <a:p>
+                      <a:pPr>
+                        <a:defRPr lang="ko-KR" altLang="en-US"/>
+                      </a:pPr>
+                      <a:endParaRPr lang="ko-KR" altLang="en-US" sz="100"/>
+                    </a:p>
+                  </a:txBody>
+                  <a:tcPr marL="91440" marR="91440"/>
+                </a:tc>
+                <a:tc>
+                  <a:txBody>
+                    <a:bodyPr vert="horz" wrap="square" lIns="91440" tIns="45720" rIns="91440" bIns="45720" anchor="t" anchorCtr="0">
+                      <a:spAutoFit/>
+                    </a:bodyPr>
+                    <a:p>
+                      <a:pPr>
+                        <a:defRPr lang="ko-KR" altLang="en-US"/>
+                      </a:pPr>
+                      <a:endParaRPr lang="ko-KR" altLang="en-US" sz="100"/>
+                    </a:p>
+                  </a:txBody>
+                  <a:tcPr marL="91440" marR="91440"/>
+                </a:tc>
+                <a:tc>
+                  <a:txBody>
+                    <a:bodyPr vert="horz" wrap="square" lIns="91440" tIns="45720" rIns="91440" bIns="45720" anchor="t" anchorCtr="0">
+                      <a:spAutoFit/>
+                    </a:bodyPr>
+                    <a:p>
+                      <a:pPr>
+                        <a:defRPr lang="ko-KR" altLang="en-US"/>
+                      </a:pPr>
+                      <a:endParaRPr lang="ko-KR" altLang="en-US" sz="100"/>
+                    </a:p>
+                  </a:txBody>
+                  <a:tcPr marL="91440" marR="91440"/>
+                </a:tc>
+                <a:tc>
+                  <a:txBody>
+                    <a:bodyPr vert="horz" wrap="square" lIns="91440" tIns="45720" rIns="91440" bIns="45720" anchor="t" anchorCtr="0">
+                      <a:spAutoFit/>
+                    </a:bodyPr>
+                    <a:p>
+                      <a:pPr>
+                        <a:defRPr lang="ko-KR" altLang="en-US"/>
+                      </a:pPr>
+                      <a:endParaRPr lang="ko-KR" altLang="en-US" sz="100"/>
+                    </a:p>
+                  </a:txBody>
+                  <a:tcPr marL="91440" marR="91440"/>
+                </a:tc>
+                <a:tc>
+                  <a:txBody>
+                    <a:bodyPr vert="horz" wrap="square" lIns="91440" tIns="45720" rIns="91440" bIns="45720" anchor="t" anchorCtr="0">
+                      <a:spAutoFit/>
+                    </a:bodyPr>
+                    <a:p>
+                      <a:pPr>
+                        <a:defRPr lang="ko-KR" altLang="en-US"/>
+                      </a:pPr>
+                      <a:endParaRPr lang="ko-KR" altLang="en-US" sz="100"/>
+                    </a:p>
+                  </a:txBody>
+                  <a:tcPr marL="91440" marR="91440"/>
+                </a:tc>
+                <a:tc>
+                  <a:txBody>
+                    <a:bodyPr vert="horz" wrap="square" lIns="91440" tIns="45720" rIns="91440" bIns="45720" anchor="t" anchorCtr="0">
+                      <a:spAutoFit/>
+                    </a:bodyPr>
+                    <a:p>
+                      <a:pPr>
+                        <a:defRPr lang="ko-KR" altLang="en-US"/>
+                      </a:pPr>
+                      <a:endParaRPr lang="ko-KR" altLang="en-US" sz="100"/>
+                    </a:p>
+                  </a:txBody>
+                  <a:tcPr marL="91440" marR="91440"/>
+                </a:tc>
+                <a:tc>
+                  <a:txBody>
+                    <a:bodyPr vert="horz" wrap="square" lIns="91440" tIns="45720" rIns="91440" bIns="45720" anchor="t" anchorCtr="0">
+                      <a:spAutoFit/>
+                    </a:bodyPr>
+                    <a:p>
+                      <a:pPr>
+                        <a:defRPr lang="ko-KR" altLang="en-US"/>
+                      </a:pPr>
+                      <a:endParaRPr lang="ko-KR" altLang="en-US" sz="100"/>
+                    </a:p>
+                  </a:txBody>
+                  <a:tcPr marL="91440" marR="91440"/>
+                </a:tc>
+              </a:tr>
+              <a:tr h="287999">
+                <a:tc>
+                  <a:txBody>
+                    <a:bodyPr vert="horz" wrap="square" lIns="91440" tIns="45720" rIns="91440" bIns="45720" anchor="t" anchorCtr="0">
+                      <a:spAutoFit/>
+                    </a:bodyPr>
+                    <a:p>
+                      <a:pPr>
+                        <a:defRPr lang="ko-KR" altLang="en-US"/>
+                      </a:pPr>
+                      <a:endParaRPr lang="ko-KR" altLang="en-US" sz="100"/>
+                    </a:p>
+                  </a:txBody>
+                  <a:tcPr marL="91440" marR="91440"/>
+                </a:tc>
+                <a:tc>
+                  <a:txBody>
+                    <a:bodyPr vert="horz" wrap="square" lIns="91440" tIns="45720" rIns="91440" bIns="45720" anchor="t" anchorCtr="0">
+                      <a:spAutoFit/>
+                    </a:bodyPr>
+                    <a:p>
+                      <a:pPr>
+                        <a:defRPr lang="ko-KR" altLang="en-US"/>
+                      </a:pPr>
+                      <a:endParaRPr lang="ko-KR" altLang="en-US" sz="100"/>
+                    </a:p>
+                  </a:txBody>
+                  <a:tcPr marL="91440" marR="91440"/>
+                </a:tc>
+                <a:tc>
+                  <a:txBody>
+                    <a:bodyPr vert="horz" wrap="square" lIns="91440" tIns="45720" rIns="91440" bIns="45720" anchor="t" anchorCtr="0">
+                      <a:spAutoFit/>
+                    </a:bodyPr>
+                    <a:p>
+                      <a:pPr>
+                        <a:defRPr lang="ko-KR" altLang="en-US"/>
+                      </a:pPr>
+                      <a:endParaRPr lang="ko-KR" altLang="en-US" sz="100"/>
+                    </a:p>
+                  </a:txBody>
+                  <a:tcPr marL="91440" marR="91440"/>
+                </a:tc>
+                <a:tc>
+                  <a:txBody>
+                    <a:bodyPr vert="horz" wrap="square" lIns="91440" tIns="45720" rIns="91440" bIns="45720" anchor="t" anchorCtr="0">
+                      <a:spAutoFit/>
+                    </a:bodyPr>
+                    <a:p>
+                      <a:pPr>
+                        <a:defRPr lang="ko-KR" altLang="en-US"/>
+                      </a:pPr>
+                      <a:endParaRPr lang="ko-KR" altLang="en-US" sz="100"/>
+                    </a:p>
+                  </a:txBody>
+                  <a:tcPr marL="91440" marR="91440"/>
+                </a:tc>
+                <a:tc>
+                  <a:txBody>
+                    <a:bodyPr vert="horz" wrap="square" lIns="91440" tIns="45720" rIns="91440" bIns="45720" anchor="t" anchorCtr="0">
+                      <a:spAutoFit/>
+                    </a:bodyPr>
+                    <a:p>
+                      <a:pPr>
+                        <a:defRPr lang="ko-KR" altLang="en-US"/>
+                      </a:pPr>
+                      <a:endParaRPr lang="ko-KR" altLang="en-US" sz="100"/>
+                    </a:p>
+                  </a:txBody>
+                  <a:tcPr marL="91440" marR="91440"/>
+                </a:tc>
+                <a:tc>
+                  <a:txBody>
+                    <a:bodyPr vert="horz" wrap="square" lIns="91440" tIns="45720" rIns="91440" bIns="45720" anchor="t" anchorCtr="0">
+                      <a:spAutoFit/>
+                    </a:bodyPr>
+                    <a:p>
+                      <a:pPr>
+                        <a:defRPr lang="ko-KR" altLang="en-US"/>
+                      </a:pPr>
+                      <a:endParaRPr lang="ko-KR" altLang="en-US" sz="100"/>
+                    </a:p>
+                  </a:txBody>
+                  <a:tcPr marL="91440" marR="91440"/>
+                </a:tc>
+                <a:tc>
+                  <a:txBody>
+                    <a:bodyPr vert="horz" wrap="square" lIns="91440" tIns="45720" rIns="91440" bIns="45720" anchor="t" anchorCtr="0">
+                      <a:spAutoFit/>
+                    </a:bodyPr>
+                    <a:p>
+                      <a:pPr>
+                        <a:defRPr lang="ko-KR" altLang="en-US"/>
+                      </a:pPr>
+                      <a:endParaRPr lang="ko-KR" altLang="en-US" sz="100"/>
+                    </a:p>
+                  </a:txBody>
+                  <a:tcPr marL="91440" marR="91440"/>
+                </a:tc>
+                <a:tc>
+                  <a:txBody>
+                    <a:bodyPr vert="horz" wrap="square" lIns="91440" tIns="45720" rIns="91440" bIns="45720" anchor="t" anchorCtr="0">
+                      <a:spAutoFit/>
+                    </a:bodyPr>
+                    <a:p>
+                      <a:pPr>
+                        <a:defRPr lang="ko-KR" altLang="en-US"/>
+                      </a:pPr>
+                      <a:endParaRPr lang="ko-KR" altLang="en-US" sz="100"/>
+                    </a:p>
+                  </a:txBody>
+                  <a:tcPr marL="91440" marR="91440"/>
+                </a:tc>
+                <a:tc>
+                  <a:txBody>
+                    <a:bodyPr vert="horz" wrap="square" lIns="91440" tIns="45720" rIns="91440" bIns="45720" anchor="t" anchorCtr="0">
+                      <a:spAutoFit/>
+                    </a:bodyPr>
+                    <a:p>
+                      <a:pPr>
+                        <a:defRPr lang="ko-KR" altLang="en-US"/>
+                      </a:pPr>
+                      <a:endParaRPr lang="ko-KR" altLang="en-US" sz="100"/>
+                    </a:p>
+                  </a:txBody>
+                  <a:tcPr marL="91440" marR="91440"/>
+                </a:tc>
+                <a:tc>
+                  <a:txBody>
+                    <a:bodyPr vert="horz" wrap="square" lIns="91440" tIns="45720" rIns="91440" bIns="45720" anchor="t" anchorCtr="0">
+                      <a:spAutoFit/>
+                    </a:bodyPr>
+                    <a:p>
+                      <a:pPr>
+                        <a:defRPr lang="ko-KR" altLang="en-US"/>
+                      </a:pPr>
+                      <a:endParaRPr lang="ko-KR" altLang="en-US" sz="100"/>
+                    </a:p>
+                  </a:txBody>
+                  <a:tcPr marL="91440" marR="91440"/>
+                </a:tc>
+              </a:tr>
+              <a:tr h="287999">
+                <a:tc>
+                  <a:txBody>
+                    <a:bodyPr vert="horz" wrap="square" lIns="91440" tIns="45720" rIns="91440" bIns="45720" anchor="t" anchorCtr="0">
+                      <a:spAutoFit/>
+                    </a:bodyPr>
+                    <a:p>
+                      <a:pPr>
+                        <a:defRPr lang="ko-KR" altLang="en-US"/>
+                      </a:pPr>
+                      <a:endParaRPr lang="ko-KR" altLang="en-US" sz="100"/>
+                    </a:p>
+                  </a:txBody>
+                  <a:tcPr marL="91440" marR="91440"/>
+                </a:tc>
+                <a:tc>
+                  <a:txBody>
+                    <a:bodyPr vert="horz" wrap="square" lIns="91440" tIns="45720" rIns="91440" bIns="45720" anchor="t" anchorCtr="0">
+                      <a:spAutoFit/>
+                    </a:bodyPr>
+                    <a:p>
+                      <a:pPr>
+                        <a:defRPr lang="ko-KR" altLang="en-US"/>
+                      </a:pPr>
+                      <a:endParaRPr lang="ko-KR" altLang="en-US" sz="100"/>
+                    </a:p>
+                  </a:txBody>
+                  <a:tcPr marL="91440" marR="91440"/>
+                </a:tc>
+                <a:tc>
+                  <a:txBody>
+                    <a:bodyPr vert="horz" wrap="square" lIns="91440" tIns="45720" rIns="91440" bIns="45720" anchor="t" anchorCtr="0">
+                      <a:spAutoFit/>
+                    </a:bodyPr>
+                    <a:p>
+                      <a:pPr>
+                        <a:defRPr lang="ko-KR" altLang="en-US"/>
+                      </a:pPr>
+                      <a:endParaRPr lang="ko-KR" altLang="en-US" sz="100"/>
+                    </a:p>
+                  </a:txBody>
+                  <a:tcPr marL="91440" marR="91440"/>
+                </a:tc>
+                <a:tc>
+                  <a:txBody>
+                    <a:bodyPr vert="horz" wrap="square" lIns="91440" tIns="45720" rIns="91440" bIns="45720" anchor="t" anchorCtr="0">
+                      <a:spAutoFit/>
+                    </a:bodyPr>
+                    <a:p>
+                      <a:pPr>
+                        <a:defRPr lang="ko-KR" altLang="en-US"/>
+                      </a:pPr>
+                      <a:endParaRPr lang="ko-KR" altLang="en-US" sz="100"/>
+                    </a:p>
+                  </a:txBody>
+                  <a:tcPr marL="91440" marR="91440"/>
+                </a:tc>
+                <a:tc>
+                  <a:txBody>
+                    <a:bodyPr vert="horz" wrap="square" lIns="91440" tIns="45720" rIns="91440" bIns="45720" anchor="t" anchorCtr="0">
+                      <a:spAutoFit/>
+                    </a:bodyPr>
+                    <a:p>
+                      <a:pPr>
+                        <a:defRPr lang="ko-KR" altLang="en-US"/>
+                      </a:pPr>
+                      <a:endParaRPr lang="ko-KR" altLang="en-US" sz="100"/>
+                    </a:p>
+                  </a:txBody>
+                  <a:tcPr marL="91440" marR="91440"/>
+                </a:tc>
+                <a:tc>
+                  <a:txBody>
+                    <a:bodyPr vert="horz" wrap="square" lIns="91440" tIns="45720" rIns="91440" bIns="45720" anchor="t" anchorCtr="0">
+                      <a:spAutoFit/>
+                    </a:bodyPr>
+                    <a:p>
+                      <a:pPr>
+                        <a:defRPr lang="ko-KR" altLang="en-US"/>
+                      </a:pPr>
+                      <a:endParaRPr lang="ko-KR" altLang="en-US" sz="100"/>
+                    </a:p>
+                  </a:txBody>
+                  <a:tcPr marL="91440" marR="91440"/>
+                </a:tc>
+                <a:tc>
+                  <a:txBody>
+                    <a:bodyPr vert="horz" wrap="square" lIns="91440" tIns="45720" rIns="91440" bIns="45720" anchor="t" anchorCtr="0">
+                      <a:spAutoFit/>
+                    </a:bodyPr>
+                    <a:p>
+                      <a:pPr>
+                        <a:defRPr lang="ko-KR" altLang="en-US"/>
+                      </a:pPr>
+                      <a:endParaRPr lang="ko-KR" altLang="en-US" sz="100"/>
+                    </a:p>
+                  </a:txBody>
+                  <a:tcPr marL="91440" marR="91440"/>
+                </a:tc>
+                <a:tc>
+                  <a:txBody>
+                    <a:bodyPr vert="horz" wrap="square" lIns="91440" tIns="45720" rIns="91440" bIns="45720" anchor="t" anchorCtr="0">
+                      <a:spAutoFit/>
+                    </a:bodyPr>
+                    <a:p>
+                      <a:pPr>
+                        <a:defRPr lang="ko-KR" altLang="en-US"/>
+                      </a:pPr>
+                      <a:endParaRPr lang="ko-KR" altLang="en-US" sz="100"/>
+                    </a:p>
+                  </a:txBody>
+                  <a:tcPr marL="91440" marR="91440"/>
+                </a:tc>
+                <a:tc>
+                  <a:txBody>
+                    <a:bodyPr vert="horz" wrap="square" lIns="91440" tIns="45720" rIns="91440" bIns="45720" anchor="t" anchorCtr="0">
+                      <a:spAutoFit/>
+                    </a:bodyPr>
+                    <a:p>
+                      <a:pPr>
+                        <a:defRPr lang="ko-KR" altLang="en-US"/>
+                      </a:pPr>
+                      <a:endParaRPr lang="ko-KR" altLang="en-US" sz="100"/>
+                    </a:p>
+                  </a:txBody>
+                  <a:tcPr marL="91440" marR="91440"/>
+                </a:tc>
+                <a:tc>
+                  <a:txBody>
+                    <a:bodyPr vert="horz" wrap="square" lIns="91440" tIns="45720" rIns="91440" bIns="45720" anchor="t" anchorCtr="0">
+                      <a:spAutoFit/>
+                    </a:bodyPr>
+                    <a:p>
+                      <a:pPr>
+                        <a:defRPr lang="ko-KR" altLang="en-US"/>
+                      </a:pPr>
+                      <a:endParaRPr lang="ko-KR" altLang="en-US" sz="100"/>
+                    </a:p>
+                  </a:txBody>
+                  <a:tcPr marL="91440" marR="91440"/>
+                </a:tc>
+              </a:tr>
+              <a:tr h="287999">
+                <a:tc>
+                  <a:txBody>
+                    <a:bodyPr vert="horz" wrap="square" lIns="91440" tIns="45720" rIns="91440" bIns="45720" anchor="t" anchorCtr="0">
+                      <a:spAutoFit/>
+                    </a:bodyPr>
+                    <a:p>
+                      <a:pPr>
+                        <a:defRPr lang="ko-KR" altLang="en-US"/>
+                      </a:pPr>
+                      <a:endParaRPr lang="ko-KR" altLang="en-US" sz="100"/>
+                    </a:p>
+                  </a:txBody>
+                  <a:tcPr marL="91440" marR="91440"/>
+                </a:tc>
+                <a:tc>
+                  <a:txBody>
+                    <a:bodyPr vert="horz" wrap="square" lIns="91440" tIns="45720" rIns="91440" bIns="45720" anchor="t" anchorCtr="0">
+                      <a:spAutoFit/>
+                    </a:bodyPr>
+                    <a:p>
+                      <a:pPr>
+                        <a:defRPr lang="ko-KR" altLang="en-US"/>
+                      </a:pPr>
+                      <a:endParaRPr lang="ko-KR" altLang="en-US" sz="100"/>
+                    </a:p>
+                  </a:txBody>
+                  <a:tcPr marL="91440" marR="91440"/>
+                </a:tc>
+                <a:tc>
+                  <a:txBody>
+                    <a:bodyPr vert="horz" wrap="square" lIns="91440" tIns="45720" rIns="91440" bIns="45720" anchor="t" anchorCtr="0">
+                      <a:spAutoFit/>
+                    </a:bodyPr>
+                    <a:p>
+                      <a:pPr>
+                        <a:defRPr lang="ko-KR" altLang="en-US"/>
+                      </a:pPr>
+                      <a:endParaRPr lang="ko-KR" altLang="en-US" sz="100"/>
+                    </a:p>
+                  </a:txBody>
+                  <a:tcPr marL="91440" marR="91440"/>
+                </a:tc>
+                <a:tc>
+                  <a:txBody>
+                    <a:bodyPr vert="horz" wrap="square" lIns="91440" tIns="45720" rIns="91440" bIns="45720" anchor="t" anchorCtr="0">
+                      <a:spAutoFit/>
+                    </a:bodyPr>
+                    <a:p>
+                      <a:pPr>
+                        <a:defRPr lang="ko-KR" altLang="en-US"/>
+                      </a:pPr>
+                      <a:endParaRPr lang="ko-KR" altLang="en-US" sz="100"/>
+                    </a:p>
+                  </a:txBody>
+                  <a:tcPr marL="91440" marR="91440"/>
+                </a:tc>
+                <a:tc>
+                  <a:txBody>
+                    <a:bodyPr vert="horz" wrap="square" lIns="91440" tIns="45720" rIns="91440" bIns="45720" anchor="t" anchorCtr="0">
+                      <a:spAutoFit/>
+                    </a:bodyPr>
+                    <a:p>
+                      <a:pPr>
+                        <a:defRPr lang="ko-KR" altLang="en-US"/>
+                      </a:pPr>
+                      <a:endParaRPr lang="ko-KR" altLang="en-US" sz="100"/>
+                    </a:p>
+                  </a:txBody>
+                  <a:tcPr marL="91440" marR="91440"/>
+                </a:tc>
+                <a:tc>
+                  <a:txBody>
+                    <a:bodyPr vert="horz" wrap="square" lIns="91440" tIns="45720" rIns="91440" bIns="45720" anchor="t" anchorCtr="0">
+                      <a:spAutoFit/>
+                    </a:bodyPr>
+                    <a:p>
+                      <a:pPr>
+                        <a:defRPr lang="ko-KR" altLang="en-US"/>
+                      </a:pPr>
+                      <a:endParaRPr lang="ko-KR" altLang="en-US" sz="100"/>
+                    </a:p>
+                  </a:txBody>
+                  <a:tcPr marL="91440" marR="91440"/>
+                </a:tc>
+                <a:tc>
+                  <a:txBody>
+                    <a:bodyPr vert="horz" wrap="square" lIns="91440" tIns="45720" rIns="91440" bIns="45720" anchor="t" anchorCtr="0">
+                      <a:spAutoFit/>
+                    </a:bodyPr>
+                    <a:p>
+                      <a:pPr>
+                        <a:defRPr lang="ko-KR" altLang="en-US"/>
+                      </a:pPr>
+                      <a:endParaRPr lang="ko-KR" altLang="en-US" sz="100"/>
+                    </a:p>
+                  </a:txBody>
+                  <a:tcPr marL="91440" marR="91440"/>
+                </a:tc>
+                <a:tc>
+                  <a:txBody>
+                    <a:bodyPr vert="horz" wrap="square" lIns="91440" tIns="45720" rIns="91440" bIns="45720" anchor="t" anchorCtr="0">
+                      <a:spAutoFit/>
+                    </a:bodyPr>
+                    <a:p>
+                      <a:pPr>
+                        <a:defRPr lang="ko-KR" altLang="en-US"/>
+                      </a:pPr>
+                      <a:endParaRPr lang="ko-KR" altLang="en-US" sz="100"/>
+                    </a:p>
+                  </a:txBody>
+                  <a:tcPr marL="91440" marR="91440"/>
+                </a:tc>
+                <a:tc>
+                  <a:txBody>
+                    <a:bodyPr vert="horz" wrap="square" lIns="91440" tIns="45720" rIns="91440" bIns="45720" anchor="t" anchorCtr="0">
+                      <a:spAutoFit/>
+                    </a:bodyPr>
+                    <a:p>
+                      <a:pPr>
+                        <a:defRPr lang="ko-KR" altLang="en-US"/>
+                      </a:pPr>
+                      <a:endParaRPr lang="ko-KR" altLang="en-US" sz="100"/>
+                    </a:p>
+                  </a:txBody>
+                  <a:tcPr marL="91440" marR="91440"/>
+                </a:tc>
+                <a:tc>
+                  <a:txBody>
+                    <a:bodyPr vert="horz" wrap="square" lIns="91440" tIns="45720" rIns="91440" bIns="45720" anchor="t" anchorCtr="0">
+                      <a:spAutoFit/>
+                    </a:bodyPr>
+                    <a:p>
+                      <a:pPr>
+                        <a:defRPr lang="ko-KR" altLang="en-US"/>
+                      </a:pPr>
+                      <a:endParaRPr lang="ko-KR" altLang="en-US" sz="100"/>
+                    </a:p>
+                  </a:txBody>
+                  <a:tcPr marL="91440" marR="91440"/>
+                </a:tc>
+              </a:tr>
+              <a:tr h="287999">
+                <a:tc>
+                  <a:txBody>
+                    <a:bodyPr vert="horz" wrap="square" lIns="91440" tIns="45720" rIns="91440" bIns="45720" anchor="t" anchorCtr="0">
+                      <a:spAutoFit/>
+                    </a:bodyPr>
+                    <a:p>
+                      <a:pPr>
+                        <a:defRPr lang="ko-KR" altLang="en-US"/>
+                      </a:pPr>
+                      <a:endParaRPr lang="ko-KR" altLang="en-US" sz="100"/>
+                    </a:p>
+                  </a:txBody>
+                  <a:tcPr marL="91440" marR="91440"/>
+                </a:tc>
+                <a:tc>
+                  <a:txBody>
+                    <a:bodyPr vert="horz" wrap="square" lIns="91440" tIns="45720" rIns="91440" bIns="45720" anchor="t" anchorCtr="0">
+                      <a:spAutoFit/>
+                    </a:bodyPr>
+                    <a:p>
+                      <a:pPr>
+                        <a:defRPr lang="ko-KR" altLang="en-US"/>
+                      </a:pPr>
+                      <a:endParaRPr lang="ko-KR" altLang="en-US" sz="100"/>
+                    </a:p>
+                  </a:txBody>
+                  <a:tcPr marL="91440" marR="91440"/>
+                </a:tc>
+                <a:tc>
+                  <a:txBody>
+                    <a:bodyPr vert="horz" wrap="square" lIns="91440" tIns="45720" rIns="91440" bIns="45720" anchor="t" anchorCtr="0">
+                      <a:spAutoFit/>
+                    </a:bodyPr>
+                    <a:p>
+                      <a:pPr>
+                        <a:defRPr lang="ko-KR" altLang="en-US"/>
+                      </a:pPr>
+                      <a:endParaRPr lang="ko-KR" altLang="en-US" sz="100"/>
+                    </a:p>
+                  </a:txBody>
+                  <a:tcPr marL="91440" marR="91440"/>
+                </a:tc>
+                <a:tc>
+                  <a:txBody>
+                    <a:bodyPr vert="horz" wrap="square" lIns="91440" tIns="45720" rIns="91440" bIns="45720" anchor="t" anchorCtr="0">
+                      <a:spAutoFit/>
+                    </a:bodyPr>
+                    <a:p>
+                      <a:pPr>
+                        <a:defRPr lang="ko-KR" altLang="en-US"/>
+                      </a:pPr>
+                      <a:endParaRPr lang="ko-KR" altLang="en-US" sz="100"/>
+                    </a:p>
+                  </a:txBody>
+                  <a:tcPr marL="91440" marR="91440"/>
+                </a:tc>
+                <a:tc>
+                  <a:txBody>
+                    <a:bodyPr vert="horz" wrap="square" lIns="91440" tIns="45720" rIns="91440" bIns="45720" anchor="t" anchorCtr="0">
+                      <a:spAutoFit/>
+                    </a:bodyPr>
+                    <a:p>
+                      <a:pPr>
+                        <a:defRPr lang="ko-KR" altLang="en-US"/>
+                      </a:pPr>
+                      <a:endParaRPr lang="ko-KR" altLang="en-US" sz="100"/>
+                    </a:p>
+                  </a:txBody>
+                  <a:tcPr marL="91440" marR="91440"/>
+                </a:tc>
+                <a:tc>
+                  <a:txBody>
+                    <a:bodyPr vert="horz" wrap="square" lIns="91440" tIns="45720" rIns="91440" bIns="45720" anchor="t" anchorCtr="0">
+                      <a:spAutoFit/>
+                    </a:bodyPr>
+                    <a:p>
+                      <a:pPr>
+                        <a:defRPr lang="ko-KR" altLang="en-US"/>
+                      </a:pPr>
+                      <a:endParaRPr lang="ko-KR" altLang="en-US" sz="100"/>
+                    </a:p>
+                  </a:txBody>
+                  <a:tcPr marL="91440" marR="91440"/>
+                </a:tc>
+                <a:tc>
+                  <a:txBody>
+                    <a:bodyPr vert="horz" wrap="square" lIns="91440" tIns="45720" rIns="91440" bIns="45720" anchor="t" anchorCtr="0">
+                      <a:spAutoFit/>
+                    </a:bodyPr>
+                    <a:p>
+                      <a:pPr>
+                        <a:defRPr lang="ko-KR" altLang="en-US"/>
+                      </a:pPr>
+                      <a:endParaRPr lang="ko-KR" altLang="en-US" sz="100"/>
+                    </a:p>
+                  </a:txBody>
+                  <a:tcPr marL="91440" marR="91440"/>
+                </a:tc>
+                <a:tc>
+                  <a:txBody>
+                    <a:bodyPr vert="horz" wrap="square" lIns="91440" tIns="45720" rIns="91440" bIns="45720" anchor="t" anchorCtr="0">
+                      <a:spAutoFit/>
+                    </a:bodyPr>
+                    <a:p>
+                      <a:pPr>
+                        <a:defRPr lang="ko-KR" altLang="en-US"/>
+                      </a:pPr>
+                      <a:endParaRPr lang="ko-KR" altLang="en-US" sz="100"/>
+                    </a:p>
+                  </a:txBody>
+                  <a:tcPr marL="91440" marR="91440"/>
+                </a:tc>
+                <a:tc>
+                  <a:txBody>
+                    <a:bodyPr vert="horz" wrap="square" lIns="91440" tIns="45720" rIns="91440" bIns="45720" anchor="t" anchorCtr="0">
+                      <a:spAutoFit/>
+                    </a:bodyPr>
+                    <a:p>
+                      <a:pPr>
+                        <a:defRPr lang="ko-KR" altLang="en-US"/>
+                      </a:pPr>
+                      <a:endParaRPr lang="ko-KR" altLang="en-US" sz="100"/>
+                    </a:p>
+                  </a:txBody>
+                  <a:tcPr marL="91440" marR="91440"/>
+                </a:tc>
+                <a:tc>
+                  <a:txBody>
+                    <a:bodyPr vert="horz" wrap="square" lIns="91440" tIns="45720" rIns="91440" bIns="45720" anchor="t" anchorCtr="0">
+                      <a:spAutoFit/>
+                    </a:bodyPr>
+                    <a:p>
+                      <a:pPr>
+                        <a:defRPr lang="ko-KR" altLang="en-US"/>
+                      </a:pPr>
+                      <a:endParaRPr lang="ko-KR" altLang="en-US" sz="100"/>
+                    </a:p>
+                  </a:txBody>
+                  <a:tcPr marL="91440" marR="91440"/>
+                </a:tc>
+              </a:tr>
+              <a:tr h="287999">
+                <a:tc>
+                  <a:txBody>
+                    <a:bodyPr vert="horz" wrap="square" lIns="91440" tIns="45720" rIns="91440" bIns="45720" anchor="t" anchorCtr="0">
+                      <a:spAutoFit/>
+                    </a:bodyPr>
+                    <a:p>
+                      <a:pPr>
+                        <a:defRPr lang="ko-KR" altLang="en-US"/>
+                      </a:pPr>
+                      <a:endParaRPr lang="ko-KR" altLang="en-US" sz="100"/>
+                    </a:p>
+                  </a:txBody>
+                  <a:tcPr marL="91440" marR="91440"/>
+                </a:tc>
+                <a:tc>
+                  <a:txBody>
+                    <a:bodyPr vert="horz" wrap="square" lIns="91440" tIns="45720" rIns="91440" bIns="45720" anchor="t" anchorCtr="0">
+                      <a:spAutoFit/>
+                    </a:bodyPr>
+                    <a:p>
+                      <a:pPr>
+                        <a:defRPr lang="ko-KR" altLang="en-US"/>
+                      </a:pPr>
+                      <a:endParaRPr lang="ko-KR" altLang="en-US" sz="100"/>
+                    </a:p>
+                  </a:txBody>
+                  <a:tcPr marL="91440" marR="91440"/>
+                </a:tc>
+                <a:tc>
+                  <a:txBody>
+                    <a:bodyPr vert="horz" wrap="square" lIns="91440" tIns="45720" rIns="91440" bIns="45720" anchor="t" anchorCtr="0">
+                      <a:spAutoFit/>
+                    </a:bodyPr>
+                    <a:p>
+                      <a:pPr>
+                        <a:defRPr lang="ko-KR" altLang="en-US"/>
+                      </a:pPr>
+                      <a:endParaRPr lang="ko-KR" altLang="en-US" sz="100"/>
+                    </a:p>
+                  </a:txBody>
+                  <a:tcPr marL="91440" marR="91440"/>
+                </a:tc>
+                <a:tc>
+                  <a:txBody>
+                    <a:bodyPr vert="horz" wrap="square" lIns="91440" tIns="45720" rIns="91440" bIns="45720" anchor="t" anchorCtr="0">
+                      <a:spAutoFit/>
+                    </a:bodyPr>
+                    <a:p>
+                      <a:pPr>
+                        <a:defRPr lang="ko-KR" altLang="en-US"/>
+                      </a:pPr>
+                      <a:endParaRPr lang="ko-KR" altLang="en-US" sz="100"/>
+                    </a:p>
+                  </a:txBody>
+                  <a:tcPr marL="91440" marR="91440"/>
+                </a:tc>
+                <a:tc>
+                  <a:txBody>
+                    <a:bodyPr vert="horz" wrap="square" lIns="91440" tIns="45720" rIns="91440" bIns="45720" anchor="t" anchorCtr="0">
+                      <a:spAutoFit/>
+                    </a:bodyPr>
+                    <a:p>
+                      <a:pPr>
+                        <a:defRPr lang="ko-KR" altLang="en-US"/>
+                      </a:pPr>
+                      <a:endParaRPr lang="ko-KR" altLang="en-US" sz="100"/>
+                    </a:p>
+                  </a:txBody>
+                  <a:tcPr marL="91440" marR="91440"/>
+                </a:tc>
+                <a:tc>
+                  <a:txBody>
+                    <a:bodyPr vert="horz" wrap="square" lIns="91440" tIns="45720" rIns="91440" bIns="45720" anchor="t" anchorCtr="0">
+                      <a:spAutoFit/>
+                    </a:bodyPr>
+                    <a:p>
+                      <a:pPr>
+                        <a:defRPr lang="ko-KR" altLang="en-US"/>
+                      </a:pPr>
+                      <a:endParaRPr lang="ko-KR" altLang="en-US" sz="100"/>
+                    </a:p>
+                  </a:txBody>
+                  <a:tcPr marL="91440" marR="91440"/>
+                </a:tc>
+                <a:tc>
+                  <a:txBody>
+                    <a:bodyPr vert="horz" wrap="square" lIns="91440" tIns="45720" rIns="91440" bIns="45720" anchor="t" anchorCtr="0">
+                      <a:spAutoFit/>
+                    </a:bodyPr>
+                    <a:p>
+                      <a:pPr>
+                        <a:defRPr lang="ko-KR" altLang="en-US"/>
+                      </a:pPr>
+                      <a:endParaRPr lang="ko-KR" altLang="en-US" sz="100"/>
+                    </a:p>
+                  </a:txBody>
+                  <a:tcPr marL="91440" marR="91440"/>
+                </a:tc>
+                <a:tc>
+                  <a:txBody>
+                    <a:bodyPr vert="horz" wrap="square" lIns="91440" tIns="45720" rIns="91440" bIns="45720" anchor="t" anchorCtr="0">
+                      <a:spAutoFit/>
+                    </a:bodyPr>
+                    <a:p>
+                      <a:pPr>
+                        <a:defRPr lang="ko-KR" altLang="en-US"/>
+                      </a:pPr>
+                      <a:endParaRPr lang="ko-KR" altLang="en-US" sz="100"/>
+                    </a:p>
+                  </a:txBody>
+                  <a:tcPr marL="91440" marR="91440"/>
+                </a:tc>
+                <a:tc>
+                  <a:txBody>
+                    <a:bodyPr vert="horz" wrap="square" lIns="91440" tIns="45720" rIns="91440" bIns="45720" anchor="t" anchorCtr="0">
+                      <a:spAutoFit/>
+                    </a:bodyPr>
+                    <a:p>
+                      <a:pPr>
+                        <a:defRPr lang="ko-KR" altLang="en-US"/>
+                      </a:pPr>
+                      <a:endParaRPr lang="ko-KR" altLang="en-US" sz="100"/>
+                    </a:p>
+                  </a:txBody>
+                  <a:tcPr marL="91440" marR="91440"/>
+                </a:tc>
+                <a:tc>
+                  <a:txBody>
+                    <a:bodyPr vert="horz" wrap="square" lIns="91440" tIns="45720" rIns="91440" bIns="45720" anchor="t" anchorCtr="0">
+                      <a:spAutoFit/>
+                    </a:bodyPr>
+                    <a:p>
+                      <a:pPr>
+                        <a:defRPr lang="ko-KR" altLang="en-US"/>
+                      </a:pPr>
+                      <a:endParaRPr lang="ko-KR" altLang="en-US" sz="100"/>
+                    </a:p>
+                  </a:txBody>
+                  <a:tcPr marL="91440" marR="91440"/>
+                </a:tc>
+              </a:tr>
+            </a:tbl>
+          </a:graphicData>
+        </a:graphic>
+      </p:graphicFrame>
+      <p:sp>
+        <p:nvSpPr>
+          <p:cNvPr id="51" name=""/>
+          <p:cNvSpPr txBox="1"/>
+          <p:nvPr/>
+        </p:nvSpPr>
+        <p:spPr>
+          <a:xfrm>
+            <a:off x="8328279" y="2276856"/>
+            <a:ext cx="2952368" cy="1001670"/>
+          </a:xfrm>
+          <a:prstGeom prst="rect">
+            <a:avLst/>
+          </a:prstGeom>
+        </p:spPr>
+        <p:txBody>
+          <a:bodyPr wrap="square">
+            <a:spAutoFit/>
+          </a:bodyPr>
+          <a:lstStyle/>
+          <a:p>
+            <a:pPr algn="ctr">
+              <a:defRPr lang="ko-KR" altLang="en-US"/>
+            </a:pPr>
+            <a:r>
+              <a:rPr lang="en-US" altLang="ko-KR" sz="2000">
+                <a:solidFill>
+                  <a:schemeClr val="tx1"/>
+                </a:solidFill>
+              </a:rPr>
+              <a:t>20 X 10</a:t>
+            </a:r>
+            <a:endParaRPr lang="en-US" altLang="ko-KR" sz="2000">
+              <a:solidFill>
+                <a:schemeClr val="tx1"/>
+              </a:solidFill>
+            </a:endParaRPr>
+          </a:p>
+          <a:p>
+            <a:pPr algn="ctr">
+              <a:defRPr lang="ko-KR" altLang="en-US"/>
+            </a:pPr>
+            <a:r>
+              <a:rPr lang="ko-KR" altLang="en-US" sz="2000">
+                <a:solidFill>
+                  <a:schemeClr val="tx1"/>
+                </a:solidFill>
+              </a:rPr>
+              <a:t>블럭 한 칸 </a:t>
+            </a:r>
+            <a:r>
+              <a:rPr lang="en-US" altLang="ko-KR" sz="2000">
+                <a:solidFill>
+                  <a:schemeClr val="tx1"/>
+                </a:solidFill>
+              </a:rPr>
+              <a:t>20</a:t>
+            </a:r>
+            <a:endParaRPr lang="en-US" altLang="ko-KR" sz="2000">
+              <a:solidFill>
+                <a:schemeClr val="tx1"/>
+              </a:solidFill>
+            </a:endParaRPr>
+          </a:p>
+          <a:p>
+            <a:pPr algn="ctr">
+              <a:defRPr lang="ko-KR" altLang="en-US"/>
+            </a:pPr>
+            <a:r>
+              <a:rPr lang="ko-KR" altLang="en-US" sz="2000">
+                <a:solidFill>
+                  <a:schemeClr val="tx1"/>
+                </a:solidFill>
+              </a:rPr>
+              <a:t>총 크기 </a:t>
+            </a:r>
+            <a:r>
+              <a:rPr lang="en-US" altLang="ko-KR" sz="2000">
+                <a:solidFill>
+                  <a:schemeClr val="tx1"/>
+                </a:solidFill>
+              </a:rPr>
+              <a:t>400 X 200</a:t>
+            </a:r>
+            <a:endParaRPr lang="en-US" altLang="ko-KR" sz="2000">
+              <a:solidFill>
+                <a:schemeClr val="tx1"/>
+              </a:solidFill>
+            </a:endParaRPr>
+          </a:p>
+        </p:txBody>
+      </p:sp>
+    </p:spTree>
+  </p:cSld>
+  <p:clrMapOvr>
+    <a:masterClrMapping/>
+  </p:clrMapOvr>
+  <mc:AlternateContent xmlns:mc="http://schemas.openxmlformats.org/markup-compatibility/2006">
+    <mc:Choice xmlns:p14="http://schemas.microsoft.com/office/powerpoint/2010/main" Requires="p14">
+      <p:transition xmlns:mc="http://schemas.openxmlformats.org/markup-compatibility/2006" xmlns:p14="http://schemas.microsoft.com/office/powerpoint/2010/main" mc:Ignorable="p14" p14:dur="500"/>
+    </mc:Choice>
+    <mc:Fallback>
+      <p:transition/>
+    </mc:Fallback>
+  </mc:AlternateContent>
+</p:sld>
+</file>
+
+<file path=ppt/slides/slide15.xml><?xml version="1.0" encoding="utf-8"?>
 <p:sld xmlns:r="http://schemas.openxmlformats.org/officeDocument/2006/relationships" xmlns:c="http://schemas.openxmlformats.org/drawingml/2006/chart" xmlns:a="http://schemas.openxmlformats.org/drawingml/2006/main" xmlns:dgm="http://schemas.openxmlformats.org/drawingml/2006/diagram" xmlns:dsp="http://schemas.microsoft.com/office/drawing/2008/diagram" xmlns:p="http://schemas.openxmlformats.org/presentationml/2006/main">
   <p:cSld>
     <p:spTree>

</xml_diff>

<commit_message>
draw what is next Block
</commit_message>
<xml_diff>
--- a/Document/Tetris plan.pptx
+++ b/Document/Tetris plan.pptx
@@ -12176,6 +12176,10 @@
                       <a:pPr algn="ctr">
                         <a:defRPr lang="ko-KR" altLang="en-US"/>
                       </a:pPr>
+                      <a:r>
+                        <a:rPr lang="ko-KR" altLang="en-US"/>
+                        <a:t>2018.07.27</a:t>
+                      </a:r>
                       <a:endParaRPr lang="ko-KR" altLang="en-US"/>
                     </a:p>
                   </a:txBody>
@@ -12190,6 +12194,10 @@
                       <a:pPr algn="ctr">
                         <a:defRPr lang="ko-KR" altLang="en-US"/>
                       </a:pPr>
+                      <a:r>
+                        <a:rPr lang="ko-KR" altLang="en-US"/>
+                        <a:t>게임판 크기 추가</a:t>
+                      </a:r>
                       <a:endParaRPr lang="ko-KR" altLang="en-US"/>
                     </a:p>
                   </a:txBody>
@@ -12204,6 +12212,10 @@
                       <a:pPr algn="ctr">
                         <a:defRPr lang="ko-KR" altLang="en-US"/>
                       </a:pPr>
+                      <a:r>
+                        <a:rPr lang="ko-KR" altLang="en-US"/>
+                        <a:t>햄과함께</a:t>
+                      </a:r>
                       <a:endParaRPr lang="ko-KR" altLang="en-US"/>
                     </a:p>
                   </a:txBody>

</xml_diff>

<commit_message>
add center of block image
</commit_message>
<xml_diff>
--- a/Document/Tetris plan.pptx
+++ b/Document/Tetris plan.pptx
@@ -3855,7 +3855,7 @@
                   </a:txBody>
                   <a:tcPr marL="91440" marR="91440">
                     <a:solidFill>
-                      <a:schemeClr val="accent2"/>
+                      <a:schemeClr val="bg1"/>
                     </a:solidFill>
                   </a:tcPr>
                 </a:tc>
@@ -3911,24 +3911,6 @@
                   </a:txBody>
                   <a:tcPr marL="91440" marR="91440">
                     <a:solidFill>
-                      <a:schemeClr val="bg1"/>
-                    </a:solidFill>
-                  </a:tcPr>
-                </a:tc>
-                <a:tc>
-                  <a:txBody>
-                    <a:bodyPr vert="horz" wrap="square" lIns="91440" tIns="45720" rIns="91440" bIns="45720" anchor="t" anchorCtr="0">
-                      <a:spAutoFit/>
-                    </a:bodyPr>
-                    <a:p>
-                      <a:pPr>
-                        <a:defRPr lang="ko-KR" altLang="en-US"/>
-                      </a:pPr>
-                      <a:endParaRPr lang="ko-KR" altLang="en-US"/>
-                    </a:p>
-                  </a:txBody>
-                  <a:tcPr marL="91440" marR="91440">
-                    <a:solidFill>
                       <a:schemeClr val="accent2"/>
                     </a:solidFill>
                   </a:tcPr>
@@ -3947,25 +3929,55 @@
                   </a:txBody>
                   <a:tcPr marL="91440" marR="91440">
                     <a:solidFill>
-                      <a:schemeClr val="bg1"/>
-                    </a:solidFill>
-                  </a:tcPr>
-                </a:tc>
-                <a:tc>
-                  <a:txBody>
-                    <a:bodyPr vert="horz" wrap="square" lIns="91440" tIns="45720" rIns="91440" bIns="45720" anchor="t" anchorCtr="0">
-                      <a:spAutoFit/>
-                    </a:bodyPr>
-                    <a:p>
-                      <a:pPr>
-                        <a:defRPr lang="ko-KR" altLang="en-US"/>
-                      </a:pPr>
-                      <a:endParaRPr lang="ko-KR" altLang="en-US"/>
-                    </a:p>
-                  </a:txBody>
-                  <a:tcPr marL="91440" marR="91440">
-                    <a:solidFill>
-                      <a:schemeClr val="bg1"/>
+                      <a:schemeClr val="accent2"/>
+                    </a:solidFill>
+                  </a:tcPr>
+                </a:tc>
+                <a:tc>
+                  <a:txBody>
+                    <a:bodyPr vert="horz" wrap="square" lIns="91440" tIns="45720" rIns="91440" bIns="45720" anchor="ctr" anchorCtr="0">
+                      <a:spAutoFit/>
+                    </a:bodyPr>
+                    <a:p>
+                      <a:pPr algn="ctr">
+                        <a:defRPr lang="ko-KR" altLang="en-US"/>
+                      </a:pPr>
+                      <a:r>
+                        <a:rPr lang="ko-KR" altLang="en-US">
+                          <a:solidFill>
+                            <a:schemeClr val="bg1"/>
+                          </a:solidFill>
+                        </a:rPr>
+                        <a:t>●</a:t>
+                      </a:r>
+                      <a:endParaRPr lang="ko-KR" altLang="en-US">
+                        <a:solidFill>
+                          <a:schemeClr val="bg1"/>
+                        </a:solidFill>
+                      </a:endParaRPr>
+                    </a:p>
+                  </a:txBody>
+                  <a:tcPr marL="91440" marR="91440" anchor="ctr">
+                    <a:solidFill>
+                      <a:schemeClr val="accent2"/>
+                    </a:solidFill>
+                  </a:tcPr>
+                </a:tc>
+                <a:tc>
+                  <a:txBody>
+                    <a:bodyPr vert="horz" wrap="square" lIns="91440" tIns="45720" rIns="91440" bIns="45720" anchor="t" anchorCtr="0">
+                      <a:spAutoFit/>
+                    </a:bodyPr>
+                    <a:p>
+                      <a:pPr>
+                        <a:defRPr lang="ko-KR" altLang="en-US"/>
+                      </a:pPr>
+                      <a:endParaRPr lang="ko-KR" altLang="en-US"/>
+                    </a:p>
+                  </a:txBody>
+                  <a:tcPr marL="91440" marR="91440">
+                    <a:solidFill>
+                      <a:schemeClr val="accent2"/>
                     </a:solidFill>
                   </a:tcPr>
                 </a:tc>
@@ -4003,7 +4015,7 @@
                   </a:txBody>
                   <a:tcPr marL="91440" marR="91440">
                     <a:solidFill>
-                      <a:schemeClr val="accent2"/>
+                      <a:schemeClr val="bg1"/>
                     </a:solidFill>
                   </a:tcPr>
                 </a:tc>
@@ -4077,7 +4089,7 @@
                   </a:txBody>
                   <a:tcPr marL="91440" marR="91440">
                     <a:solidFill>
-                      <a:schemeClr val="accent2"/>
+                      <a:schemeClr val="bg1"/>
                     </a:solidFill>
                   </a:tcPr>
                 </a:tc>
@@ -4235,7 +4247,7 @@
                   </a:txBody>
                   <a:tcPr marL="91440" marR="91440">
                     <a:solidFill>
-                      <a:schemeClr val="bg1"/>
+                      <a:schemeClr val="accent2"/>
                     </a:solidFill>
                   </a:tcPr>
                 </a:tc>
@@ -4273,6 +4285,54 @@
                   </a:txBody>
                   <a:tcPr marL="91440" marR="91440">
                     <a:solidFill>
+                      <a:schemeClr val="bg1"/>
+                    </a:solidFill>
+                  </a:tcPr>
+                </a:tc>
+                <a:tc>
+                  <a:txBody>
+                    <a:bodyPr vert="horz" wrap="square" lIns="91440" tIns="45720" rIns="91440" bIns="45720" anchor="t" anchorCtr="0">
+                      <a:spAutoFit/>
+                    </a:bodyPr>
+                    <a:p>
+                      <a:pPr>
+                        <a:defRPr lang="ko-KR" altLang="en-US"/>
+                      </a:pPr>
+                      <a:endParaRPr lang="ko-KR" altLang="en-US"/>
+                    </a:p>
+                  </a:txBody>
+                  <a:tcPr marL="91440" marR="91440">
+                    <a:solidFill>
+                      <a:schemeClr val="bg1"/>
+                    </a:solidFill>
+                  </a:tcPr>
+                </a:tc>
+                <a:tc>
+                  <a:txBody>
+                    <a:bodyPr vert="horz" wrap="square" lIns="91440" tIns="45720" rIns="91440" bIns="45720" anchor="ctr" anchorCtr="0">
+                      <a:spAutoFit/>
+                    </a:bodyPr>
+                    <a:p>
+                      <a:pPr algn="ctr">
+                        <a:defRPr lang="ko-KR" altLang="en-US"/>
+                      </a:pPr>
+                      <a:r>
+                        <a:rPr lang="ko-KR" altLang="en-US">
+                          <a:solidFill>
+                            <a:schemeClr val="bg1"/>
+                          </a:solidFill>
+                        </a:rPr>
+                        <a:t>●</a:t>
+                      </a:r>
+                      <a:endParaRPr lang="ko-KR" altLang="en-US">
+                        <a:solidFill>
+                          <a:schemeClr val="bg1"/>
+                        </a:solidFill>
+                      </a:endParaRPr>
+                    </a:p>
+                  </a:txBody>
+                  <a:tcPr marL="91440" marR="91440" anchor="ctr">
+                    <a:solidFill>
                       <a:schemeClr val="accent2"/>
                     </a:solidFill>
                   </a:tcPr>
@@ -4291,43 +4351,7 @@
                   </a:txBody>
                   <a:tcPr marL="91440" marR="91440">
                     <a:solidFill>
-                      <a:schemeClr val="accent2"/>
-                    </a:solidFill>
-                  </a:tcPr>
-                </a:tc>
-                <a:tc>
-                  <a:txBody>
-                    <a:bodyPr vert="horz" wrap="square" lIns="91440" tIns="45720" rIns="91440" bIns="45720" anchor="t" anchorCtr="0">
-                      <a:spAutoFit/>
-                    </a:bodyPr>
-                    <a:p>
-                      <a:pPr>
-                        <a:defRPr lang="ko-KR" altLang="en-US"/>
-                      </a:pPr>
-                      <a:endParaRPr lang="ko-KR" altLang="en-US"/>
-                    </a:p>
-                  </a:txBody>
-                  <a:tcPr marL="91440" marR="91440">
-                    <a:solidFill>
-                      <a:schemeClr val="accent2"/>
-                    </a:solidFill>
-                  </a:tcPr>
-                </a:tc>
-                <a:tc>
-                  <a:txBody>
-                    <a:bodyPr vert="horz" wrap="square" lIns="91440" tIns="45720" rIns="91440" bIns="45720" anchor="t" anchorCtr="0">
-                      <a:spAutoFit/>
-                    </a:bodyPr>
-                    <a:p>
-                      <a:pPr>
-                        <a:defRPr lang="ko-KR" altLang="en-US"/>
-                      </a:pPr>
-                      <a:endParaRPr lang="ko-KR" altLang="en-US"/>
-                    </a:p>
-                  </a:txBody>
-                  <a:tcPr marL="91440" marR="91440">
-                    <a:solidFill>
-                      <a:schemeClr val="accent2"/>
+                      <a:schemeClr val="bg1"/>
                     </a:solidFill>
                   </a:tcPr>
                 </a:tc>
@@ -4383,7 +4407,7 @@
                   </a:txBody>
                   <a:tcPr marL="91440" marR="91440">
                     <a:solidFill>
-                      <a:schemeClr val="bg1"/>
+                      <a:schemeClr val="accent2"/>
                     </a:solidFill>
                   </a:tcPr>
                 </a:tc>
@@ -4457,7 +4481,7 @@
                   </a:txBody>
                   <a:tcPr marL="91440" marR="91440">
                     <a:solidFill>
-                      <a:schemeClr val="bg1"/>
+                      <a:schemeClr val="accent2"/>
                     </a:solidFill>
                   </a:tcPr>
                 </a:tc>
@@ -4652,17 +4676,29 @@
                 </a:tc>
                 <a:tc>
                   <a:txBody>
-                    <a:bodyPr vert="horz" wrap="square" lIns="91440" tIns="45720" rIns="91440" bIns="45720" anchor="t" anchorCtr="0">
-                      <a:spAutoFit/>
-                    </a:bodyPr>
-                    <a:p>
-                      <a:pPr>
-                        <a:defRPr lang="ko-KR" altLang="en-US"/>
-                      </a:pPr>
-                      <a:endParaRPr lang="ko-KR" altLang="en-US"/>
-                    </a:p>
-                  </a:txBody>
-                  <a:tcPr marL="91440" marR="91440">
+                    <a:bodyPr vert="horz" wrap="square" lIns="91440" tIns="45720" rIns="91440" bIns="45720" anchor="ctr" anchorCtr="0">
+                      <a:spAutoFit/>
+                    </a:bodyPr>
+                    <a:p>
+                      <a:pPr algn="ctr">
+                        <a:defRPr lang="ko-KR" altLang="en-US"/>
+                      </a:pPr>
+                      <a:r>
+                        <a:rPr lang="ko-KR" altLang="en-US">
+                          <a:solidFill>
+                            <a:schemeClr val="tx1"/>
+                          </a:solidFill>
+                        </a:rPr>
+                        <a:t>●</a:t>
+                      </a:r>
+                      <a:endParaRPr lang="ko-KR" altLang="en-US">
+                        <a:solidFill>
+                          <a:schemeClr val="tx1"/>
+                        </a:solidFill>
+                      </a:endParaRPr>
+                    </a:p>
+                  </a:txBody>
+                  <a:tcPr marL="91440" marR="91440" anchor="ctr">
                     <a:solidFill>
                       <a:srgbClr val="ffff00"/>
                     </a:solidFill>
@@ -5014,17 +5050,29 @@
                 </a:tc>
                 <a:tc>
                   <a:txBody>
-                    <a:bodyPr vert="horz" wrap="square" lIns="91440" tIns="45720" rIns="91440" bIns="45720" anchor="t" anchorCtr="0">
-                      <a:spAutoFit/>
-                    </a:bodyPr>
-                    <a:p>
-                      <a:pPr>
-                        <a:defRPr lang="ko-KR" altLang="en-US"/>
-                      </a:pPr>
-                      <a:endParaRPr lang="ko-KR" altLang="en-US"/>
-                    </a:p>
-                  </a:txBody>
-                  <a:tcPr marL="91440" marR="91440">
+                    <a:bodyPr vert="horz" wrap="square" lIns="91440" tIns="45720" rIns="91440" bIns="45720" anchor="ctr" anchorCtr="0">
+                      <a:spAutoFit/>
+                    </a:bodyPr>
+                    <a:p>
+                      <a:pPr algn="ctr">
+                        <a:defRPr lang="ko-KR" altLang="en-US"/>
+                      </a:pPr>
+                      <a:r>
+                        <a:rPr lang="ko-KR" altLang="en-US">
+                          <a:solidFill>
+                            <a:schemeClr val="tx1"/>
+                          </a:solidFill>
+                        </a:rPr>
+                        <a:t>●</a:t>
+                      </a:r>
+                      <a:endParaRPr lang="ko-KR" altLang="en-US">
+                        <a:solidFill>
+                          <a:schemeClr val="tx1"/>
+                        </a:solidFill>
+                      </a:endParaRPr>
+                    </a:p>
+                  </a:txBody>
+                  <a:tcPr marL="91440" marR="91440" anchor="ctr">
                     <a:solidFill>
                       <a:srgbClr val="ffff00"/>
                     </a:solidFill>
@@ -5336,17 +5384,29 @@
                 </a:tc>
                 <a:tc>
                   <a:txBody>
-                    <a:bodyPr vert="horz" wrap="square" lIns="91440" tIns="45720" rIns="91440" bIns="45720" anchor="t" anchorCtr="0">
-                      <a:spAutoFit/>
-                    </a:bodyPr>
-                    <a:p>
-                      <a:pPr>
-                        <a:defRPr lang="ko-KR" altLang="en-US"/>
-                      </a:pPr>
-                      <a:endParaRPr lang="ko-KR" altLang="en-US"/>
-                    </a:p>
-                  </a:txBody>
-                  <a:tcPr marL="91440" marR="91440">
+                    <a:bodyPr vert="horz" wrap="square" lIns="91440" tIns="45720" rIns="91440" bIns="45720" anchor="ctr" anchorCtr="0">
+                      <a:spAutoFit/>
+                    </a:bodyPr>
+                    <a:p>
+                      <a:pPr algn="ctr">
+                        <a:defRPr lang="ko-KR" altLang="en-US"/>
+                      </a:pPr>
+                      <a:r>
+                        <a:rPr lang="ko-KR" altLang="en-US">
+                          <a:solidFill>
+                            <a:schemeClr val="tx1"/>
+                          </a:solidFill>
+                        </a:rPr>
+                        <a:t>●</a:t>
+                      </a:r>
+                      <a:endParaRPr lang="ko-KR" altLang="en-US">
+                        <a:solidFill>
+                          <a:schemeClr val="tx1"/>
+                        </a:solidFill>
+                      </a:endParaRPr>
+                    </a:p>
+                  </a:txBody>
+                  <a:tcPr marL="91440" marR="91440" anchor="ctr">
                     <a:solidFill>
                       <a:srgbClr val="ffff00"/>
                     </a:solidFill>
@@ -5658,17 +5718,29 @@
                 </a:tc>
                 <a:tc>
                   <a:txBody>
-                    <a:bodyPr vert="horz" wrap="square" lIns="91440" tIns="45720" rIns="91440" bIns="45720" anchor="t" anchorCtr="0">
-                      <a:spAutoFit/>
-                    </a:bodyPr>
-                    <a:p>
-                      <a:pPr>
-                        <a:defRPr lang="ko-KR" altLang="en-US"/>
-                      </a:pPr>
-                      <a:endParaRPr lang="ko-KR" altLang="en-US"/>
-                    </a:p>
-                  </a:txBody>
-                  <a:tcPr marL="91440" marR="91440">
+                    <a:bodyPr vert="horz" wrap="square" lIns="91440" tIns="45720" rIns="91440" bIns="45720" anchor="ctr" anchorCtr="0">
+                      <a:spAutoFit/>
+                    </a:bodyPr>
+                    <a:p>
+                      <a:pPr algn="ctr">
+                        <a:defRPr lang="ko-KR" altLang="en-US"/>
+                      </a:pPr>
+                      <a:r>
+                        <a:rPr lang="ko-KR" altLang="en-US">
+                          <a:solidFill>
+                            <a:schemeClr val="tx1"/>
+                          </a:solidFill>
+                        </a:rPr>
+                        <a:t>●</a:t>
+                      </a:r>
+                      <a:endParaRPr lang="ko-KR" altLang="en-US">
+                        <a:solidFill>
+                          <a:schemeClr val="tx1"/>
+                        </a:solidFill>
+                      </a:endParaRPr>
+                    </a:p>
+                  </a:txBody>
+                  <a:tcPr marL="91440" marR="91440" anchor="ctr">
                     <a:solidFill>
                       <a:srgbClr val="ffff00"/>
                     </a:solidFill>
@@ -5951,25 +6023,25 @@
                   </a:txBody>
                   <a:tcPr marL="91440" marR="91440">
                     <a:solidFill>
+                      <a:schemeClr val="bg1"/>
+                    </a:solidFill>
+                  </a:tcPr>
+                </a:tc>
+                <a:tc>
+                  <a:txBody>
+                    <a:bodyPr vert="horz" wrap="square" lIns="91440" tIns="45720" rIns="91440" bIns="45720" anchor="t" anchorCtr="0">
+                      <a:spAutoFit/>
+                    </a:bodyPr>
+                    <a:p>
+                      <a:pPr>
+                        <a:defRPr lang="ko-KR" altLang="en-US"/>
+                      </a:pPr>
+                      <a:endParaRPr lang="ko-KR" altLang="en-US"/>
+                    </a:p>
+                  </a:txBody>
+                  <a:tcPr marL="91440" marR="91440">
+                    <a:solidFill>
                       <a:srgbClr val="87c04e"/>
-                    </a:solidFill>
-                  </a:tcPr>
-                </a:tc>
-                <a:tc>
-                  <a:txBody>
-                    <a:bodyPr vert="horz" wrap="square" lIns="91440" tIns="45720" rIns="91440" bIns="45720" anchor="t" anchorCtr="0">
-                      <a:spAutoFit/>
-                    </a:bodyPr>
-                    <a:p>
-                      <a:pPr>
-                        <a:defRPr lang="ko-KR" altLang="en-US"/>
-                      </a:pPr>
-                      <a:endParaRPr lang="ko-KR" altLang="en-US"/>
-                    </a:p>
-                  </a:txBody>
-                  <a:tcPr marL="91440" marR="91440">
-                    <a:solidFill>
-                      <a:schemeClr val="bg1"/>
                     </a:solidFill>
                   </a:tcPr>
                 </a:tc>
@@ -5989,23 +6061,53 @@
                   </a:txBody>
                   <a:tcPr marL="91440" marR="91440">
                     <a:solidFill>
+                      <a:schemeClr val="bg1"/>
+                    </a:solidFill>
+                  </a:tcPr>
+                </a:tc>
+                <a:tc>
+                  <a:txBody>
+                    <a:bodyPr vert="horz" wrap="square" lIns="91440" tIns="45720" rIns="91440" bIns="45720" anchor="t" anchorCtr="0">
+                      <a:spAutoFit/>
+                    </a:bodyPr>
+                    <a:p>
+                      <a:pPr>
+                        <a:defRPr lang="ko-KR" altLang="en-US"/>
+                      </a:pPr>
+                      <a:endParaRPr lang="ko-KR" altLang="en-US"/>
+                    </a:p>
+                  </a:txBody>
+                  <a:tcPr marL="91440" marR="91440">
+                    <a:solidFill>
                       <a:srgbClr val="87c04e"/>
                     </a:solidFill>
                   </a:tcPr>
                 </a:tc>
                 <a:tc>
                   <a:txBody>
-                    <a:bodyPr vert="horz" wrap="square" lIns="91440" tIns="45720" rIns="91440" bIns="45720" anchor="t" anchorCtr="0">
-                      <a:spAutoFit/>
-                    </a:bodyPr>
-                    <a:p>
-                      <a:pPr>
-                        <a:defRPr lang="ko-KR" altLang="en-US"/>
-                      </a:pPr>
-                      <a:endParaRPr lang="ko-KR" altLang="en-US"/>
-                    </a:p>
-                  </a:txBody>
-                  <a:tcPr marL="91440" marR="91440">
+                    <a:bodyPr vert="horz" wrap="square" lIns="91440" tIns="45720" rIns="91440" bIns="45720" anchor="ctr" anchorCtr="0">
+                      <a:spAutoFit/>
+                    </a:bodyPr>
+                    <a:p>
+                      <a:pPr algn="ctr">
+                        <a:defRPr lang="ko-KR" altLang="en-US"/>
+                      </a:pPr>
+                      <a:r>
+                        <a:rPr lang="ko-KR" altLang="en-US">
+                          <a:solidFill>
+                            <a:schemeClr val="bg1"/>
+                          </a:solidFill>
+                        </a:rPr>
+                        <a:t>●</a:t>
+                      </a:r>
+                      <a:endParaRPr lang="ko-KR" altLang="en-US">
+                        <a:solidFill>
+                          <a:schemeClr val="bg1"/>
+                        </a:solidFill>
+                      </a:endParaRPr>
+                    </a:p>
+                  </a:txBody>
+                  <a:tcPr marL="91440" marR="91440" anchor="ctr">
                     <a:solidFill>
                       <a:srgbClr val="87c04e"/>
                     </a:solidFill>
@@ -6026,24 +6128,6 @@
                   <a:tcPr marL="91440" marR="91440">
                     <a:solidFill>
                       <a:srgbClr val="87c04e"/>
-                    </a:solidFill>
-                  </a:tcPr>
-                </a:tc>
-                <a:tc>
-                  <a:txBody>
-                    <a:bodyPr vert="horz" wrap="square" lIns="91440" tIns="45720" rIns="91440" bIns="45720" anchor="t" anchorCtr="0">
-                      <a:spAutoFit/>
-                    </a:bodyPr>
-                    <a:p>
-                      <a:pPr>
-                        <a:defRPr lang="ko-KR" altLang="en-US"/>
-                      </a:pPr>
-                      <a:endParaRPr lang="ko-KR" altLang="en-US"/>
-                    </a:p>
-                  </a:txBody>
-                  <a:tcPr marL="91440" marR="91440">
-                    <a:solidFill>
-                      <a:schemeClr val="bg1"/>
                     </a:solidFill>
                   </a:tcPr>
                 </a:tc>
@@ -6295,25 +6379,25 @@
                   </a:txBody>
                   <a:tcPr marL="91440" marR="91440">
                     <a:solidFill>
+                      <a:schemeClr val="bg1"/>
+                    </a:solidFill>
+                  </a:tcPr>
+                </a:tc>
+                <a:tc>
+                  <a:txBody>
+                    <a:bodyPr vert="horz" wrap="square" lIns="91440" tIns="45720" rIns="91440" bIns="45720" anchor="t" anchorCtr="0">
+                      <a:spAutoFit/>
+                    </a:bodyPr>
+                    <a:p>
+                      <a:pPr>
+                        <a:defRPr lang="ko-KR" altLang="en-US"/>
+                      </a:pPr>
+                      <a:endParaRPr lang="ko-KR" altLang="en-US"/>
+                    </a:p>
+                  </a:txBody>
+                  <a:tcPr marL="91440" marR="91440">
+                    <a:solidFill>
                       <a:srgbClr val="87c04e"/>
-                    </a:solidFill>
-                  </a:tcPr>
-                </a:tc>
-                <a:tc>
-                  <a:txBody>
-                    <a:bodyPr vert="horz" wrap="square" lIns="91440" tIns="45720" rIns="91440" bIns="45720" anchor="t" anchorCtr="0">
-                      <a:spAutoFit/>
-                    </a:bodyPr>
-                    <a:p>
-                      <a:pPr>
-                        <a:defRPr lang="ko-KR" altLang="en-US"/>
-                      </a:pPr>
-                      <a:endParaRPr lang="ko-KR" altLang="en-US"/>
-                    </a:p>
-                  </a:txBody>
-                  <a:tcPr marL="91440" marR="91440">
-                    <a:solidFill>
-                      <a:schemeClr val="bg1"/>
                     </a:solidFill>
                   </a:tcPr>
                 </a:tc>
@@ -6369,25 +6453,37 @@
                   </a:txBody>
                   <a:tcPr marL="91440" marR="91440">
                     <a:solidFill>
+                      <a:schemeClr val="bg1"/>
+                    </a:solidFill>
+                  </a:tcPr>
+                </a:tc>
+                <a:tc>
+                  <a:txBody>
+                    <a:bodyPr vert="horz" wrap="square" lIns="91440" tIns="45720" rIns="91440" bIns="45720" anchor="ctr" anchorCtr="0">
+                      <a:spAutoFit/>
+                    </a:bodyPr>
+                    <a:p>
+                      <a:pPr algn="ctr">
+                        <a:defRPr lang="ko-KR" altLang="en-US"/>
+                      </a:pPr>
+                      <a:r>
+                        <a:rPr lang="ko-KR" altLang="en-US">
+                          <a:solidFill>
+                            <a:schemeClr val="bg1"/>
+                          </a:solidFill>
+                        </a:rPr>
+                        <a:t>●</a:t>
+                      </a:r>
+                      <a:endParaRPr lang="ko-KR" altLang="en-US">
+                        <a:solidFill>
+                          <a:schemeClr val="bg1"/>
+                        </a:solidFill>
+                      </a:endParaRPr>
+                    </a:p>
+                  </a:txBody>
+                  <a:tcPr marL="91440" marR="91440" anchor="ctr">
+                    <a:solidFill>
                       <a:srgbClr val="87c04e"/>
-                    </a:solidFill>
-                  </a:tcPr>
-                </a:tc>
-                <a:tc>
-                  <a:txBody>
-                    <a:bodyPr vert="horz" wrap="square" lIns="91440" tIns="45720" rIns="91440" bIns="45720" anchor="t" anchorCtr="0">
-                      <a:spAutoFit/>
-                    </a:bodyPr>
-                    <a:p>
-                      <a:pPr>
-                        <a:defRPr lang="ko-KR" altLang="en-US"/>
-                      </a:pPr>
-                      <a:endParaRPr lang="ko-KR" altLang="en-US"/>
-                    </a:p>
-                  </a:txBody>
-                  <a:tcPr marL="91440" marR="91440">
-                    <a:solidFill>
-                      <a:schemeClr val="bg1"/>
                     </a:solidFill>
                   </a:tcPr>
                 </a:tc>
@@ -6443,6 +6539,24 @@
                   </a:txBody>
                   <a:tcPr marL="91440" marR="91440">
                     <a:solidFill>
+                      <a:schemeClr val="bg1"/>
+                    </a:solidFill>
+                  </a:tcPr>
+                </a:tc>
+                <a:tc>
+                  <a:txBody>
+                    <a:bodyPr vert="horz" wrap="square" lIns="91440" tIns="45720" rIns="91440" bIns="45720" anchor="t" anchorCtr="0">
+                      <a:spAutoFit/>
+                    </a:bodyPr>
+                    <a:p>
+                      <a:pPr>
+                        <a:defRPr lang="ko-KR" altLang="en-US"/>
+                      </a:pPr>
+                      <a:endParaRPr lang="ko-KR" altLang="en-US"/>
+                    </a:p>
+                  </a:txBody>
+                  <a:tcPr marL="91440" marR="91440">
+                    <a:solidFill>
                       <a:srgbClr val="87c04e"/>
                     </a:solidFill>
                   </a:tcPr>
@@ -6462,24 +6576,6 @@
                   <a:tcPr marL="91440" marR="91440">
                     <a:solidFill>
                       <a:srgbClr val="87c04e"/>
-                    </a:solidFill>
-                  </a:tcPr>
-                </a:tc>
-                <a:tc>
-                  <a:txBody>
-                    <a:bodyPr vert="horz" wrap="square" lIns="91440" tIns="45720" rIns="91440" bIns="45720" anchor="t" anchorCtr="0">
-                      <a:spAutoFit/>
-                    </a:bodyPr>
-                    <a:p>
-                      <a:pPr>
-                        <a:defRPr lang="ko-KR" altLang="en-US"/>
-                      </a:pPr>
-                      <a:endParaRPr lang="ko-KR" altLang="en-US"/>
-                    </a:p>
-                  </a:txBody>
-                  <a:tcPr marL="91440" marR="91440">
-                    <a:solidFill>
-                      <a:schemeClr val="bg1"/>
                     </a:solidFill>
                   </a:tcPr>
                 </a:tc>
@@ -6653,7 +6749,7 @@
                   </a:txBody>
                   <a:tcPr marL="91440" marR="91440">
                     <a:solidFill>
-                      <a:srgbClr val="87c04e"/>
+                      <a:schemeClr val="bg1"/>
                     </a:solidFill>
                   </a:tcPr>
                 </a:tc>
@@ -6697,17 +6793,29 @@
                 </a:tc>
                 <a:tc>
                   <a:txBody>
-                    <a:bodyPr vert="horz" wrap="square" lIns="91440" tIns="45720" rIns="91440" bIns="45720" anchor="t" anchorCtr="0">
-                      <a:spAutoFit/>
-                    </a:bodyPr>
-                    <a:p>
-                      <a:pPr>
-                        <a:defRPr lang="ko-KR" altLang="en-US"/>
-                      </a:pPr>
-                      <a:endParaRPr lang="ko-KR" altLang="en-US"/>
-                    </a:p>
-                  </a:txBody>
-                  <a:tcPr marL="91440" marR="91440">
+                    <a:bodyPr vert="horz" wrap="square" lIns="91440" tIns="45720" rIns="91440" bIns="45720" anchor="ctr" anchorCtr="0">
+                      <a:spAutoFit/>
+                    </a:bodyPr>
+                    <a:p>
+                      <a:pPr algn="ctr">
+                        <a:defRPr lang="ko-KR" altLang="en-US"/>
+                      </a:pPr>
+                      <a:r>
+                        <a:rPr lang="ko-KR" altLang="en-US">
+                          <a:solidFill>
+                            <a:schemeClr val="bg1"/>
+                          </a:solidFill>
+                        </a:rPr>
+                        <a:t>●</a:t>
+                      </a:r>
+                      <a:endParaRPr lang="ko-KR" altLang="en-US">
+                        <a:solidFill>
+                          <a:schemeClr val="bg1"/>
+                        </a:solidFill>
+                      </a:endParaRPr>
+                    </a:p>
+                  </a:txBody>
+                  <a:tcPr marL="91440" marR="91440" anchor="ctr">
                     <a:solidFill>
                       <a:srgbClr val="87c04e"/>
                     </a:solidFill>
@@ -6765,7 +6873,7 @@
                   </a:txBody>
                   <a:tcPr marL="91440" marR="91440">
                     <a:solidFill>
-                      <a:schemeClr val="bg1"/>
+                      <a:srgbClr val="87c04e"/>
                     </a:solidFill>
                   </a:tcPr>
                 </a:tc>
@@ -6939,7 +7047,7 @@
                   </a:txBody>
                   <a:tcPr marL="91440" marR="91440">
                     <a:solidFill>
-                      <a:schemeClr val="bg1"/>
+                      <a:srgbClr val="87c04e"/>
                     </a:solidFill>
                   </a:tcPr>
                 </a:tc>
@@ -7019,17 +7127,29 @@
                 </a:tc>
                 <a:tc>
                   <a:txBody>
-                    <a:bodyPr vert="horz" wrap="square" lIns="91440" tIns="45720" rIns="91440" bIns="45720" anchor="t" anchorCtr="0">
-                      <a:spAutoFit/>
-                    </a:bodyPr>
-                    <a:p>
-                      <a:pPr>
-                        <a:defRPr lang="ko-KR" altLang="en-US"/>
-                      </a:pPr>
-                      <a:endParaRPr lang="ko-KR" altLang="en-US"/>
-                    </a:p>
-                  </a:txBody>
-                  <a:tcPr marL="91440" marR="91440">
+                    <a:bodyPr vert="horz" wrap="square" lIns="91440" tIns="45720" rIns="91440" bIns="45720" anchor="ctr" anchorCtr="0">
+                      <a:spAutoFit/>
+                    </a:bodyPr>
+                    <a:p>
+                      <a:pPr algn="ctr">
+                        <a:defRPr lang="ko-KR" altLang="en-US"/>
+                      </a:pPr>
+                      <a:r>
+                        <a:rPr lang="ko-KR" altLang="en-US">
+                          <a:solidFill>
+                            <a:schemeClr val="bg1"/>
+                          </a:solidFill>
+                        </a:rPr>
+                        <a:t>●</a:t>
+                      </a:r>
+                      <a:endParaRPr lang="ko-KR" altLang="en-US">
+                        <a:solidFill>
+                          <a:schemeClr val="bg1"/>
+                        </a:solidFill>
+                      </a:endParaRPr>
+                    </a:p>
+                  </a:txBody>
+                  <a:tcPr marL="91440" marR="91440" anchor="ctr">
                     <a:solidFill>
                       <a:srgbClr val="87c04e"/>
                     </a:solidFill>
@@ -7087,7 +7207,7 @@
                   </a:txBody>
                   <a:tcPr marL="91440" marR="91440">
                     <a:solidFill>
-                      <a:srgbClr val="87c04e"/>
+                      <a:schemeClr val="bg1"/>
                     </a:solidFill>
                   </a:tcPr>
                 </a:tc>
@@ -7374,17 +7494,29 @@
                 </a:tc>
                 <a:tc>
                   <a:txBody>
-                    <a:bodyPr vert="horz" wrap="square" lIns="91440" tIns="45720" rIns="91440" bIns="45720" anchor="t" anchorCtr="0">
-                      <a:spAutoFit/>
-                    </a:bodyPr>
-                    <a:p>
-                      <a:pPr>
-                        <a:defRPr lang="ko-KR" altLang="en-US"/>
-                      </a:pPr>
-                      <a:endParaRPr lang="ko-KR" altLang="en-US"/>
-                    </a:p>
-                  </a:txBody>
-                  <a:tcPr marL="91440" marR="91440">
+                    <a:bodyPr vert="horz" wrap="square" lIns="91440" tIns="45720" rIns="91440" bIns="45720" anchor="ctr" anchorCtr="0">
+                      <a:spAutoFit/>
+                    </a:bodyPr>
+                    <a:p>
+                      <a:pPr algn="ctr">
+                        <a:defRPr lang="ko-KR" altLang="en-US"/>
+                      </a:pPr>
+                      <a:r>
+                        <a:rPr lang="ko-KR" altLang="en-US">
+                          <a:solidFill>
+                            <a:schemeClr val="bg1"/>
+                          </a:solidFill>
+                        </a:rPr>
+                        <a:t>●</a:t>
+                      </a:r>
+                      <a:endParaRPr lang="ko-KR" altLang="en-US">
+                        <a:solidFill>
+                          <a:schemeClr val="bg1"/>
+                        </a:solidFill>
+                      </a:endParaRPr>
+                    </a:p>
+                  </a:txBody>
+                  <a:tcPr marL="91440" marR="91440" anchor="ctr">
                     <a:solidFill>
                       <a:srgbClr val="437dc3"/>
                     </a:solidFill>
@@ -7736,17 +7868,29 @@
                 </a:tc>
                 <a:tc>
                   <a:txBody>
-                    <a:bodyPr vert="horz" wrap="square" lIns="91440" tIns="45720" rIns="91440" bIns="45720" anchor="t" anchorCtr="0">
-                      <a:spAutoFit/>
-                    </a:bodyPr>
-                    <a:p>
-                      <a:pPr>
-                        <a:defRPr lang="ko-KR" altLang="en-US"/>
-                      </a:pPr>
-                      <a:endParaRPr lang="ko-KR" altLang="en-US"/>
-                    </a:p>
-                  </a:txBody>
-                  <a:tcPr marL="91440" marR="91440">
+                    <a:bodyPr vert="horz" wrap="square" lIns="91440" tIns="45720" rIns="91440" bIns="45720" anchor="ctr" anchorCtr="0">
+                      <a:spAutoFit/>
+                    </a:bodyPr>
+                    <a:p>
+                      <a:pPr algn="ctr">
+                        <a:defRPr lang="ko-KR" altLang="en-US"/>
+                      </a:pPr>
+                      <a:r>
+                        <a:rPr lang="ko-KR" altLang="en-US">
+                          <a:solidFill>
+                            <a:schemeClr val="bg1"/>
+                          </a:solidFill>
+                        </a:rPr>
+                        <a:t>●</a:t>
+                      </a:r>
+                      <a:endParaRPr lang="ko-KR" altLang="en-US">
+                        <a:solidFill>
+                          <a:schemeClr val="bg1"/>
+                        </a:solidFill>
+                      </a:endParaRPr>
+                    </a:p>
+                  </a:txBody>
+                  <a:tcPr marL="91440" marR="91440" anchor="ctr">
                     <a:solidFill>
                       <a:srgbClr val="437dc3"/>
                     </a:solidFill>
@@ -8058,17 +8202,29 @@
                 </a:tc>
                 <a:tc>
                   <a:txBody>
-                    <a:bodyPr vert="horz" wrap="square" lIns="91440" tIns="45720" rIns="91440" bIns="45720" anchor="t" anchorCtr="0">
-                      <a:spAutoFit/>
-                    </a:bodyPr>
-                    <a:p>
-                      <a:pPr>
-                        <a:defRPr lang="ko-KR" altLang="en-US"/>
-                      </a:pPr>
-                      <a:endParaRPr lang="ko-KR" altLang="en-US"/>
-                    </a:p>
-                  </a:txBody>
-                  <a:tcPr marL="91440" marR="91440">
+                    <a:bodyPr vert="horz" wrap="square" lIns="91440" tIns="45720" rIns="91440" bIns="45720" anchor="ctr" anchorCtr="0">
+                      <a:spAutoFit/>
+                    </a:bodyPr>
+                    <a:p>
+                      <a:pPr algn="ctr">
+                        <a:defRPr lang="ko-KR" altLang="en-US"/>
+                      </a:pPr>
+                      <a:r>
+                        <a:rPr lang="ko-KR" altLang="en-US">
+                          <a:solidFill>
+                            <a:schemeClr val="bg1"/>
+                          </a:solidFill>
+                        </a:rPr>
+                        <a:t>●</a:t>
+                      </a:r>
+                      <a:endParaRPr lang="ko-KR" altLang="en-US">
+                        <a:solidFill>
+                          <a:schemeClr val="bg1"/>
+                        </a:solidFill>
+                      </a:endParaRPr>
+                    </a:p>
+                  </a:txBody>
+                  <a:tcPr marL="91440" marR="91440" anchor="ctr">
                     <a:solidFill>
                       <a:srgbClr val="437dc3"/>
                     </a:solidFill>
@@ -8380,17 +8536,29 @@
                 </a:tc>
                 <a:tc>
                   <a:txBody>
-                    <a:bodyPr vert="horz" wrap="square" lIns="91440" tIns="45720" rIns="91440" bIns="45720" anchor="t" anchorCtr="0">
-                      <a:spAutoFit/>
-                    </a:bodyPr>
-                    <a:p>
-                      <a:pPr>
-                        <a:defRPr lang="ko-KR" altLang="en-US"/>
-                      </a:pPr>
-                      <a:endParaRPr lang="ko-KR" altLang="en-US"/>
-                    </a:p>
-                  </a:txBody>
-                  <a:tcPr marL="91440" marR="91440">
+                    <a:bodyPr vert="horz" wrap="square" lIns="91440" tIns="45720" rIns="91440" bIns="45720" anchor="ctr" anchorCtr="0">
+                      <a:spAutoFit/>
+                    </a:bodyPr>
+                    <a:p>
+                      <a:pPr algn="ctr">
+                        <a:defRPr lang="ko-KR" altLang="en-US"/>
+                      </a:pPr>
+                      <a:r>
+                        <a:rPr lang="ko-KR" altLang="en-US">
+                          <a:solidFill>
+                            <a:schemeClr val="bg1"/>
+                          </a:solidFill>
+                        </a:rPr>
+                        <a:t>●</a:t>
+                      </a:r>
+                      <a:endParaRPr lang="ko-KR" altLang="en-US">
+                        <a:solidFill>
+                          <a:schemeClr val="bg1"/>
+                        </a:solidFill>
+                      </a:endParaRPr>
+                    </a:p>
+                  </a:txBody>
+                  <a:tcPr marL="91440" marR="91440" anchor="ctr">
                     <a:solidFill>
                       <a:srgbClr val="437dc3"/>
                     </a:solidFill>
@@ -12246,6 +12414,10 @@
                       <a:pPr algn="ctr">
                         <a:defRPr lang="ko-KR" altLang="en-US"/>
                       </a:pPr>
+                      <a:r>
+                        <a:rPr lang="ko-KR" altLang="en-US"/>
+                        <a:t>2018.07.30</a:t>
+                      </a:r>
                       <a:endParaRPr lang="ko-KR" altLang="en-US"/>
                     </a:p>
                   </a:txBody>
@@ -12260,6 +12432,10 @@
                       <a:pPr algn="ctr">
                         <a:defRPr lang="ko-KR" altLang="en-US"/>
                       </a:pPr>
+                      <a:r>
+                        <a:rPr lang="ko-KR" altLang="en-US"/>
+                        <a:t>블럭 배열 변경, 중심점 추가</a:t>
+                      </a:r>
                       <a:endParaRPr lang="ko-KR" altLang="en-US"/>
                     </a:p>
                   </a:txBody>
@@ -12274,6 +12450,10 @@
                       <a:pPr algn="ctr">
                         <a:defRPr lang="ko-KR" altLang="en-US"/>
                       </a:pPr>
+                      <a:r>
+                        <a:rPr lang="ko-KR" altLang="en-US"/>
+                        <a:t>햄과함께</a:t>
+                      </a:r>
                       <a:endParaRPr lang="ko-KR" altLang="en-US"/>
                     </a:p>
                   </a:txBody>
@@ -15978,17 +16158,29 @@
                 </a:tc>
                 <a:tc>
                   <a:txBody>
-                    <a:bodyPr vert="horz" wrap="square" lIns="91440" tIns="45720" rIns="91440" bIns="45720" anchor="t" anchorCtr="0">
-                      <a:spAutoFit/>
-                    </a:bodyPr>
-                    <a:p>
-                      <a:pPr>
-                        <a:defRPr lang="ko-KR" altLang="en-US"/>
-                      </a:pPr>
-                      <a:endParaRPr lang="ko-KR" altLang="en-US"/>
-                    </a:p>
-                  </a:txBody>
-                  <a:tcPr marL="91440" marR="91440">
+                    <a:bodyPr vert="horz" wrap="square" lIns="91440" tIns="45720" rIns="91440" bIns="45720" anchor="ctr" anchorCtr="0">
+                      <a:spAutoFit/>
+                    </a:bodyPr>
+                    <a:p>
+                      <a:pPr algn="ctr">
+                        <a:defRPr lang="ko-KR" altLang="en-US"/>
+                      </a:pPr>
+                      <a:r>
+                        <a:rPr lang="ko-KR" altLang="en-US">
+                          <a:solidFill>
+                            <a:schemeClr val="bg1"/>
+                          </a:solidFill>
+                        </a:rPr>
+                        <a:t>●</a:t>
+                      </a:r>
+                      <a:endParaRPr lang="ko-KR" altLang="en-US">
+                        <a:solidFill>
+                          <a:schemeClr val="bg1"/>
+                        </a:solidFill>
+                      </a:endParaRPr>
+                    </a:p>
+                  </a:txBody>
+                  <a:tcPr marL="91440" marR="91440" anchor="ctr">
                     <a:solidFill>
                       <a:srgbClr val="76c3cd"/>
                     </a:solidFill>
@@ -16373,17 +16565,29 @@
                 </a:tc>
                 <a:tc>
                   <a:txBody>
-                    <a:bodyPr vert="horz" wrap="square" lIns="91440" tIns="45720" rIns="91440" bIns="45720" anchor="t" anchorCtr="0">
-                      <a:spAutoFit/>
-                    </a:bodyPr>
-                    <a:p>
-                      <a:pPr>
-                        <a:defRPr lang="ko-KR" altLang="en-US"/>
-                      </a:pPr>
-                      <a:endParaRPr lang="ko-KR" altLang="en-US"/>
-                    </a:p>
-                  </a:txBody>
-                  <a:tcPr marL="91440" marR="91440">
+                    <a:bodyPr vert="horz" wrap="square" lIns="91440" tIns="45720" rIns="91440" bIns="45720" anchor="ctr" anchorCtr="0">
+                      <a:spAutoFit/>
+                    </a:bodyPr>
+                    <a:p>
+                      <a:pPr algn="ctr">
+                        <a:defRPr lang="ko-KR" altLang="en-US"/>
+                      </a:pPr>
+                      <a:r>
+                        <a:rPr lang="ko-KR" altLang="en-US">
+                          <a:solidFill>
+                            <a:schemeClr val="bg1"/>
+                          </a:solidFill>
+                        </a:rPr>
+                        <a:t>●</a:t>
+                      </a:r>
+                      <a:endParaRPr lang="ko-KR" altLang="en-US">
+                        <a:solidFill>
+                          <a:schemeClr val="bg1"/>
+                        </a:solidFill>
+                      </a:endParaRPr>
+                    </a:p>
+                  </a:txBody>
+                  <a:tcPr marL="91440" marR="91440" anchor="ctr">
                     <a:solidFill>
                       <a:srgbClr val="d6cca4"/>
                     </a:solidFill>
@@ -16735,17 +16939,29 @@
                 </a:tc>
                 <a:tc>
                   <a:txBody>
-                    <a:bodyPr vert="horz" wrap="square" lIns="91440" tIns="45720" rIns="91440" bIns="45720" anchor="t" anchorCtr="0">
-                      <a:spAutoFit/>
-                    </a:bodyPr>
-                    <a:p>
-                      <a:pPr>
-                        <a:defRPr lang="ko-KR" altLang="en-US"/>
-                      </a:pPr>
-                      <a:endParaRPr lang="ko-KR" altLang="en-US"/>
-                    </a:p>
-                  </a:txBody>
-                  <a:tcPr marL="91440" marR="91440">
+                    <a:bodyPr vert="horz" wrap="square" lIns="91440" tIns="45720" rIns="91440" bIns="45720" anchor="ctr" anchorCtr="0">
+                      <a:spAutoFit/>
+                    </a:bodyPr>
+                    <a:p>
+                      <a:pPr algn="ctr">
+                        <a:defRPr lang="ko-KR" altLang="en-US"/>
+                      </a:pPr>
+                      <a:r>
+                        <a:rPr lang="ko-KR" altLang="en-US">
+                          <a:solidFill>
+                            <a:schemeClr val="bg1"/>
+                          </a:solidFill>
+                        </a:rPr>
+                        <a:t>●</a:t>
+                      </a:r>
+                      <a:endParaRPr lang="ko-KR" altLang="en-US">
+                        <a:solidFill>
+                          <a:schemeClr val="bg1"/>
+                        </a:solidFill>
+                      </a:endParaRPr>
+                    </a:p>
+                  </a:txBody>
+                  <a:tcPr marL="91440" marR="91440" anchor="ctr">
                     <a:solidFill>
                       <a:srgbClr val="d6cca4"/>
                     </a:solidFill>
@@ -17090,17 +17306,29 @@
                 </a:tc>
                 <a:tc>
                   <a:txBody>
-                    <a:bodyPr vert="horz" wrap="square" lIns="91440" tIns="45720" rIns="91440" bIns="45720" anchor="t" anchorCtr="0">
-                      <a:spAutoFit/>
-                    </a:bodyPr>
-                    <a:p>
-                      <a:pPr>
-                        <a:defRPr lang="ko-KR" altLang="en-US"/>
-                      </a:pPr>
-                      <a:endParaRPr lang="ko-KR" altLang="en-US"/>
-                    </a:p>
-                  </a:txBody>
-                  <a:tcPr marL="91440" marR="91440">
+                    <a:bodyPr vert="horz" wrap="square" lIns="91440" tIns="45720" rIns="91440" bIns="45720" anchor="ctr" anchorCtr="0">
+                      <a:spAutoFit/>
+                    </a:bodyPr>
+                    <a:p>
+                      <a:pPr algn="ctr">
+                        <a:defRPr lang="ko-KR" altLang="en-US"/>
+                      </a:pPr>
+                      <a:r>
+                        <a:rPr lang="ko-KR" altLang="en-US">
+                          <a:solidFill>
+                            <a:schemeClr val="bg1"/>
+                          </a:solidFill>
+                        </a:rPr>
+                        <a:t>●</a:t>
+                      </a:r>
+                      <a:endParaRPr lang="ko-KR" altLang="en-US">
+                        <a:solidFill>
+                          <a:schemeClr val="bg1"/>
+                        </a:solidFill>
+                      </a:endParaRPr>
+                    </a:p>
+                  </a:txBody>
+                  <a:tcPr marL="91440" marR="91440" anchor="ctr">
                     <a:solidFill>
                       <a:srgbClr val="c3409c"/>
                     </a:solidFill>
@@ -17452,17 +17680,29 @@
                 </a:tc>
                 <a:tc>
                   <a:txBody>
-                    <a:bodyPr vert="horz" wrap="square" lIns="91440" tIns="45720" rIns="91440" bIns="45720" anchor="t" anchorCtr="0">
-                      <a:spAutoFit/>
-                    </a:bodyPr>
-                    <a:p>
-                      <a:pPr>
-                        <a:defRPr lang="ko-KR" altLang="en-US"/>
-                      </a:pPr>
-                      <a:endParaRPr lang="ko-KR" altLang="en-US"/>
-                    </a:p>
-                  </a:txBody>
-                  <a:tcPr marL="91440" marR="91440">
+                    <a:bodyPr vert="horz" wrap="square" lIns="91440" tIns="45720" rIns="91440" bIns="45720" anchor="ctr" anchorCtr="0">
+                      <a:spAutoFit/>
+                    </a:bodyPr>
+                    <a:p>
+                      <a:pPr algn="ctr">
+                        <a:defRPr lang="ko-KR" altLang="en-US"/>
+                      </a:pPr>
+                      <a:r>
+                        <a:rPr lang="ko-KR" altLang="en-US">
+                          <a:solidFill>
+                            <a:schemeClr val="bg1"/>
+                          </a:solidFill>
+                        </a:rPr>
+                        <a:t>●</a:t>
+                      </a:r>
+                      <a:endParaRPr lang="ko-KR" altLang="en-US">
+                        <a:solidFill>
+                          <a:schemeClr val="bg1"/>
+                        </a:solidFill>
+                      </a:endParaRPr>
+                    </a:p>
+                  </a:txBody>
+                  <a:tcPr marL="91440" marR="91440" anchor="ctr">
                     <a:solidFill>
                       <a:srgbClr val="c3409c"/>
                     </a:solidFill>

</xml_diff>